<commit_message>
Day 4 and 5
</commit_message>
<xml_diff>
--- a/Azure Storage.pptx
+++ b/Azure Storage.pptx
@@ -8,10 +8,28 @@
     <p:sldId id="256" r:id="rId2"/>
     <p:sldId id="257" r:id="rId3"/>
     <p:sldId id="258" r:id="rId4"/>
-    <p:sldId id="259" r:id="rId5"/>
-    <p:sldId id="260" r:id="rId6"/>
-    <p:sldId id="261" r:id="rId7"/>
-    <p:sldId id="262" r:id="rId8"/>
+    <p:sldId id="263" r:id="rId5"/>
+    <p:sldId id="259" r:id="rId6"/>
+    <p:sldId id="260" r:id="rId7"/>
+    <p:sldId id="261" r:id="rId8"/>
+    <p:sldId id="262" r:id="rId9"/>
+    <p:sldId id="264" r:id="rId10"/>
+    <p:sldId id="265" r:id="rId11"/>
+    <p:sldId id="266" r:id="rId12"/>
+    <p:sldId id="267" r:id="rId13"/>
+    <p:sldId id="268" r:id="rId14"/>
+    <p:sldId id="269" r:id="rId15"/>
+    <p:sldId id="270" r:id="rId16"/>
+    <p:sldId id="271" r:id="rId17"/>
+    <p:sldId id="272" r:id="rId18"/>
+    <p:sldId id="279" r:id="rId19"/>
+    <p:sldId id="280" r:id="rId20"/>
+    <p:sldId id="273" r:id="rId21"/>
+    <p:sldId id="274" r:id="rId22"/>
+    <p:sldId id="275" r:id="rId23"/>
+    <p:sldId id="276" r:id="rId24"/>
+    <p:sldId id="277" r:id="rId25"/>
+    <p:sldId id="278" r:id="rId26"/>
   </p:sldIdLst>
   <p:sldSz cx="12192000" cy="6858000"/>
   <p:notesSz cx="6858000" cy="9144000"/>
@@ -110,6 +128,11 @@
       </a:defRPr>
     </a:lvl9pPr>
   </p:defaultTextStyle>
+  <p:extLst>
+    <p:ext uri="{EFAFB233-063F-42B5-8137-9DF3F51BA10A}">
+      <p15:sldGuideLst xmlns:p15="http://schemas.microsoft.com/office/powerpoint/2012/main"/>
+    </p:ext>
+  </p:extLst>
 </p:presentation>
 </file>
 
@@ -600,6 +623,114 @@
 </inkml:ink>
 </file>
 
+<file path=ppt/ink/ink26.xml><?xml version="1.0" encoding="utf-8"?>
+<inkml:ink xmlns:inkml="http://www.w3.org/2003/InkML">
+  <inkml:definitions>
+    <inkml:context xml:id="ctx0">
+      <inkml:inkSource xml:id="inkSrc0">
+        <inkml:traceFormat>
+          <inkml:channel name="X" type="integer" min="-2.14748E9" max="2.14748E9" units="cm"/>
+          <inkml:channel name="Y" type="integer" min="-2.14748E9" max="2.14748E9" units="cm"/>
+          <inkml:channel name="F" type="integer" max="32767" units="dev"/>
+        </inkml:traceFormat>
+        <inkml:channelProperties>
+          <inkml:channelProperty channel="X" name="resolution" value="1000" units="1/cm"/>
+          <inkml:channelProperty channel="Y" name="resolution" value="1000" units="1/cm"/>
+          <inkml:channelProperty channel="F" name="resolution" value="0" units="1/dev"/>
+        </inkml:channelProperties>
+      </inkml:inkSource>
+      <inkml:timestamp xml:id="ts0" timeString="2023-09-23T04:19:09.105"/>
+    </inkml:context>
+    <inkml:brush xml:id="br0">
+      <inkml:brushProperty name="width" value="0.05" units="cm"/>
+      <inkml:brushProperty name="height" value="0.05" units="cm"/>
+    </inkml:brush>
+  </inkml:definitions>
+  <inkml:trace contextRef="#ctx0" brushRef="#br0">9 205 1288,'0'0'578,"-4"-10"3391,-1 0 2687,12 25-6090,-6-12-521,-1-1 0,1 1-1,0-1 1,0 0 0,0 1-1,0-1 1,1 0 0,-1 1-1,1-1 1,-1 0 0,1 0 0,0 0-1,-1 0 1,1 0 0,0-1-1,0 1 1,1-1 0,-1 1-1,4 1 1,-1-2 0,-1 0 0,1 0 0,0-1-1,0 0 1,0 0 0,-1 0 0,1 0 0,9-3 0,28-5 104,0-3 1,56-22-1,-35 11-49,229-84 234,-217 78-262,33-6-330,-107 33 25</inkml:trace>
+</inkml:ink>
+</file>
+
+<file path=ppt/ink/ink27.xml><?xml version="1.0" encoding="utf-8"?>
+<inkml:ink xmlns:inkml="http://www.w3.org/2003/InkML">
+  <inkml:definitions>
+    <inkml:context xml:id="ctx0">
+      <inkml:inkSource xml:id="inkSrc0">
+        <inkml:traceFormat>
+          <inkml:channel name="X" type="integer" min="-2.14748E9" max="2.14748E9" units="cm"/>
+          <inkml:channel name="Y" type="integer" min="-2.14748E9" max="2.14748E9" units="cm"/>
+          <inkml:channel name="F" type="integer" max="32767" units="dev"/>
+        </inkml:traceFormat>
+        <inkml:channelProperties>
+          <inkml:channelProperty channel="X" name="resolution" value="1000" units="1/cm"/>
+          <inkml:channelProperty channel="Y" name="resolution" value="1000" units="1/cm"/>
+          <inkml:channelProperty channel="F" name="resolution" value="0" units="1/dev"/>
+        </inkml:channelProperties>
+      </inkml:inkSource>
+      <inkml:timestamp xml:id="ts0" timeString="2023-09-23T04:19:14.489"/>
+    </inkml:context>
+    <inkml:brush xml:id="br0">
+      <inkml:brushProperty name="width" value="0.05" units="cm"/>
+      <inkml:brushProperty name="height" value="0.05" units="cm"/>
+    </inkml:brush>
+  </inkml:definitions>
+  <inkml:trace contextRef="#ctx0" brushRef="#br0">1 267 1352,'0'0'2100,"4"-9"-168,0-3 6374,-4 12-8298,0 0 0,0 0 0,0 0 0,0 0 0,0-1 0,0 1 0,0 0 0,0 0 0,0 0 0,0 0 0,0 0 0,0 0 0,0 0 0,0 0 0,0 0 0,0 0 0,0 0 0,0 0 0,1 0 0,-1 0 0,0 0 0,0 0 0,0 0 0,0 0 0,0 0 0,0 0 0,0 0 1,0 0-1,0 0 0,0 0 0,0 0 0,0 0 0,1 0 0,-1 0 0,0 0 0,0 0 0,0 0 0,0 0 0,0 0 0,0 0 0,0 0 0,0 0 0,0 0 0,0 0 0,0 0 0,0 0 0,0 0 0,0 0 0,1 0 0,-1 0 0,0 0 0,0 0 0,0 0 0,0 0 0,0 0 0,0 0 0,0 1 0,0-1 0,0 0 0,0 0 0,0 0 0,0 0 0,8 8 284,18 22-102,4 4-53,-25-30-123,0 0 0,0 0-1,0 0 1,1-1 0,-1 0 0,1 0-1,0 0 1,0-1 0,0 1 0,0-2 0,0 1-1,1-1 1,-1 0 0,0 0 0,1 0 0,-1-1-1,0 0 1,1 0 0,-1-1 0,1 0-1,10-3 1,9-3 12,-1-2 0,0-1 0,46-24 0,-65 30-20,191-118 76,-15 8 24,-154 98-107,-13 7-16,0 0 1,20-7-1,-34 16-222,1 0 0,-1-1 0,0 1 0,0 0 0,0 0 0,1 0 0,-1 0 1,0 0-1,0 0 0,0 0 0,1 0 0,-1 1 0,0-1 0,2 1 0,4 0-4436</inkml:trace>
+</inkml:ink>
+</file>
+
+<file path=ppt/ink/ink28.xml><?xml version="1.0" encoding="utf-8"?>
+<inkml:ink xmlns:inkml="http://www.w3.org/2003/InkML">
+  <inkml:definitions>
+    <inkml:context xml:id="ctx0">
+      <inkml:inkSource xml:id="inkSrc0">
+        <inkml:traceFormat>
+          <inkml:channel name="X" type="integer" min="-2.14748E9" max="2.14748E9" units="cm"/>
+          <inkml:channel name="Y" type="integer" min="-2.14748E9" max="2.14748E9" units="cm"/>
+          <inkml:channel name="F" type="integer" max="32767" units="dev"/>
+        </inkml:traceFormat>
+        <inkml:channelProperties>
+          <inkml:channelProperty channel="X" name="resolution" value="1000" units="1/cm"/>
+          <inkml:channelProperty channel="Y" name="resolution" value="1000" units="1/cm"/>
+          <inkml:channelProperty channel="F" name="resolution" value="0" units="1/dev"/>
+        </inkml:channelProperties>
+      </inkml:inkSource>
+      <inkml:timestamp xml:id="ts0" timeString="2023-09-23T04:19:19.727"/>
+    </inkml:context>
+    <inkml:brush xml:id="br0">
+      <inkml:brushProperty name="width" value="0.05" units="cm"/>
+      <inkml:brushProperty name="height" value="0.05" units="cm"/>
+    </inkml:brush>
+  </inkml:definitions>
+  <inkml:trace contextRef="#ctx0" brushRef="#br0">8 376 1364,'-7'2'12763,"16"11"-12493,-1 0-1,0 0 0,9 21 1,-16-31-216,1 0 1,-1 1 0,1-1-1,0 0 1,0 0 0,0 0-1,1 0 1,-1-1 0,1 1-1,-1-1 1,1 1 0,0-1-1,0 0 1,0 0-1,0 0 1,5 1 0,-3-1-12,0 0 0,0-1 0,0 0 1,0 0-1,0-1 0,0 1 0,1-1 0,-1 0 1,0-1-1,7 0 0,9-4 37,1-1 0,-1-1 1,0-1-1,26-13 0,414-227 520,-188 94-347,-244 138-231,-12 6-119,31-13-1,-41 18 635</inkml:trace>
+</inkml:ink>
+</file>
+
+<file path=ppt/ink/ink29.xml><?xml version="1.0" encoding="utf-8"?>
+<inkml:ink xmlns:inkml="http://www.w3.org/2003/InkML">
+  <inkml:definitions>
+    <inkml:context xml:id="ctx0">
+      <inkml:inkSource xml:id="inkSrc0">
+        <inkml:traceFormat>
+          <inkml:channel name="X" type="integer" min="-2.14748E9" max="2.14748E9" units="cm"/>
+          <inkml:channel name="Y" type="integer" min="-2.14748E9" max="2.14748E9" units="cm"/>
+          <inkml:channel name="F" type="integer" max="32767" units="dev"/>
+        </inkml:traceFormat>
+        <inkml:channelProperties>
+          <inkml:channelProperty channel="X" name="resolution" value="1000" units="1/cm"/>
+          <inkml:channelProperty channel="Y" name="resolution" value="1000" units="1/cm"/>
+          <inkml:channelProperty channel="F" name="resolution" value="0" units="1/dev"/>
+        </inkml:channelProperties>
+      </inkml:inkSource>
+      <inkml:timestamp xml:id="ts0" timeString="2023-05-06T16:15:10.454"/>
+    </inkml:context>
+    <inkml:brush xml:id="br0">
+      <inkml:brushProperty name="width" value="0.05" units="cm"/>
+      <inkml:brushProperty name="height" value="0.05" units="cm"/>
+    </inkml:brush>
+  </inkml:definitions>
+  <inkml:trace contextRef="#ctx0" brushRef="#br0">0 0 1328,'0'0'6727,"3"5"-6009,8 14 226,-1 0 0,-1 1 0,13 40 0,-1-3 41,30 65 330,17 42-263,-32-87-4782,-30-68-1389</inkml:trace>
+</inkml:ink>
+</file>
+
 <file path=ppt/ink/ink3.xml><?xml version="1.0" encoding="utf-8"?>
 <inkml:ink xmlns:inkml="http://www.w3.org/2003/InkML">
   <inkml:definitions>
@@ -627,6 +758,276 @@
 </inkml:ink>
 </file>
 
+<file path=ppt/ink/ink30.xml><?xml version="1.0" encoding="utf-8"?>
+<inkml:ink xmlns:inkml="http://www.w3.org/2003/InkML">
+  <inkml:definitions>
+    <inkml:context xml:id="ctx0">
+      <inkml:inkSource xml:id="inkSrc0">
+        <inkml:traceFormat>
+          <inkml:channel name="X" type="integer" min="-2.14748E9" max="2.14748E9" units="cm"/>
+          <inkml:channel name="Y" type="integer" min="-2.14748E9" max="2.14748E9" units="cm"/>
+          <inkml:channel name="F" type="integer" max="32767" units="dev"/>
+        </inkml:traceFormat>
+        <inkml:channelProperties>
+          <inkml:channelProperty channel="X" name="resolution" value="1000" units="1/cm"/>
+          <inkml:channelProperty channel="Y" name="resolution" value="1000" units="1/cm"/>
+          <inkml:channelProperty channel="F" name="resolution" value="0" units="1/dev"/>
+        </inkml:channelProperties>
+      </inkml:inkSource>
+      <inkml:timestamp xml:id="ts0" timeString="2023-05-06T16:15:11.034"/>
+    </inkml:context>
+    <inkml:brush xml:id="br0">
+      <inkml:brushProperty name="width" value="0.05" units="cm"/>
+      <inkml:brushProperty name="height" value="0.05" units="cm"/>
+    </inkml:brush>
+  </inkml:definitions>
+  <inkml:trace contextRef="#ctx0" brushRef="#br0">116 35 1144,'0'-2'638,"0"0"0,-1 0-1,1 0 1,0 0 0,-1 0 0,1 0-1,-1 1 1,0-1 0,0 0 0,1 0 0,-3-3-1,-2-3-190,0 11-37,-2 1-268,0 1-1,0 0 1,1 0-1,0 0 1,0 1-1,1 0 1,-1 0-1,1 1 1,0-1-1,-7 14 1,8-11-26,0 1 0,0-1 0,1 1-1,0 0 1,0 0 0,1 0 0,1 0 0,0 0 0,0 19-1,1-24-86,1-1 0,-1 0 1,1 0-1,0 0 0,0 0 0,1 0 0,-1 0 0,1 0 0,0 0 0,0-1 0,0 1 0,0 0 0,1-1 0,-1 0 0,1 0 0,0 1 0,0-2 0,0 1 0,0 0 0,1-1 0,-1 1 0,1-1 0,-1 0 0,1 0 0,0 0 0,7 1 0,-6-1-1,1 0-1,-1-1 1,1 0-1,-1 0 1,1 0 0,0-1-1,0 0 1,-1 0-1,1 0 1,7-2-1,-10 1-17,0 0-1,-1 1 1,1-1 0,0-1-1,0 1 1,-1 0-1,1-1 1,-1 1-1,1-1 1,-1 0-1,0 0 1,1 1 0,-1-2-1,0 1 1,0 0-1,-1 0 1,1-1-1,0 1 1,-1-1-1,1 1 1,0-5 0,1 1-3,-1 0 1,-1 0-1,1 0 0,-1 0 1,0 0-1,-1-1 1,1 1-1,-1 0 1,-1-1-1,1 1 1,-1 0-1,0 0 1,0-1-1,-1 1 0,0 0 1,0 0-1,0 1 1,-1-1-1,-4-7 1,4 9-84,0-1 0,0 1 0,-1 0-1,1 0 1,-1 0 0,0 1 0,0-1 0,-1 1 0,1 0 0,-1 0 0,1 0 0,-1 1 0,0-1 0,0 1-1,0 1 1,-1-1 0,1 1 0,0-1 0,-1 2 0,1-1 0,0 0 0,-12 1 0,-29 7-5899,42-6 3256</inkml:trace>
+</inkml:ink>
+</file>
+
+<file path=ppt/ink/ink31.xml><?xml version="1.0" encoding="utf-8"?>
+<inkml:ink xmlns:inkml="http://www.w3.org/2003/InkML">
+  <inkml:definitions>
+    <inkml:context xml:id="ctx0">
+      <inkml:inkSource xml:id="inkSrc0">
+        <inkml:traceFormat>
+          <inkml:channel name="X" type="integer" min="-2.14748E9" max="2.14748E9" units="cm"/>
+          <inkml:channel name="Y" type="integer" min="-2.14748E9" max="2.14748E9" units="cm"/>
+          <inkml:channel name="F" type="integer" max="32767" units="dev"/>
+        </inkml:traceFormat>
+        <inkml:channelProperties>
+          <inkml:channelProperty channel="X" name="resolution" value="1000" units="1/cm"/>
+          <inkml:channelProperty channel="Y" name="resolution" value="1000" units="1/cm"/>
+          <inkml:channelProperty channel="F" name="resolution" value="0" units="1/dev"/>
+        </inkml:channelProperties>
+      </inkml:inkSource>
+      <inkml:timestamp xml:id="ts0" timeString="2023-05-06T16:15:11.405"/>
+    </inkml:context>
+    <inkml:brush xml:id="br0">
+      <inkml:brushProperty name="width" value="0.05" units="cm"/>
+      <inkml:brushProperty name="height" value="0.05" units="cm"/>
+    </inkml:brush>
+  </inkml:definitions>
+  <inkml:trace contextRef="#ctx0" brushRef="#br0">22 69 1432,'1'5'252,"-1"1"-1,1-1 1,1 0-1,-1 0 1,1 0 0,0 0-1,0 0 1,0 0-1,4 6 1,-4-8-100,0 0 0,0-1 0,0 0 0,1 1 0,-1-1 0,0 0 0,1 0 0,0 0 0,-1 0 0,1-1 0,0 1 0,0-1-1,0 0 1,0 1 0,0-1 0,0-1 0,0 1 0,4 0 0,-5 0-73,1-1 0,0 0 0,-1 0 0,1 0 0,0 0 0,-1 0 0,1-1 0,-1 1 0,1-1 0,-1 0 0,1 0 0,-1 0-1,1 0 1,-1 0 0,0 0 0,1 0 0,-1-1 0,0 1 0,0-1 0,0 0 0,0 0 0,0 0 0,-1 0 0,1 0 0,0 0 0,-1 0 0,0 0 0,1-1-1,-1 1 1,0 0 0,0-1 0,0 1 0,-1-1 0,1 1 0,0-1 0,-1 0 0,0 1 0,0-1 0,0 1 0,0-1 0,0 0 0,-1-3 0,0 3-48,0 0 1,0 0 0,0 0 0,-1 0 0,1 0 0,-1 0 0,0 0-1,0 1 1,0-1 0,0 1 0,0-1 0,0 1 0,-1 0 0,-4-3-1,-2-1 9,1 0-1,-20-8 0,19 10-409,1 2 1,-1-1-1,-1 1 1,-17-2-1,2 1-3199</inkml:trace>
+</inkml:ink>
+</file>
+
+<file path=ppt/ink/ink32.xml><?xml version="1.0" encoding="utf-8"?>
+<inkml:ink xmlns:inkml="http://www.w3.org/2003/InkML">
+  <inkml:definitions>
+    <inkml:context xml:id="ctx0">
+      <inkml:inkSource xml:id="inkSrc0">
+        <inkml:traceFormat>
+          <inkml:channel name="X" type="integer" min="-2.14748E9" max="2.14748E9" units="cm"/>
+          <inkml:channel name="Y" type="integer" min="-2.14748E9" max="2.14748E9" units="cm"/>
+          <inkml:channel name="F" type="integer" max="32767" units="dev"/>
+        </inkml:traceFormat>
+        <inkml:channelProperties>
+          <inkml:channelProperty channel="X" name="resolution" value="1000" units="1/cm"/>
+          <inkml:channelProperty channel="Y" name="resolution" value="1000" units="1/cm"/>
+          <inkml:channelProperty channel="F" name="resolution" value="0" units="1/dev"/>
+        </inkml:channelProperties>
+      </inkml:inkSource>
+      <inkml:timestamp xml:id="ts0" timeString="2023-05-06T16:15:12.014"/>
+    </inkml:context>
+    <inkml:brush xml:id="br0">
+      <inkml:brushProperty name="width" value="0.05" units="cm"/>
+      <inkml:brushProperty name="height" value="0.05" units="cm"/>
+    </inkml:brush>
+  </inkml:definitions>
+  <inkml:trace contextRef="#ctx0" brushRef="#br0">0 1 1576,'1'18'666,"0"0"-1,1 0 1,1-1 0,6 22-1,27 66 1727,-23-71-1575,-7-21 16,-2-12 547,-1-15 564,-2 7-2450,0 1 638,-1 3 1,1-9-30,-1 9-15,3-12 117,-3 14-191,0 0 0,0 1 1,1-1-1,-1 0 0,0 1 0,1-1 0,-1 0 0,0 1 1,1-1-1,-1 1 0,1-1 0,-1 1 0,1-1 0,-1 1 1,2-2-1,0 2-7,0 0-1,0 0 1,-1 0 0,1 0-1,0 1 1,0-1 0,0 0 0,-1 1-1,1-1 1,0 1 0,0-1-1,-1 1 1,1 0 0,0 0 0,2 2-1,26 21 42,-9-7-13,7 5 146,-26-22 49,2-2-117,5-5 26,-1 1-1,0-2 1,14-14 0,64-101 1025,-75 110-953,0 0 1,1 0-1,19-15 1,-30 27-200,0 0 1,1 0 0,-1 0-1,1 0 1,-1 1-1,1-1 1,-1 0-1,1 1 1,-1-1 0,1 1-1,0 0 1,-1-1-1,1 1 1,0 0 0,-1 0-1,1 0 1,0 0-1,1 1 1,0 0 2,1-1 0,-1 1 0,0 1 0,0-1 0,-1 0 0,1 1 0,0 0 0,4 3 0,2 3-14,0 0 1,-1 1 0,14 18-1,-10-9-367,0 0-1,-1 0 0,12 31 0,-18-37-1490,0 1 0,-2 0-1,5 23 1,-6-22-1522</inkml:trace>
+</inkml:ink>
+</file>
+
+<file path=ppt/ink/ink33.xml><?xml version="1.0" encoding="utf-8"?>
+<inkml:ink xmlns:inkml="http://www.w3.org/2003/InkML">
+  <inkml:definitions>
+    <inkml:context xml:id="ctx0">
+      <inkml:inkSource xml:id="inkSrc0">
+        <inkml:traceFormat>
+          <inkml:channel name="X" type="integer" min="-2.14748E9" max="2.14748E9" units="cm"/>
+          <inkml:channel name="Y" type="integer" min="-2.14748E9" max="2.14748E9" units="cm"/>
+          <inkml:channel name="F" type="integer" max="32767" units="dev"/>
+        </inkml:traceFormat>
+        <inkml:channelProperties>
+          <inkml:channelProperty channel="X" name="resolution" value="1000" units="1/cm"/>
+          <inkml:channelProperty channel="Y" name="resolution" value="1000" units="1/cm"/>
+          <inkml:channelProperty channel="F" name="resolution" value="0" units="1/dev"/>
+        </inkml:channelProperties>
+      </inkml:inkSource>
+      <inkml:timestamp xml:id="ts0" timeString="2023-05-06T16:15:12.339"/>
+    </inkml:context>
+    <inkml:brush xml:id="br0">
+      <inkml:brushProperty name="width" value="0.05" units="cm"/>
+      <inkml:brushProperty name="height" value="0.05" units="cm"/>
+    </inkml:brush>
+  </inkml:definitions>
+  <inkml:trace contextRef="#ctx0" brushRef="#br0">0 0 856,'0'0'7212,"2"7"-6580,21 80 955,34 122 278,-44-171-1718,10 35 7,-7-29-3548</inkml:trace>
+</inkml:ink>
+</file>
+
+<file path=ppt/ink/ink34.xml><?xml version="1.0" encoding="utf-8"?>
+<inkml:ink xmlns:inkml="http://www.w3.org/2003/InkML">
+  <inkml:definitions>
+    <inkml:context xml:id="ctx0">
+      <inkml:inkSource xml:id="inkSrc0">
+        <inkml:traceFormat>
+          <inkml:channel name="X" type="integer" min="-2.14748E9" max="2.14748E9" units="cm"/>
+          <inkml:channel name="Y" type="integer" min="-2.14748E9" max="2.14748E9" units="cm"/>
+          <inkml:channel name="F" type="integer" max="32767" units="dev"/>
+        </inkml:traceFormat>
+        <inkml:channelProperties>
+          <inkml:channelProperty channel="X" name="resolution" value="1000" units="1/cm"/>
+          <inkml:channelProperty channel="Y" name="resolution" value="1000" units="1/cm"/>
+          <inkml:channelProperty channel="F" name="resolution" value="0" units="1/dev"/>
+        </inkml:channelProperties>
+      </inkml:inkSource>
+      <inkml:timestamp xml:id="ts0" timeString="2023-05-06T16:15:12.745"/>
+    </inkml:context>
+    <inkml:brush xml:id="br0">
+      <inkml:brushProperty name="width" value="0.05" units="cm"/>
+      <inkml:brushProperty name="height" value="0.05" units="cm"/>
+    </inkml:brush>
+  </inkml:definitions>
+  <inkml:trace contextRef="#ctx0" brushRef="#br0">0 209 952,'1'-14'940,"-1"11"-82,5-10 600,-2 7-921,0 0-1,0 0 0,1 0 0,0 0 1,0 1-1,0-1 0,1 1 0,0 0 1,7-6-1,114-81 3178,-122 89-3637,0 0 1,0 0 0,0 1 0,0-1 0,9-3 0,-11 5-17,-1 0-43,0 1 1,1-1-1,-1 1 1,1-1-1,-1 1 1,1 0-1,-1-1 1,0 1-1,1 0 1,-1 0-1,1 0 1,-1 0-1,1 0 1,-1 1-1,1-1 1,-1 0-1,4 1 1,-3 3-12,0-1 0,0 1 0,0-1 0,-1 1 0,1 0 0,-1-1 0,0 1 0,0 0-1,0 0 1,0 0 0,-1 0 0,1 0 0,-1 0 0,0 0 0,-1 0 0,0 4 0,-1 15 12,-12 37-1,4-16 8,7-26-19,1 0 1,0 0-1,1 0 1,3 25-1,-1-34-7,0 0 0,1 0-1,0-1 1,1 1 0,0-1-1,0 1 1,1-1 0,0 0-1,0 0 1,11 13 0,24 26-10,-21-26 3,0 0-1,23 40 1,-40-59 5,0 0 1,1 0 0,-2 0-1,1 0 1,0 0 0,0 0-1,-1 0 1,1 1 0,-1-1-1,1 0 1,-1 0 0,0 1-1,0-1 1,0 0 0,0 1-1,-1-1 1,1 0 0,-1 0-1,1 0 1,-1 1 0,0-1-1,1 0 1,-1 0 0,0 0-1,-1 0 1,1 0 0,0 0-1,-1-1 1,1 1 0,0 0-1,-1-1 1,0 1 0,0-1-1,1 1 1,-1-1 0,0 0-1,0 0 1,-4 2 0,-4 2-182,0-1 1,0 0 0,-1 0-1,1-1 1,-1-1 0,0 0-1,-15 1 1,9-2-1864,1-1 0,-21-2 0,20 0-970</inkml:trace>
+</inkml:ink>
+</file>
+
+<file path=ppt/ink/ink35.xml><?xml version="1.0" encoding="utf-8"?>
+<inkml:ink xmlns:inkml="http://www.w3.org/2003/InkML">
+  <inkml:definitions>
+    <inkml:context xml:id="ctx0">
+      <inkml:inkSource xml:id="inkSrc0">
+        <inkml:traceFormat>
+          <inkml:channel name="X" type="integer" min="-2.14748E9" max="2.14748E9" units="cm"/>
+          <inkml:channel name="Y" type="integer" min="-2.14748E9" max="2.14748E9" units="cm"/>
+          <inkml:channel name="F" type="integer" max="32767" units="dev"/>
+        </inkml:traceFormat>
+        <inkml:channelProperties>
+          <inkml:channelProperty channel="X" name="resolution" value="1000" units="1/cm"/>
+          <inkml:channelProperty channel="Y" name="resolution" value="1000" units="1/cm"/>
+          <inkml:channelProperty channel="F" name="resolution" value="0" units="1/dev"/>
+        </inkml:channelProperties>
+      </inkml:inkSource>
+      <inkml:timestamp xml:id="ts0" timeString="2023-05-06T16:15:22.380"/>
+    </inkml:context>
+    <inkml:brush xml:id="br0">
+      <inkml:brushProperty name="width" value="0.05" units="cm"/>
+      <inkml:brushProperty name="height" value="0.05" units="cm"/>
+    </inkml:brush>
+  </inkml:definitions>
+  <inkml:trace contextRef="#ctx0" brushRef="#br0">20 12 1212,'1'-11'5466,"-5"48"347,-8 97-3725,11-121-1842,0-6-85,0 1 1,0-1-1,1 1 1,0 0 0,0-1-1,1 1 1,0 0-1,1-1 1,2 10-1,-3-16-138,-1 0 1,1 0-1,0 0 0,0 0 0,0 1 0,0-1 1,0 0-1,0-1 0,0 1 0,0 0 0,0 0 1,1 0-1,-1-1 0,0 1 0,0 0 0,1-1 1,-1 0-1,0 1 0,1-1 0,1 1 0,28-1 167,-25-1-161,26-3-168,0-1-1,-1-2 1,1-1-1,-2-1 1,35-16 0,-64 24 97,6-1-166,-1 0-611,1-1-1,-1 0 1,1 0-1,-1 0 1,7-6 0</inkml:trace>
+</inkml:ink>
+</file>
+
+<file path=ppt/ink/ink36.xml><?xml version="1.0" encoding="utf-8"?>
+<inkml:ink xmlns:inkml="http://www.w3.org/2003/InkML">
+  <inkml:definitions>
+    <inkml:context xml:id="ctx0">
+      <inkml:inkSource xml:id="inkSrc0">
+        <inkml:traceFormat>
+          <inkml:channel name="X" type="integer" min="-2.14748E9" max="2.14748E9" units="cm"/>
+          <inkml:channel name="Y" type="integer" min="-2.14748E9" max="2.14748E9" units="cm"/>
+          <inkml:channel name="F" type="integer" max="32767" units="dev"/>
+        </inkml:traceFormat>
+        <inkml:channelProperties>
+          <inkml:channelProperty channel="X" name="resolution" value="1000" units="1/cm"/>
+          <inkml:channelProperty channel="Y" name="resolution" value="1000" units="1/cm"/>
+          <inkml:channelProperty channel="F" name="resolution" value="0" units="1/dev"/>
+        </inkml:channelProperties>
+      </inkml:inkSource>
+      <inkml:timestamp xml:id="ts0" timeString="2023-05-06T16:15:22.722"/>
+    </inkml:context>
+    <inkml:brush xml:id="br0">
+      <inkml:brushProperty name="width" value="0.05" units="cm"/>
+      <inkml:brushProperty name="height" value="0.05" units="cm"/>
+    </inkml:brush>
+  </inkml:definitions>
+  <inkml:trace contextRef="#ctx0" brushRef="#br0">2 3 1444,'-1'-2'957,"1"16"8642,5 80-8544,35 101 835,-16-114-4189,-21-67-6351</inkml:trace>
+</inkml:ink>
+</file>
+
+<file path=ppt/ink/ink37.xml><?xml version="1.0" encoding="utf-8"?>
+<inkml:ink xmlns:inkml="http://www.w3.org/2003/InkML">
+  <inkml:definitions>
+    <inkml:context xml:id="ctx0">
+      <inkml:inkSource xml:id="inkSrc0">
+        <inkml:traceFormat>
+          <inkml:channel name="X" type="integer" min="-2.14748E9" max="2.14748E9" units="cm"/>
+          <inkml:channel name="Y" type="integer" min="-2.14748E9" max="2.14748E9" units="cm"/>
+          <inkml:channel name="F" type="integer" max="32767" units="dev"/>
+        </inkml:traceFormat>
+        <inkml:channelProperties>
+          <inkml:channelProperty channel="X" name="resolution" value="1000" units="1/cm"/>
+          <inkml:channelProperty channel="Y" name="resolution" value="1000" units="1/cm"/>
+          <inkml:channelProperty channel="F" name="resolution" value="0" units="1/dev"/>
+        </inkml:channelProperties>
+      </inkml:inkSource>
+      <inkml:timestamp xml:id="ts0" timeString="2023-05-06T16:15:23.288"/>
+    </inkml:context>
+    <inkml:brush xml:id="br0">
+      <inkml:brushProperty name="width" value="0.05" units="cm"/>
+      <inkml:brushProperty name="height" value="0.05" units="cm"/>
+    </inkml:brush>
+  </inkml:definitions>
+  <inkml:trace contextRef="#ctx0" brushRef="#br0">15 91 1044,'-4'34'2570,"2"1"1,2 38-1,1-33-718,-1-38-716,-1 0-807,-1 6 175,-1-14 545,1-16 272,2 19-1668,-2-18 622,4 8-42,-1 11-212,0-7 114,0-1 0,1 1 0,3-12 1,-4 18-111,0 0 0,0 1 1,1-1-1,-1 0 0,1 1 0,-1 0 1,1-1-1,0 1 0,0 0 1,0 0-1,0 0 0,0 0 1,1 0-1,-1 0 0,4-1 0,-5 2-13,1 1-1,0-1 1,-1 1-1,1 0 1,0-1-1,-1 1 0,1 0 1,0 0-1,0 0 1,-1 0-1,1 1 1,0-1-1,-1 0 0,1 1 1,0 0-1,-1-1 1,4 2-1,-3-1-17,4 2 22,0 1-1,0-1 1,-1 1-1,1 0 1,-1 1-1,0-1 1,0 1-1,0 0 0,-1 1 1,0-1-1,0 1 1,5 9-1,6 1 130,-14-15-41,2-5-98,7-9 11,0-1 0,-1 0 0,10-24 1,-10 20-10,0 1 0,2 0 1,13-17-1,-21 29-13,0 1-1,0 0 1,1 0 0,-1 1 0,1-1-1,0 1 1,0-1 0,0 1 0,1 1-1,-1-1 1,1 1 0,0-1 0,-1 1-1,10-2 1,-13 4 4,1 0-1,-1 0 0,1 0 1,-1 0-1,1 0 0,-1 1 1,0-1-1,1 1 0,-1-1 1,1 1-1,-1-1 0,0 1 1,0 0-1,1-1 0,-1 1 1,0 0-1,0 0 0,0 0 1,2 2-1,15 21-316,-8-8-545,-2 2 0,0-1 0,11 34 0,-6-12-4863,-8-25 2443</inkml:trace>
+</inkml:ink>
+</file>
+
+<file path=ppt/ink/ink38.xml><?xml version="1.0" encoding="utf-8"?>
+<inkml:ink xmlns:inkml="http://www.w3.org/2003/InkML">
+  <inkml:definitions>
+    <inkml:context xml:id="ctx0">
+      <inkml:inkSource xml:id="inkSrc0">
+        <inkml:traceFormat>
+          <inkml:channel name="X" type="integer" min="-2.14748E9" max="2.14748E9" units="cm"/>
+          <inkml:channel name="Y" type="integer" min="-2.14748E9" max="2.14748E9" units="cm"/>
+          <inkml:channel name="F" type="integer" max="32767" units="dev"/>
+        </inkml:traceFormat>
+        <inkml:channelProperties>
+          <inkml:channelProperty channel="X" name="resolution" value="1000" units="1/cm"/>
+          <inkml:channelProperty channel="Y" name="resolution" value="1000" units="1/cm"/>
+          <inkml:channelProperty channel="F" name="resolution" value="0" units="1/dev"/>
+        </inkml:channelProperties>
+      </inkml:inkSource>
+      <inkml:timestamp xml:id="ts0" timeString="2023-05-06T16:15:23.659"/>
+    </inkml:context>
+    <inkml:brush xml:id="br0">
+      <inkml:brushProperty name="width" value="0.05" units="cm"/>
+      <inkml:brushProperty name="height" value="0.05" units="cm"/>
+    </inkml:brush>
+  </inkml:definitions>
+  <inkml:trace contextRef="#ctx0" brushRef="#br0">0 0 1352,'0'0'7499,"1"11"-6949,5 41 455,16 60-1,15 63 156,-34-150-2121,0 24 0,-6-29-3470,2-17 1650</inkml:trace>
+</inkml:ink>
+</file>
+
+<file path=ppt/ink/ink39.xml><?xml version="1.0" encoding="utf-8"?>
+<inkml:ink xmlns:inkml="http://www.w3.org/2003/InkML">
+  <inkml:definitions>
+    <inkml:context xml:id="ctx0">
+      <inkml:inkSource xml:id="inkSrc0">
+        <inkml:traceFormat>
+          <inkml:channel name="X" type="integer" min="-2.14748E9" max="2.14748E9" units="cm"/>
+          <inkml:channel name="Y" type="integer" min="-2.14748E9" max="2.14748E9" units="cm"/>
+          <inkml:channel name="F" type="integer" max="32767" units="dev"/>
+        </inkml:traceFormat>
+        <inkml:channelProperties>
+          <inkml:channelProperty channel="X" name="resolution" value="1000" units="1/cm"/>
+          <inkml:channelProperty channel="Y" name="resolution" value="1000" units="1/cm"/>
+          <inkml:channelProperty channel="F" name="resolution" value="0" units="1/dev"/>
+        </inkml:channelProperties>
+      </inkml:inkSource>
+      <inkml:timestamp xml:id="ts0" timeString="2023-05-06T16:15:24.001"/>
+    </inkml:context>
+    <inkml:brush xml:id="br0">
+      <inkml:brushProperty name="width" value="0.05" units="cm"/>
+      <inkml:brushProperty name="height" value="0.05" units="cm"/>
+    </inkml:brush>
+  </inkml:definitions>
+  <inkml:trace contextRef="#ctx0" brushRef="#br0">1 142 1288,'3'-11'948,"-2"9"-94,-1-1-92,2-2-306,0 0 0,0 0 0,1 1 0,0-1-1,-1 0 1,1 1 0,1 0 0,-1 0 0,1 0 0,6-6 0,0 2 129,0 0-1,0 1 1,15-8 0,-23 14-528,10-6 348,1 1-1,0 0 1,13-4-1,-24 9-276,1 1-71,-1-1 0,1 1 0,-1 0 0,0 0 0,1 0 0,-1 0 1,1 0-1,-1 1 0,5 0 0,-7-1-89,1 0 39,-1 1-1,1-1 1,-1 0 0,1 0-1,-1 1 1,1-1 0,-1 0-1,1 1 1,-1-1-1,1 0 1,-1 1 0,1-1-1,-1 1 1,0-1 0,1 0-1,-1 1 1,0-1 0,1 1-1,-1-1 1,0 1 0,0 0-1,0-1 1,1 1 0,-1-1-1,0 1 1,0 1 0,0 18 112,-3 7-56,-2 0 0,-10 30 0,8-31-17,1 1-1,1 0 1,-3 36-1,8-54-32,1 1-1,0 0 1,0 0-1,1 0 1,1-1-1,-1 1 1,1-1-1,1 1 1,0-1 0,0 0-1,1-1 1,6 10-1,8 7 18,0 0 1,34 30-1,-37-38 3,-15-16-31,-1-1 1,0 0 0,1 1-1,-1-1 1,0 1-1,1-1 1,-1 1 0,0-1-1,0 1 1,1-1-1,-1 1 1,0-1 0,0 1-1,0-1 1,0 1 0,0-1-1,0 1 1,0-1-1,1 1 1,-2-1 0,1 1-1,0-1 1,0 1-1,0-1 1,0 1 0,0 0-1,0-1 1,0 1 0,-1-1-1,1 0 1,0 1-1,-1-1 1,1 1 0,0-1-1,0 1 1,-1-1-1,1 0 1,-1 1 0,0 0-1,-16 9-2,8-7-329,1 0-1,-1-1 1,1 0-1,-1-1 1,0 0-1,0 0 1,-13-1-1,6-4-3650,13 2 2946</inkml:trace>
+</inkml:ink>
+</file>
+
 <file path=ppt/ink/ink4.xml><?xml version="1.0" encoding="utf-8"?>
 <inkml:ink xmlns:inkml="http://www.w3.org/2003/InkML">
   <inkml:definitions>
@@ -651,6 +1052,276 @@
     </inkml:brush>
   </inkml:definitions>
   <inkml:trace contextRef="#ctx0" brushRef="#br0">16 197 1144,'0'0'2087,"-16"-4"9747,17 12-11709,0 0-1,0 0 0,0 0 0,1 0 0,0 0 0,1 0 1,0-1-1,0 1 0,8 13 0,-8-16-59,1 1-1,-1 0 0,1-1 1,0 0-1,1 0 0,-1 0 1,1 0-1,0-1 0,0 1 1,0-1-1,1-1 1,-1 1-1,9 3 0,-2-4 2,0 0-1,1-1 1,-1 0 0,0-1-1,1 0 1,0-1-1,-1 0 1,1-1-1,-1 0 1,23-7 0,10-4 88,64-27 1,138-80 128,-137 62-179,-35 18-179,39-19 245,-36 27-3717</inkml:trace>
+</inkml:ink>
+</file>
+
+<file path=ppt/ink/ink40.xml><?xml version="1.0" encoding="utf-8"?>
+<inkml:ink xmlns:inkml="http://www.w3.org/2003/InkML">
+  <inkml:definitions>
+    <inkml:context xml:id="ctx0">
+      <inkml:inkSource xml:id="inkSrc0">
+        <inkml:traceFormat>
+          <inkml:channel name="X" type="integer" min="-2.14748E9" max="2.14748E9" units="cm"/>
+          <inkml:channel name="Y" type="integer" min="-2.14748E9" max="2.14748E9" units="cm"/>
+          <inkml:channel name="F" type="integer" max="32767" units="dev"/>
+        </inkml:traceFormat>
+        <inkml:channelProperties>
+          <inkml:channelProperty channel="X" name="resolution" value="1000" units="1/cm"/>
+          <inkml:channelProperty channel="Y" name="resolution" value="1000" units="1/cm"/>
+          <inkml:channelProperty channel="F" name="resolution" value="0" units="1/dev"/>
+        </inkml:channelProperties>
+      </inkml:inkSource>
+      <inkml:timestamp xml:id="ts0" timeString="2023-05-06T16:15:24.837"/>
+    </inkml:context>
+    <inkml:brush xml:id="br0">
+      <inkml:brushProperty name="width" value="0.05" units="cm"/>
+      <inkml:brushProperty name="height" value="0.05" units="cm"/>
+    </inkml:brush>
+  </inkml:definitions>
+  <inkml:trace contextRef="#ctx0" brushRef="#br0">17 235 1236,'0'0'1499,"-3"0"-135,-11 1 8244,23-5-9276,147-39 707,-91 27-566,78-30 0,-118 37-351,-9 3 442,27-14-1,-41 19-513,-1 0 0,0 0-1,0 0 1,0 0 0,0 0 0,0-1 0,0 1 0,0 0 0,0 0 0,0-1-1,-1 1 1,1-1 0,0 1 0,-1 0 0,1-1 0,-1 1 0,0-1-1,1 1 1,-1-1 0,0 0 0,0 1 0,0-3 0,0 1 85,-9-10-30,7 11-57,-2-2 80,1 0-1,0 1 1,0-2 0,0 1 0,0 0 0,1-1 0,-3-4-1,4 7 75,7 5-190,18 7 6,-21-8-10,-1-1 0,1 1 0,-1-1 0,0 1 0,0 0 0,0 0-1,0 0 1,0 0 0,0 0 0,0 1 0,0-1 0,-1 0-1,1 1 1,-1 0 0,0-1 0,0 1 0,0 0 0,1 5 0,1-1 12,-2-2-16,0 0 0,0 0-1,-1 0 1,1 0 0,-1 0 0,0 1 0,0-1 0,-1 0 0,-2 9-1,1-3-244,-1-1 0,0 1 0,-7 14 0,4-15-898,0 0 0,-14 16 0,3-3-4860,7-9 1433</inkml:trace>
+</inkml:ink>
+</file>
+
+<file path=ppt/ink/ink41.xml><?xml version="1.0" encoding="utf-8"?>
+<inkml:ink xmlns:inkml="http://www.w3.org/2003/InkML">
+  <inkml:definitions>
+    <inkml:context xml:id="ctx0">
+      <inkml:inkSource xml:id="inkSrc0">
+        <inkml:traceFormat>
+          <inkml:channel name="X" type="integer" min="-2.14748E9" max="2.14748E9" units="cm"/>
+          <inkml:channel name="Y" type="integer" min="-2.14748E9" max="2.14748E9" units="cm"/>
+          <inkml:channel name="F" type="integer" max="32767" units="dev"/>
+        </inkml:traceFormat>
+        <inkml:channelProperties>
+          <inkml:channelProperty channel="X" name="resolution" value="1000" units="1/cm"/>
+          <inkml:channelProperty channel="Y" name="resolution" value="1000" units="1/cm"/>
+          <inkml:channelProperty channel="F" name="resolution" value="0" units="1/dev"/>
+        </inkml:channelProperties>
+      </inkml:inkSource>
+      <inkml:timestamp xml:id="ts0" timeString="2023-05-06T16:15:25.309"/>
+    </inkml:context>
+    <inkml:brush xml:id="br0">
+      <inkml:brushProperty name="width" value="0.05" units="cm"/>
+      <inkml:brushProperty name="height" value="0.05" units="cm"/>
+    </inkml:brush>
+  </inkml:definitions>
+  <inkml:trace contextRef="#ctx0" brushRef="#br0">1 122 876,'0'0'1290,"0"-3"-120,1-5-282,1 1 1,-1 0 0,2-1-1,-1 1 1,4-7 0,-4 9-629,1 0 0,0 0 0,0 0 0,1 1 1,-1-1-1,1 1 0,0 0 0,0 0 1,0 0-1,1 1 0,-1 0 0,8-5 0,-10 7-185,0 0-1,0 0 0,0 0 0,0 0 1,0 0-1,1 1 0,-1-1 0,0 1 0,1-1 1,-1 1-1,0 0 0,1 0 0,-1 0 1,4 0-1,-4 1-40,-1-1 1,1 1 0,-1-1-1,1 1 1,-1 0 0,1-1-1,-1 1 1,0 0 0,1 0-1,-1 0 1,0 0 0,0 1-1,1-1 1,-1 0-1,0 0 1,1 2 0,0 1-1,0 0-1,-1 0 1,1 0 0,-1 0 0,0 0-1,0 0 1,0 0 0,0 1 0,-1-1-1,1 0 1,-1 0 0,-1 1 0,0 5-1,-3 13 37,-2-1 0,-1 0 0,-1 0 0,-18 36-1,17-39-28,-44 83 301,52-100-254,2-1-85,0 0 0,0 0 1,0 0-1,0 0 0,0 0 1,0 0-1,0 0 0,0 0 1,2 1-1,-2-2-1,0 0 0,-1 1 0,1-1-1,0 0 1,-1 1 0,1-1 0,0 0 0,-1 1 0,1-1-1,0 0 1,-1 0 0,1 0 0,0 0 0,0 0 0,-1 0-1,1 0 1,0 0 0,0 0 0,-1 0 0,1 0 0,0-1-1,0 1 1,0 0 2,14-1-37,0 0 0,18-5 1,-15 3-89,0 0-374,55-11-819,-66 12 49,0-1 0,0 1 1,-1-1-1,9-5 1</inkml:trace>
+</inkml:ink>
+</file>
+
+<file path=ppt/ink/ink42.xml><?xml version="1.0" encoding="utf-8"?>
+<inkml:ink xmlns:inkml="http://www.w3.org/2003/InkML">
+  <inkml:definitions>
+    <inkml:context xml:id="ctx0">
+      <inkml:inkSource xml:id="inkSrc0">
+        <inkml:traceFormat>
+          <inkml:channel name="X" type="integer" min="-2.14748E9" max="2.14748E9" units="cm"/>
+          <inkml:channel name="Y" type="integer" min="-2.14748E9" max="2.14748E9" units="cm"/>
+          <inkml:channel name="F" type="integer" max="32767" units="dev"/>
+        </inkml:traceFormat>
+        <inkml:channelProperties>
+          <inkml:channelProperty channel="X" name="resolution" value="1000" units="1/cm"/>
+          <inkml:channelProperty channel="Y" name="resolution" value="1000" units="1/cm"/>
+          <inkml:channelProperty channel="F" name="resolution" value="0" units="1/dev"/>
+        </inkml:channelProperties>
+      </inkml:inkSource>
+      <inkml:timestamp xml:id="ts0" timeString="2023-05-06T16:15:25.693"/>
+    </inkml:context>
+    <inkml:brush xml:id="br0">
+      <inkml:brushProperty name="width" value="0.05" units="cm"/>
+      <inkml:brushProperty name="height" value="0.05" units="cm"/>
+    </inkml:brush>
+  </inkml:definitions>
+  <inkml:trace contextRef="#ctx0" brushRef="#br0">0 179 1660,'0'-23'3172,"0"20"-2321,1-1-102,2-2-493,0-1 0,0 1 0,0 0 0,1 0 0,0 0 0,0 0 0,1 1 0,-1-1 1,1 1-1,0 0 0,1 1 0,-1-1 0,8-4 0,69-52-488,-76 56-230</inkml:trace>
+</inkml:ink>
+</file>
+
+<file path=ppt/ink/ink43.xml><?xml version="1.0" encoding="utf-8"?>
+<inkml:ink xmlns:inkml="http://www.w3.org/2003/InkML">
+  <inkml:definitions>
+    <inkml:context xml:id="ctx0">
+      <inkml:inkSource xml:id="inkSrc0">
+        <inkml:traceFormat>
+          <inkml:channel name="X" type="integer" min="-2.14748E9" max="2.14748E9" units="cm"/>
+          <inkml:channel name="Y" type="integer" min="-2.14748E9" max="2.14748E9" units="cm"/>
+          <inkml:channel name="F" type="integer" max="32767" units="dev"/>
+        </inkml:traceFormat>
+        <inkml:channelProperties>
+          <inkml:channelProperty channel="X" name="resolution" value="1000" units="1/cm"/>
+          <inkml:channelProperty channel="Y" name="resolution" value="1000" units="1/cm"/>
+          <inkml:channelProperty channel="F" name="resolution" value="0" units="1/dev"/>
+        </inkml:channelProperties>
+      </inkml:inkSource>
+      <inkml:timestamp xml:id="ts0" timeString="2023-05-06T16:15:26.023"/>
+    </inkml:context>
+    <inkml:brush xml:id="br0">
+      <inkml:brushProperty name="width" value="0.05" units="cm"/>
+      <inkml:brushProperty name="height" value="0.05" units="cm"/>
+    </inkml:brush>
+  </inkml:definitions>
+  <inkml:trace contextRef="#ctx0" brushRef="#br0">100 0 1124,'0'0'774,"-8"9"1606,-18 31 427,24-37-2679,1 1 0,-1 0 0,1 0 0,0 0 0,0 0 0,1 0 0,-1 0 0,1 0 0,0 0 0,0 0 0,0 0 0,0 0 0,1 0 0,-1 0 0,1 0 0,0 0 0,1 0 0,-1 0 1,1 0-1,2 4 0,4 6 230,0 0 1,2-1-1,18 22 1,-17-22-95,5 4 87,-12-12-176,0-1 0,1 1-1,-2 0 1,1 0 0,0 0-1,-1 1 1,0-1 0,4 11-1,-7-14-36,-1 0-109,0 0 0,0 0-1,0 0 1,0 0 0,0 0-1,-1 0 1,1 0 0,-1 0-1,1-1 1,-1 1 0,0-1-1,0 1 1,-3 1 0,-29 16 121,13-11-313,-37 12-1,49-18-862,0 0 0,0-1 1,-14 1-1</inkml:trace>
+</inkml:ink>
+</file>
+
+<file path=ppt/ink/ink44.xml><?xml version="1.0" encoding="utf-8"?>
+<inkml:ink xmlns:inkml="http://www.w3.org/2003/InkML">
+  <inkml:definitions>
+    <inkml:context xml:id="ctx0">
+      <inkml:inkSource xml:id="inkSrc0">
+        <inkml:traceFormat>
+          <inkml:channel name="X" type="integer" min="-2.14748E9" max="2.14748E9" units="cm"/>
+          <inkml:channel name="Y" type="integer" min="-2.14748E9" max="2.14748E9" units="cm"/>
+          <inkml:channel name="F" type="integer" max="32767" units="dev"/>
+        </inkml:traceFormat>
+        <inkml:channelProperties>
+          <inkml:channelProperty channel="X" name="resolution" value="1000" units="1/cm"/>
+          <inkml:channelProperty channel="Y" name="resolution" value="1000" units="1/cm"/>
+          <inkml:channelProperty channel="F" name="resolution" value="0" units="1/dev"/>
+        </inkml:channelProperties>
+      </inkml:inkSource>
+      <inkml:timestamp xml:id="ts0" timeString="2023-05-06T16:15:26.599"/>
+    </inkml:context>
+    <inkml:brush xml:id="br0">
+      <inkml:brushProperty name="width" value="0.05" units="cm"/>
+      <inkml:brushProperty name="height" value="0.05" units="cm"/>
+    </inkml:brush>
+  </inkml:definitions>
+  <inkml:trace contextRef="#ctx0" brushRef="#br0">110 195 1504,'0'0'843,"2"4"-60,2 6-300,0 1-1,-1 0 1,0 0-1,-1 0 0,0 0 1,0 14-1,6 27 347,-3-30-497,35 148 2212,-39-168-2226,0 1 147,1 1-585,-2-8 2718,-9-46-2082,-6-35 1001,-6-146 1,20 223-1444,1 0 1,1 0 0,0 1 0,0-1 0,0 0 0,1 1 0,0-1 0,1 1 0,0 0 0,5-12 0,-3 12-47,1 0 0,-1 0 0,1 0 1,1 1-1,-1 0 0,1 0 0,0 0 1,1 1-1,-1 0 0,14-6 0,-19 10-20,0 1-5,8-2-14,-7 2 29,0 1-10,16 9 10,-18-6-16,-2-3 1,2 1-4,0 1-1,0 0 1,-1 0-1,0-1 1,1 1-1,-1 0 1,0 0 0,0-1-1,0 1 1,-1 0-1,0 5 1,-12 29 19,10-27-18,-11 27 21,-4 12-19,-13 54 0,31-101-8,0 0 0,-1-1 1,1 1-1,0 0 0,1 0 0,-1 0 0,0 0 0,0 0 1,1 0-1,-1-1 0,1 1 0,0 0 0,-1 0 0,1-1 1,0 1-1,2 2 0,18 20-88,-21-23 94,16 12-58,1 0 0,1-1 0,-1-1 1,21 10-1,27 17-267,-64-37 306,1-1 0,-1 1-1,0 0 1,1 0 0,-1 0-1,0 0 1,0 0 0,0 0-1,0 1 1,0-1 0,0 0 0,0 0-1,0 1 1,0-1 0,-1 1-1,1-1 1,0 1 0,-1-1-1,0 1 1,1-1 0,-1 1-1,0-1 1,1 1 0,-1 2 0,-1-3-106,-4 2-14,-10 4 12,-1 0 1,0-1-1,-28 6 1,-59 7-510,86-16 501,-105 11-1140,103-14-131,0 0 0,-24-4 0,31 1-1703</inkml:trace>
+</inkml:ink>
+</file>
+
+<file path=ppt/ink/ink45.xml><?xml version="1.0" encoding="utf-8"?>
+<inkml:ink xmlns:inkml="http://www.w3.org/2003/InkML">
+  <inkml:definitions>
+    <inkml:context xml:id="ctx0">
+      <inkml:inkSource xml:id="inkSrc0">
+        <inkml:traceFormat>
+          <inkml:channel name="X" type="integer" min="-2.14748E9" max="2.14748E9" units="cm"/>
+          <inkml:channel name="Y" type="integer" min="-2.14748E9" max="2.14748E9" units="cm"/>
+          <inkml:channel name="F" type="integer" max="32767" units="dev"/>
+        </inkml:traceFormat>
+        <inkml:channelProperties>
+          <inkml:channelProperty channel="X" name="resolution" value="1000" units="1/cm"/>
+          <inkml:channelProperty channel="Y" name="resolution" value="1000" units="1/cm"/>
+          <inkml:channelProperty channel="F" name="resolution" value="0" units="1/dev"/>
+        </inkml:channelProperties>
+      </inkml:inkSource>
+      <inkml:timestamp xml:id="ts0" timeString="2023-05-06T16:15:26.939"/>
+    </inkml:context>
+    <inkml:brush xml:id="br0">
+      <inkml:brushProperty name="width" value="0.05" units="cm"/>
+      <inkml:brushProperty name="height" value="0.05" units="cm"/>
+    </inkml:brush>
+  </inkml:definitions>
+  <inkml:trace contextRef="#ctx0" brushRef="#br0">1 0 1856,'0'0'4983,"3"4"-4123,1 1-659,0 0-1,-1 0 1,0 0 0,0 1 0,0-1 0,-1 1 0,0-1 0,0 1 0,0 0-1,1 7 1,11 50 721,3 6-171,-4 1-1,9 114 0,-18-144-1231,-2-21-842,0 4-3343,-1-5 1691</inkml:trace>
+</inkml:ink>
+</file>
+
+<file path=ppt/ink/ink46.xml><?xml version="1.0" encoding="utf-8"?>
+<inkml:ink xmlns:inkml="http://www.w3.org/2003/InkML">
+  <inkml:definitions>
+    <inkml:context xml:id="ctx0">
+      <inkml:inkSource xml:id="inkSrc0">
+        <inkml:traceFormat>
+          <inkml:channel name="X" type="integer" min="-2.14748E9" max="2.14748E9" units="cm"/>
+          <inkml:channel name="Y" type="integer" min="-2.14748E9" max="2.14748E9" units="cm"/>
+          <inkml:channel name="F" type="integer" max="32767" units="dev"/>
+        </inkml:traceFormat>
+        <inkml:channelProperties>
+          <inkml:channelProperty channel="X" name="resolution" value="1000" units="1/cm"/>
+          <inkml:channelProperty channel="Y" name="resolution" value="1000" units="1/cm"/>
+          <inkml:channelProperty channel="F" name="resolution" value="0" units="1/dev"/>
+        </inkml:channelProperties>
+      </inkml:inkSource>
+      <inkml:timestamp xml:id="ts0" timeString="2023-05-06T16:15:27.312"/>
+    </inkml:context>
+    <inkml:brush xml:id="br0">
+      <inkml:brushProperty name="width" value="0.05" units="cm"/>
+      <inkml:brushProperty name="height" value="0.05" units="cm"/>
+    </inkml:brush>
+  </inkml:definitions>
+  <inkml:trace contextRef="#ctx0" brushRef="#br0">41 4 1500,'0'0'970,"-1"-1"-857,1 1 0,0 0 0,-1-1 0,1 1 0,0 0 0,-1 0 0,1 0 0,-1-1 0,1 1 0,-1 0 0,1 0 0,0 0 0,-1 0 0,1 0 0,-1 0 0,1 0 1,-1 0-1,1 0 0,0 0 0,-1 0 0,1 0 0,-1 0 0,1 0 0,-1 0 0,1 0 0,-1 0 0,1 1 0,0-1 0,-1 0 0,1 0 0,0 1 0,-1-1 0,1 0 1,-1 1-1,-2 3 80,-14 20 833,16-22-961,0-1 0,1 1 0,-1-1 0,1 1 0,-1 0 0,1-1 0,0 1 0,0-1 0,0 1 0,0 0 0,0-1 0,0 3 0,0 4 88,-1 4 96,1 1-1,0-1 1,0 1-1,2-1 1,-1 0-1,1 1 1,8 22-1,-8-29-165,0-1 0,0 1 0,1-1 0,0 0 0,0 0 0,0 0 0,0 0 0,1 0-1,0-1 1,0 0 0,0 0 0,0 0 0,1 0 0,0-1 0,0 1 0,0-1 0,0 0 0,0-1 0,7 3-1,9-1 326,-19-4-379,-1 0 1,0 0-1,0 0 1,0 0-1,1 0 1,-1-1-1,0 1 1,0 0-1,0-1 1,0 1-1,0-1 1,0 1-1,0-1 1,0 1-1,0-1 1,0 0-1,0 1 1,0-1-1,0 0 1,0 0-1,1-1 1,0-2 5,-1-1 0,1 1 0,-1-1 0,1 1 0,-1-1 1,-1 0-1,1 1 0,-1-1 0,1 0 0,-2 1 0,1-1 0,0 0 1,-1 1-1,0-1 0,0 1 0,0-1 0,0 1 0,-3-6 1,-2-5-145,-1-1 1,-1 1-1,-17-27 1,1 14-1034,6 10-3771,16 16 3904,-6-5-1920</inkml:trace>
+</inkml:ink>
+</file>
+
+<file path=ppt/ink/ink47.xml><?xml version="1.0" encoding="utf-8"?>
+<inkml:ink xmlns:inkml="http://www.w3.org/2003/InkML">
+  <inkml:definitions>
+    <inkml:context xml:id="ctx0">
+      <inkml:inkSource xml:id="inkSrc0">
+        <inkml:traceFormat>
+          <inkml:channel name="X" type="integer" min="-2.14748E9" max="2.14748E9" units="cm"/>
+          <inkml:channel name="Y" type="integer" min="-2.14748E9" max="2.14748E9" units="cm"/>
+          <inkml:channel name="F" type="integer" max="32767" units="dev"/>
+        </inkml:traceFormat>
+        <inkml:channelProperties>
+          <inkml:channelProperty channel="X" name="resolution" value="1000" units="1/cm"/>
+          <inkml:channelProperty channel="Y" name="resolution" value="1000" units="1/cm"/>
+          <inkml:channelProperty channel="F" name="resolution" value="0" units="1/dev"/>
+        </inkml:channelProperties>
+      </inkml:inkSource>
+      <inkml:timestamp xml:id="ts0" timeString="2023-05-06T16:15:27.640"/>
+    </inkml:context>
+    <inkml:brush xml:id="br0">
+      <inkml:brushProperty name="width" value="0.05" units="cm"/>
+      <inkml:brushProperty name="height" value="0.05" units="cm"/>
+    </inkml:brush>
+  </inkml:definitions>
+  <inkml:trace contextRef="#ctx0" brushRef="#br0">53 1 1436,'0'0'5365,"-6"4"-4649,-15 12-46,20-16-640,1 1 1,-1-1-1,1 0 1,-1 1-1,1-1 1,-1 0-1,1 1 1,0-1-1,-1 1 1,1-1-1,0 1 1,-1-1-1,1 1 1,0-1-1,0 1 1,-1-1-1,1 1 1,0-1-1,0 1 1,-5 17 310,1 1-1,0-1 1,2 0 0,0 1 0,1-1-1,1 1 1,3 27 0,-1-31-237,0 0 0,2 0 0,-1 0 0,2 0-1,0 0 1,1-1 0,0 0 0,1 0 0,16 24 0,-18-32-187,0-1 0,0 1 0,8 7 0,7 0-1287,-17-12 776,-1 0 1,0-1 0,1 1 0,0 0 0,-1-1 0,1 0 0,3 1 0,15-1-2138</inkml:trace>
+</inkml:ink>
+</file>
+
+<file path=ppt/ink/ink48.xml><?xml version="1.0" encoding="utf-8"?>
+<inkml:ink xmlns:inkml="http://www.w3.org/2003/InkML">
+  <inkml:definitions>
+    <inkml:context xml:id="ctx0">
+      <inkml:inkSource xml:id="inkSrc0">
+        <inkml:traceFormat>
+          <inkml:channel name="X" type="integer" min="-2.14748E9" max="2.14748E9" units="cm"/>
+          <inkml:channel name="Y" type="integer" min="-2.14748E9" max="2.14748E9" units="cm"/>
+          <inkml:channel name="F" type="integer" max="32767" units="dev"/>
+        </inkml:traceFormat>
+        <inkml:channelProperties>
+          <inkml:channelProperty channel="X" name="resolution" value="1000" units="1/cm"/>
+          <inkml:channelProperty channel="Y" name="resolution" value="1000" units="1/cm"/>
+          <inkml:channelProperty channel="F" name="resolution" value="0" units="1/dev"/>
+        </inkml:channelProperties>
+      </inkml:inkSource>
+      <inkml:timestamp xml:id="ts0" timeString="2023-05-06T16:15:28.027"/>
+    </inkml:context>
+    <inkml:brush xml:id="br0">
+      <inkml:brushProperty name="width" value="0.05" units="cm"/>
+      <inkml:brushProperty name="height" value="0.05" units="cm"/>
+    </inkml:brush>
+  </inkml:definitions>
+  <inkml:trace contextRef="#ctx0" brushRef="#br0">13 15 1792,'-1'-2'1019,"-3"-11"3021,3 21-3348,-3 46 346,2 0 1,7 82 0,23 158 611,25 25-182,-49-301-1330,-2-7 202,1-1 0,0 1 0,6 13 0,-8-22 358,3-10-568,4-14-55,0-1 0,-1 0-1,4-24 1,35-179 257,-28 142-254,-7 40-41,1 0 1,2 2-1,2 0 0,33-62 0,-48 103-36,-1 1-1,0-1-1,0 0 1,0 1 0,1-1-1,-1 1 1,0-1 0,1 1-1,-1-1 1,0 1 0,1-1-1,-1 1 1,1-1 0,-1 1-1,1-1 1,-1 1 0,1 0-1,-1-1 1,1 1 0,-1 0-1,1-1 1,-1 1 0,1 0-1,0 0 1,-1 0 0,1-1 0,1 1-1,10 0 7,-9 0 0,-4 6 0,2-1-2,-1-3-2,0 0 1,0-1-1,0 1 1,0 0-1,0 0 1,0-1-1,0 1 0,-1 0 1,1 0-1,0-1 1,-1 1-1,0 0 1,1-1-1,-1 1 0,-1 1 1,-7 15 3,0-1 1,-2 0-1,0 0 1,0-1-1,-20 19 1,7-10 44,-1-1 1,-38 29-1,24-31 173,37-21-207,5 3 10,46 46-48,-23-25-379,-1 2 0,-1 0 0,29 45 0,-41-54-319,1 2-806,-4-3-4356,-2-2 2323</inkml:trace>
+</inkml:ink>
+</file>
+
+<file path=ppt/ink/ink49.xml><?xml version="1.0" encoding="utf-8"?>
+<inkml:ink xmlns:inkml="http://www.w3.org/2003/InkML">
+  <inkml:definitions>
+    <inkml:context xml:id="ctx0">
+      <inkml:inkSource xml:id="inkSrc0">
+        <inkml:traceFormat>
+          <inkml:channel name="X" type="integer" min="-2.14748E9" max="2.14748E9" units="cm"/>
+          <inkml:channel name="Y" type="integer" min="-2.14748E9" max="2.14748E9" units="cm"/>
+          <inkml:channel name="F" type="integer" max="32767" units="dev"/>
+        </inkml:traceFormat>
+        <inkml:channelProperties>
+          <inkml:channelProperty channel="X" name="resolution" value="1000" units="1/cm"/>
+          <inkml:channelProperty channel="Y" name="resolution" value="1000" units="1/cm"/>
+          <inkml:channelProperty channel="F" name="resolution" value="0" units="1/dev"/>
+        </inkml:channelProperties>
+      </inkml:inkSource>
+      <inkml:timestamp xml:id="ts0" timeString="2023-05-06T16:15:28.387"/>
+    </inkml:context>
+    <inkml:brush xml:id="br0">
+      <inkml:brushProperty name="width" value="0.05" units="cm"/>
+      <inkml:brushProperty name="height" value="0.05" units="cm"/>
+    </inkml:brush>
+  </inkml:definitions>
+  <inkml:trace contextRef="#ctx0" brushRef="#br0">155 28 1448,'33'-20'3416,"-32"19"-2816,-1 0-475,0 1 1,0 0-1,-1 0 0,1-1 1,0 1-1,0 0 0,0-1 1,0 1-1,-1 0 1,1 0-1,0-1 0,0 1 1,-1 0-1,1 0 0,0-1 1,0 1-1,-1 0 0,1 0 1,0 0-1,-1 0 1,1-1-1,0 1 0,-1 0 1,1 0-1,0 0 0,-1 0 1,1 0-1,0 0 1,-1 0-1,1 0 0,0 0 1,-1 0-1,1 0 0,0 0 1,-1 0-1,1 0 1,0 0-1,-1 1 0,1-1 1,0 0-1,-1 0 0,-27 10 1035,12-3-963,1 2 0,-17 11 0,28-17-113,-1 1 0,1-1-1,-1 1 1,1 0 0,1 1-1,-1-1 1,0 1 0,1-1-1,0 1 1,0 0 0,1 1-1,-4 8 1,5-10-23,0 1-1,0 0 1,0-1-1,1 1 1,-1 0 0,1-1-1,1 1 1,-1 0 0,1 0-1,-1-1 1,1 1-1,1-1 1,-1 1 0,1-1-1,3 9 1,2-2 64,1 0-1,-1 0 1,2 0 0,0-1 0,12 11-1,-12-12 23,0 1-1,0-1 0,-1 2 0,0-1 0,8 16 0,-11-10 114,-4-13-177,-4 2-136,1-2-56,1 0 1,-1-1-1,0 1 0,0 0 1,-1-1-1,1 1 1,-1-1-1,1 1 0,-1-1 1,0 0-1,0 0 1,1-1-1,-1 1 0,-1 0 1,1-1-1,-3 1 1,-70 22-6060,31-16 2273</inkml:trace>
 </inkml:ink>
 </file>
 
@@ -938,7 +1609,7 @@
           <a:p>
             <a:fld id="{3DF34DBE-5A3D-4342-AD2F-2CD33662AB08}" type="datetimeFigureOut">
               <a:rPr lang="en-IN" smtClean="0"/>
-              <a:t>17-09-2023</a:t>
+              <a:t>23-09-2023</a:t>
             </a:fld>
             <a:endParaRPr lang="en-IN"/>
           </a:p>
@@ -1138,7 +1809,7 @@
           <a:p>
             <a:fld id="{3DF34DBE-5A3D-4342-AD2F-2CD33662AB08}" type="datetimeFigureOut">
               <a:rPr lang="en-IN" smtClean="0"/>
-              <a:t>17-09-2023</a:t>
+              <a:t>23-09-2023</a:t>
             </a:fld>
             <a:endParaRPr lang="en-IN"/>
           </a:p>
@@ -1348,7 +2019,7 @@
           <a:p>
             <a:fld id="{3DF34DBE-5A3D-4342-AD2F-2CD33662AB08}" type="datetimeFigureOut">
               <a:rPr lang="en-IN" smtClean="0"/>
-              <a:t>17-09-2023</a:t>
+              <a:t>23-09-2023</a:t>
             </a:fld>
             <a:endParaRPr lang="en-IN"/>
           </a:p>
@@ -1548,7 +2219,7 @@
           <a:p>
             <a:fld id="{3DF34DBE-5A3D-4342-AD2F-2CD33662AB08}" type="datetimeFigureOut">
               <a:rPr lang="en-IN" smtClean="0"/>
-              <a:t>17-09-2023</a:t>
+              <a:t>23-09-2023</a:t>
             </a:fld>
             <a:endParaRPr lang="en-IN"/>
           </a:p>
@@ -1824,7 +2495,7 @@
           <a:p>
             <a:fld id="{3DF34DBE-5A3D-4342-AD2F-2CD33662AB08}" type="datetimeFigureOut">
               <a:rPr lang="en-IN" smtClean="0"/>
-              <a:t>17-09-2023</a:t>
+              <a:t>23-09-2023</a:t>
             </a:fld>
             <a:endParaRPr lang="en-IN"/>
           </a:p>
@@ -2092,7 +2763,7 @@
           <a:p>
             <a:fld id="{3DF34DBE-5A3D-4342-AD2F-2CD33662AB08}" type="datetimeFigureOut">
               <a:rPr lang="en-IN" smtClean="0"/>
-              <a:t>17-09-2023</a:t>
+              <a:t>23-09-2023</a:t>
             </a:fld>
             <a:endParaRPr lang="en-IN"/>
           </a:p>
@@ -2507,7 +3178,7 @@
           <a:p>
             <a:fld id="{3DF34DBE-5A3D-4342-AD2F-2CD33662AB08}" type="datetimeFigureOut">
               <a:rPr lang="en-IN" smtClean="0"/>
-              <a:t>17-09-2023</a:t>
+              <a:t>23-09-2023</a:t>
             </a:fld>
             <a:endParaRPr lang="en-IN"/>
           </a:p>
@@ -2649,7 +3320,7 @@
           <a:p>
             <a:fld id="{3DF34DBE-5A3D-4342-AD2F-2CD33662AB08}" type="datetimeFigureOut">
               <a:rPr lang="en-IN" smtClean="0"/>
-              <a:t>17-09-2023</a:t>
+              <a:t>23-09-2023</a:t>
             </a:fld>
             <a:endParaRPr lang="en-IN"/>
           </a:p>
@@ -2762,7 +3433,7 @@
           <a:p>
             <a:fld id="{3DF34DBE-5A3D-4342-AD2F-2CD33662AB08}" type="datetimeFigureOut">
               <a:rPr lang="en-IN" smtClean="0"/>
-              <a:t>17-09-2023</a:t>
+              <a:t>23-09-2023</a:t>
             </a:fld>
             <a:endParaRPr lang="en-IN"/>
           </a:p>
@@ -3075,7 +3746,7 @@
           <a:p>
             <a:fld id="{3DF34DBE-5A3D-4342-AD2F-2CD33662AB08}" type="datetimeFigureOut">
               <a:rPr lang="en-IN" smtClean="0"/>
-              <a:t>17-09-2023</a:t>
+              <a:t>23-09-2023</a:t>
             </a:fld>
             <a:endParaRPr lang="en-IN"/>
           </a:p>
@@ -3364,7 +4035,7 @@
           <a:p>
             <a:fld id="{3DF34DBE-5A3D-4342-AD2F-2CD33662AB08}" type="datetimeFigureOut">
               <a:rPr lang="en-IN" smtClean="0"/>
-              <a:t>17-09-2023</a:t>
+              <a:t>23-09-2023</a:t>
             </a:fld>
             <a:endParaRPr lang="en-IN"/>
           </a:p>
@@ -3607,7 +4278,7 @@
           <a:p>
             <a:fld id="{3DF34DBE-5A3D-4342-AD2F-2CD33662AB08}" type="datetimeFigureOut">
               <a:rPr lang="en-IN" smtClean="0"/>
-              <a:t>17-09-2023</a:t>
+              <a:t>23-09-2023</a:t>
             </a:fld>
             <a:endParaRPr lang="en-IN"/>
           </a:p>
@@ -4091,6 +4762,2366 @@
 </p:sld>
 </file>
 
+<file path=ppt/slides/slide10.xml><?xml version="1.0" encoding="utf-8"?>
+<p:sld xmlns:a="http://schemas.openxmlformats.org/drawingml/2006/main" xmlns:r="http://schemas.openxmlformats.org/officeDocument/2006/relationships" xmlns:p="http://schemas.openxmlformats.org/presentationml/2006/main">
+  <p:cSld>
+    <p:spTree>
+      <p:nvGrpSpPr>
+        <p:cNvPr id="1" name=""/>
+        <p:cNvGrpSpPr/>
+        <p:nvPr/>
+      </p:nvGrpSpPr>
+      <p:grpSpPr>
+        <a:xfrm>
+          <a:off x="0" y="0"/>
+          <a:ext cx="0" cy="0"/>
+          <a:chOff x="0" y="0"/>
+          <a:chExt cx="0" cy="0"/>
+        </a:xfrm>
+      </p:grpSpPr>
+      <p:sp>
+        <p:nvSpPr>
+          <p:cNvPr id="2" name="Title 1">
+            <a:extLst>
+              <a:ext uri="{FF2B5EF4-FFF2-40B4-BE49-F238E27FC236}">
+                <a16:creationId xmlns:a16="http://schemas.microsoft.com/office/drawing/2014/main" id="{80C89FB9-C47C-6944-8107-FB40EB10F3CA}"/>
+              </a:ext>
+            </a:extLst>
+          </p:cNvPr>
+          <p:cNvSpPr>
+            <a:spLocks noGrp="1"/>
+          </p:cNvSpPr>
+          <p:nvPr>
+            <p:ph type="title"/>
+          </p:nvPr>
+        </p:nvSpPr>
+        <p:spPr/>
+        <p:txBody>
+          <a:bodyPr/>
+          <a:lstStyle/>
+          <a:p>
+            <a:r>
+              <a:rPr lang="en-US" dirty="0"/>
+              <a:t>Azure Storage Explorer</a:t>
+            </a:r>
+            <a:endParaRPr lang="en-IN" dirty="0"/>
+          </a:p>
+        </p:txBody>
+      </p:sp>
+      <p:sp>
+        <p:nvSpPr>
+          <p:cNvPr id="3" name="Content Placeholder 2">
+            <a:extLst>
+              <a:ext uri="{FF2B5EF4-FFF2-40B4-BE49-F238E27FC236}">
+                <a16:creationId xmlns:a16="http://schemas.microsoft.com/office/drawing/2014/main" id="{1C4E226E-9C75-BF85-2A30-57F90E5B304D}"/>
+              </a:ext>
+            </a:extLst>
+          </p:cNvPr>
+          <p:cNvSpPr>
+            <a:spLocks noGrp="1"/>
+          </p:cNvSpPr>
+          <p:nvPr>
+            <p:ph idx="1"/>
+          </p:nvPr>
+        </p:nvSpPr>
+        <p:spPr/>
+        <p:txBody>
+          <a:bodyPr/>
+          <a:lstStyle/>
+          <a:p>
+            <a:r>
+              <a:rPr lang="en-US" dirty="0"/>
+              <a:t>This is a standalone app from Microsoft that allows you to work with your storage data.</a:t>
+            </a:r>
+          </a:p>
+          <a:p>
+            <a:r>
+              <a:rPr lang="en-IN" dirty="0"/>
+              <a:t>https://azure.microsoft.com/en-us/features/storage-explorer/</a:t>
+            </a:r>
+          </a:p>
+        </p:txBody>
+      </p:sp>
+    </p:spTree>
+    <p:extLst>
+      <p:ext uri="{BB962C8B-B14F-4D97-AF65-F5344CB8AC3E}">
+        <p14:creationId xmlns:p14="http://schemas.microsoft.com/office/powerpoint/2010/main" val="2233206302"/>
+      </p:ext>
+    </p:extLst>
+  </p:cSld>
+  <p:clrMapOvr>
+    <a:masterClrMapping/>
+  </p:clrMapOvr>
+</p:sld>
+</file>
+
+<file path=ppt/slides/slide11.xml><?xml version="1.0" encoding="utf-8"?>
+<p:sld xmlns:a="http://schemas.openxmlformats.org/drawingml/2006/main" xmlns:r="http://schemas.openxmlformats.org/officeDocument/2006/relationships" xmlns:p="http://schemas.openxmlformats.org/presentationml/2006/main">
+  <p:cSld>
+    <p:spTree>
+      <p:nvGrpSpPr>
+        <p:cNvPr id="1" name=""/>
+        <p:cNvGrpSpPr/>
+        <p:nvPr/>
+      </p:nvGrpSpPr>
+      <p:grpSpPr>
+        <a:xfrm>
+          <a:off x="0" y="0"/>
+          <a:ext cx="0" cy="0"/>
+          <a:chOff x="0" y="0"/>
+          <a:chExt cx="0" cy="0"/>
+        </a:xfrm>
+      </p:grpSpPr>
+      <p:sp>
+        <p:nvSpPr>
+          <p:cNvPr id="2" name="Title 1">
+            <a:extLst>
+              <a:ext uri="{FF2B5EF4-FFF2-40B4-BE49-F238E27FC236}">
+                <a16:creationId xmlns:a16="http://schemas.microsoft.com/office/drawing/2014/main" id="{3674CC19-33FF-3347-15E5-E733C8869CB3}"/>
+              </a:ext>
+            </a:extLst>
+          </p:cNvPr>
+          <p:cNvSpPr>
+            <a:spLocks noGrp="1"/>
+          </p:cNvSpPr>
+          <p:nvPr>
+            <p:ph type="ctrTitle"/>
+          </p:nvPr>
+        </p:nvSpPr>
+        <p:spPr/>
+        <p:txBody>
+          <a:bodyPr/>
+          <a:lstStyle/>
+          <a:p>
+            <a:r>
+              <a:rPr lang="en-US" dirty="0"/>
+              <a:t>Blob Storage</a:t>
+            </a:r>
+            <a:endParaRPr lang="en-IN" dirty="0"/>
+          </a:p>
+        </p:txBody>
+      </p:sp>
+      <p:sp>
+        <p:nvSpPr>
+          <p:cNvPr id="3" name="Subtitle 2">
+            <a:extLst>
+              <a:ext uri="{FF2B5EF4-FFF2-40B4-BE49-F238E27FC236}">
+                <a16:creationId xmlns:a16="http://schemas.microsoft.com/office/drawing/2014/main" id="{8B19B75A-0EAF-261F-59BC-C0BEC6E5D497}"/>
+              </a:ext>
+            </a:extLst>
+          </p:cNvPr>
+          <p:cNvSpPr>
+            <a:spLocks noGrp="1"/>
+          </p:cNvSpPr>
+          <p:nvPr>
+            <p:ph type="subTitle" idx="1"/>
+          </p:nvPr>
+        </p:nvSpPr>
+        <p:spPr/>
+        <p:txBody>
+          <a:bodyPr/>
+          <a:lstStyle/>
+          <a:p>
+            <a:endParaRPr lang="en-IN"/>
+          </a:p>
+        </p:txBody>
+      </p:sp>
+    </p:spTree>
+    <p:extLst>
+      <p:ext uri="{BB962C8B-B14F-4D97-AF65-F5344CB8AC3E}">
+        <p14:creationId xmlns:p14="http://schemas.microsoft.com/office/powerpoint/2010/main" val="2084365648"/>
+      </p:ext>
+    </p:extLst>
+  </p:cSld>
+  <p:clrMapOvr>
+    <a:masterClrMapping/>
+  </p:clrMapOvr>
+</p:sld>
+</file>
+
+<file path=ppt/slides/slide12.xml><?xml version="1.0" encoding="utf-8"?>
+<p:sld xmlns:a="http://schemas.openxmlformats.org/drawingml/2006/main" xmlns:r="http://schemas.openxmlformats.org/officeDocument/2006/relationships" xmlns:p="http://schemas.openxmlformats.org/presentationml/2006/main">
+  <p:cSld>
+    <p:spTree>
+      <p:nvGrpSpPr>
+        <p:cNvPr id="1" name=""/>
+        <p:cNvGrpSpPr/>
+        <p:nvPr/>
+      </p:nvGrpSpPr>
+      <p:grpSpPr>
+        <a:xfrm>
+          <a:off x="0" y="0"/>
+          <a:ext cx="0" cy="0"/>
+          <a:chOff x="0" y="0"/>
+          <a:chExt cx="0" cy="0"/>
+        </a:xfrm>
+      </p:grpSpPr>
+      <p:sp>
+        <p:nvSpPr>
+          <p:cNvPr id="2" name="Title 1">
+            <a:extLst>
+              <a:ext uri="{FF2B5EF4-FFF2-40B4-BE49-F238E27FC236}">
+                <a16:creationId xmlns:a16="http://schemas.microsoft.com/office/drawing/2014/main" id="{935DE6AB-ED71-8876-17E6-E8C8968CD6C4}"/>
+              </a:ext>
+            </a:extLst>
+          </p:cNvPr>
+          <p:cNvSpPr>
+            <a:spLocks noGrp="1"/>
+          </p:cNvSpPr>
+          <p:nvPr>
+            <p:ph type="title"/>
+          </p:nvPr>
+        </p:nvSpPr>
+        <p:spPr/>
+        <p:txBody>
+          <a:bodyPr/>
+          <a:lstStyle/>
+          <a:p>
+            <a:r>
+              <a:rPr lang="en-US" dirty="0"/>
+              <a:t>Blob Storage</a:t>
+            </a:r>
+            <a:endParaRPr lang="en-IN" dirty="0"/>
+          </a:p>
+        </p:txBody>
+      </p:sp>
+      <p:sp>
+        <p:nvSpPr>
+          <p:cNvPr id="3" name="Content Placeholder 2">
+            <a:extLst>
+              <a:ext uri="{FF2B5EF4-FFF2-40B4-BE49-F238E27FC236}">
+                <a16:creationId xmlns:a16="http://schemas.microsoft.com/office/drawing/2014/main" id="{0F8DD4C8-128B-FF2A-4E41-CE0AFE80ACBE}"/>
+              </a:ext>
+            </a:extLst>
+          </p:cNvPr>
+          <p:cNvSpPr>
+            <a:spLocks noGrp="1"/>
+          </p:cNvSpPr>
+          <p:nvPr>
+            <p:ph idx="1"/>
+          </p:nvPr>
+        </p:nvSpPr>
+        <p:spPr/>
+        <p:txBody>
+          <a:bodyPr/>
+          <a:lstStyle/>
+          <a:p>
+            <a:r>
+              <a:rPr lang="en-US" dirty="0"/>
+              <a:t>Azure blob storage is a service that stores unstructured data as objects/blobs.</a:t>
+            </a:r>
+          </a:p>
+          <a:p>
+            <a:r>
+              <a:rPr lang="en-IN" dirty="0"/>
+              <a:t>Common Uses:</a:t>
+            </a:r>
+          </a:p>
+          <a:p>
+            <a:pPr lvl="1"/>
+            <a:r>
+              <a:rPr lang="en-IN" dirty="0"/>
+              <a:t>Serving images or documents directly to a browser</a:t>
+            </a:r>
+          </a:p>
+          <a:p>
+            <a:pPr lvl="1"/>
+            <a:r>
+              <a:rPr lang="en-IN" dirty="0"/>
+              <a:t>Storing files for distributed access, such as installation</a:t>
+            </a:r>
+          </a:p>
+          <a:p>
+            <a:pPr lvl="1"/>
+            <a:r>
+              <a:rPr lang="en-IN" dirty="0"/>
+              <a:t>Streaming video and audio</a:t>
+            </a:r>
+          </a:p>
+          <a:p>
+            <a:pPr lvl="1"/>
+            <a:r>
+              <a:rPr lang="en-IN" dirty="0"/>
+              <a:t>Storing data for backup and restore, disaster recovery and archiving</a:t>
+            </a:r>
+          </a:p>
+        </p:txBody>
+      </p:sp>
+    </p:spTree>
+    <p:extLst>
+      <p:ext uri="{BB962C8B-B14F-4D97-AF65-F5344CB8AC3E}">
+        <p14:creationId xmlns:p14="http://schemas.microsoft.com/office/powerpoint/2010/main" val="2212311055"/>
+      </p:ext>
+    </p:extLst>
+  </p:cSld>
+  <p:clrMapOvr>
+    <a:masterClrMapping/>
+  </p:clrMapOvr>
+</p:sld>
+</file>
+
+<file path=ppt/slides/slide13.xml><?xml version="1.0" encoding="utf-8"?>
+<p:sld xmlns:a="http://schemas.openxmlformats.org/drawingml/2006/main" xmlns:r="http://schemas.openxmlformats.org/officeDocument/2006/relationships" xmlns:p="http://schemas.openxmlformats.org/presentationml/2006/main">
+  <p:cSld>
+    <p:spTree>
+      <p:nvGrpSpPr>
+        <p:cNvPr id="1" name=""/>
+        <p:cNvGrpSpPr/>
+        <p:nvPr/>
+      </p:nvGrpSpPr>
+      <p:grpSpPr>
+        <a:xfrm>
+          <a:off x="0" y="0"/>
+          <a:ext cx="0" cy="0"/>
+          <a:chOff x="0" y="0"/>
+          <a:chExt cx="0" cy="0"/>
+        </a:xfrm>
+      </p:grpSpPr>
+      <p:sp>
+        <p:nvSpPr>
+          <p:cNvPr id="2" name="Title 1">
+            <a:extLst>
+              <a:ext uri="{FF2B5EF4-FFF2-40B4-BE49-F238E27FC236}">
+                <a16:creationId xmlns:a16="http://schemas.microsoft.com/office/drawing/2014/main" id="{2D219322-56C7-90AB-C328-58CB2D7040B2}"/>
+              </a:ext>
+            </a:extLst>
+          </p:cNvPr>
+          <p:cNvSpPr>
+            <a:spLocks noGrp="1"/>
+          </p:cNvSpPr>
+          <p:nvPr>
+            <p:ph type="title"/>
+          </p:nvPr>
+        </p:nvSpPr>
+        <p:spPr/>
+        <p:txBody>
+          <a:bodyPr/>
+          <a:lstStyle/>
+          <a:p>
+            <a:r>
+              <a:rPr lang="en-US" dirty="0"/>
+              <a:t>Blob Service Resources</a:t>
+            </a:r>
+            <a:endParaRPr lang="en-IN" dirty="0"/>
+          </a:p>
+        </p:txBody>
+      </p:sp>
+      <p:sp>
+        <p:nvSpPr>
+          <p:cNvPr id="3" name="Content Placeholder 2">
+            <a:extLst>
+              <a:ext uri="{FF2B5EF4-FFF2-40B4-BE49-F238E27FC236}">
+                <a16:creationId xmlns:a16="http://schemas.microsoft.com/office/drawing/2014/main" id="{493B56DE-E2BB-1337-22F2-F20CB0AE1F7D}"/>
+              </a:ext>
+            </a:extLst>
+          </p:cNvPr>
+          <p:cNvSpPr>
+            <a:spLocks noGrp="1"/>
+          </p:cNvSpPr>
+          <p:nvPr>
+            <p:ph idx="1"/>
+          </p:nvPr>
+        </p:nvSpPr>
+        <p:spPr/>
+        <p:txBody>
+          <a:bodyPr/>
+          <a:lstStyle/>
+          <a:p>
+            <a:r>
+              <a:rPr lang="en-US" dirty="0"/>
+              <a:t>Three types of resources:</a:t>
+            </a:r>
+          </a:p>
+          <a:p>
+            <a:pPr lvl="1"/>
+            <a:r>
+              <a:rPr lang="en-US" dirty="0"/>
+              <a:t>Storage account</a:t>
+            </a:r>
+          </a:p>
+          <a:p>
+            <a:pPr lvl="1"/>
+            <a:r>
+              <a:rPr lang="en-US" dirty="0"/>
+              <a:t>Containers in storage account</a:t>
+            </a:r>
+          </a:p>
+          <a:p>
+            <a:pPr lvl="1"/>
+            <a:r>
+              <a:rPr lang="en-US" dirty="0"/>
+              <a:t>Blobs in a container</a:t>
+            </a:r>
+            <a:endParaRPr lang="en-IN" dirty="0"/>
+          </a:p>
+        </p:txBody>
+      </p:sp>
+      <p:pic>
+        <p:nvPicPr>
+          <p:cNvPr id="1026" name="Picture 2" descr="Azure Blob Storage Metadata 400 Bad Request - Blog IT">
+            <a:extLst>
+              <a:ext uri="{FF2B5EF4-FFF2-40B4-BE49-F238E27FC236}">
+                <a16:creationId xmlns:a16="http://schemas.microsoft.com/office/drawing/2014/main" id="{E0A2F099-67E4-DDE0-E4CF-472A82D8F588}"/>
+              </a:ext>
+            </a:extLst>
+          </p:cNvPr>
+          <p:cNvPicPr>
+            <a:picLocks noChangeAspect="1" noChangeArrowheads="1"/>
+          </p:cNvPicPr>
+          <p:nvPr/>
+        </p:nvPicPr>
+        <p:blipFill>
+          <a:blip r:embed="rId2">
+            <a:extLst>
+              <a:ext uri="{28A0092B-C50C-407E-A947-70E740481C1C}">
+                <a14:useLocalDpi xmlns:a14="http://schemas.microsoft.com/office/drawing/2010/main" val="0"/>
+              </a:ext>
+            </a:extLst>
+          </a:blip>
+          <a:srcRect/>
+          <a:stretch>
+            <a:fillRect/>
+          </a:stretch>
+        </p:blipFill>
+        <p:spPr bwMode="auto">
+          <a:xfrm>
+            <a:off x="6005841" y="3429000"/>
+            <a:ext cx="4802177" cy="2437579"/>
+          </a:xfrm>
+          <a:prstGeom prst="rect">
+            <a:avLst/>
+          </a:prstGeom>
+          <a:noFill/>
+          <a:extLst>
+            <a:ext uri="{909E8E84-426E-40DD-AFC4-6F175D3DCCD1}">
+              <a14:hiddenFill xmlns:a14="http://schemas.microsoft.com/office/drawing/2010/main">
+                <a:solidFill>
+                  <a:srgbClr val="FFFFFF"/>
+                </a:solidFill>
+              </a14:hiddenFill>
+            </a:ext>
+          </a:extLst>
+        </p:spPr>
+      </p:pic>
+      <mc:AlternateContent xmlns:mc="http://schemas.openxmlformats.org/markup-compatibility/2006">
+        <mc:Choice xmlns:p14="http://schemas.microsoft.com/office/powerpoint/2010/main" Requires="p14">
+          <p:contentPart p14:bwMode="auto" r:id="rId3">
+            <p14:nvContentPartPr>
+              <p14:cNvPr id="5" name="Ink 4">
+                <a:extLst>
+                  <a:ext uri="{FF2B5EF4-FFF2-40B4-BE49-F238E27FC236}">
+                    <a16:creationId xmlns:a16="http://schemas.microsoft.com/office/drawing/2014/main" id="{6F021FCD-8289-2A65-E86C-200BEC51A0BF}"/>
+                  </a:ext>
+                </a:extLst>
+              </p14:cNvPr>
+              <p14:cNvContentPartPr/>
+              <p14:nvPr/>
+            </p14:nvContentPartPr>
+            <p14:xfrm>
+              <a:off x="6627687" y="3407801"/>
+              <a:ext cx="293400" cy="88920"/>
+            </p14:xfrm>
+          </p:contentPart>
+        </mc:Choice>
+        <mc:Fallback>
+          <p:pic>
+            <p:nvPicPr>
+              <p:cNvPr id="5" name="Ink 4">
+                <a:extLst>
+                  <a:ext uri="{FF2B5EF4-FFF2-40B4-BE49-F238E27FC236}">
+                    <a16:creationId xmlns:a16="http://schemas.microsoft.com/office/drawing/2014/main" id="{6F021FCD-8289-2A65-E86C-200BEC51A0BF}"/>
+                  </a:ext>
+                </a:extLst>
+              </p:cNvPr>
+              <p:cNvPicPr/>
+              <p:nvPr/>
+            </p:nvPicPr>
+            <p:blipFill>
+              <a:blip r:embed="rId4"/>
+              <a:stretch>
+                <a:fillRect/>
+              </a:stretch>
+            </p:blipFill>
+            <p:spPr>
+              <a:xfrm>
+                <a:off x="6618687" y="3398801"/>
+                <a:ext cx="311040" cy="106560"/>
+              </a:xfrm>
+              <a:prstGeom prst="rect">
+                <a:avLst/>
+              </a:prstGeom>
+            </p:spPr>
+          </p:pic>
+        </mc:Fallback>
+      </mc:AlternateContent>
+      <mc:AlternateContent xmlns:mc="http://schemas.openxmlformats.org/markup-compatibility/2006">
+        <mc:Choice xmlns:p14="http://schemas.microsoft.com/office/powerpoint/2010/main" Requires="p14">
+          <p:contentPart p14:bwMode="auto" r:id="rId5">
+            <p14:nvContentPartPr>
+              <p14:cNvPr id="6" name="Ink 5">
+                <a:extLst>
+                  <a:ext uri="{FF2B5EF4-FFF2-40B4-BE49-F238E27FC236}">
+                    <a16:creationId xmlns:a16="http://schemas.microsoft.com/office/drawing/2014/main" id="{6344F2B5-BAC5-F34A-BC33-2AF609345A75}"/>
+                  </a:ext>
+                </a:extLst>
+              </p14:cNvPr>
+              <p14:cNvContentPartPr/>
+              <p14:nvPr/>
+            </p14:nvContentPartPr>
+            <p14:xfrm>
+              <a:off x="8205567" y="3337961"/>
+              <a:ext cx="313560" cy="128880"/>
+            </p14:xfrm>
+          </p:contentPart>
+        </mc:Choice>
+        <mc:Fallback>
+          <p:pic>
+            <p:nvPicPr>
+              <p:cNvPr id="6" name="Ink 5">
+                <a:extLst>
+                  <a:ext uri="{FF2B5EF4-FFF2-40B4-BE49-F238E27FC236}">
+                    <a16:creationId xmlns:a16="http://schemas.microsoft.com/office/drawing/2014/main" id="{6344F2B5-BAC5-F34A-BC33-2AF609345A75}"/>
+                  </a:ext>
+                </a:extLst>
+              </p:cNvPr>
+              <p:cNvPicPr/>
+              <p:nvPr/>
+            </p:nvPicPr>
+            <p:blipFill>
+              <a:blip r:embed="rId6"/>
+              <a:stretch>
+                <a:fillRect/>
+              </a:stretch>
+            </p:blipFill>
+            <p:spPr>
+              <a:xfrm>
+                <a:off x="8196927" y="3329321"/>
+                <a:ext cx="331200" cy="146520"/>
+              </a:xfrm>
+              <a:prstGeom prst="rect">
+                <a:avLst/>
+              </a:prstGeom>
+            </p:spPr>
+          </p:pic>
+        </mc:Fallback>
+      </mc:AlternateContent>
+      <mc:AlternateContent xmlns:mc="http://schemas.openxmlformats.org/markup-compatibility/2006">
+        <mc:Choice xmlns:p14="http://schemas.microsoft.com/office/powerpoint/2010/main" Requires="p14">
+          <p:contentPart p14:bwMode="auto" r:id="rId7">
+            <p14:nvContentPartPr>
+              <p14:cNvPr id="7" name="Ink 6">
+                <a:extLst>
+                  <a:ext uri="{FF2B5EF4-FFF2-40B4-BE49-F238E27FC236}">
+                    <a16:creationId xmlns:a16="http://schemas.microsoft.com/office/drawing/2014/main" id="{7DC91A83-02FC-8CC2-CF4A-10CA3BC8B830}"/>
+                  </a:ext>
+                </a:extLst>
+              </p14:cNvPr>
+              <p14:cNvContentPartPr/>
+              <p14:nvPr/>
+            </p14:nvContentPartPr>
+            <p14:xfrm>
+              <a:off x="9910527" y="3315281"/>
+              <a:ext cx="402480" cy="181800"/>
+            </p14:xfrm>
+          </p:contentPart>
+        </mc:Choice>
+        <mc:Fallback>
+          <p:pic>
+            <p:nvPicPr>
+              <p:cNvPr id="7" name="Ink 6">
+                <a:extLst>
+                  <a:ext uri="{FF2B5EF4-FFF2-40B4-BE49-F238E27FC236}">
+                    <a16:creationId xmlns:a16="http://schemas.microsoft.com/office/drawing/2014/main" id="{7DC91A83-02FC-8CC2-CF4A-10CA3BC8B830}"/>
+                  </a:ext>
+                </a:extLst>
+              </p:cNvPr>
+              <p:cNvPicPr/>
+              <p:nvPr/>
+            </p:nvPicPr>
+            <p:blipFill>
+              <a:blip r:embed="rId8"/>
+              <a:stretch>
+                <a:fillRect/>
+              </a:stretch>
+            </p:blipFill>
+            <p:spPr>
+              <a:xfrm>
+                <a:off x="9901887" y="3306281"/>
+                <a:ext cx="420120" cy="199440"/>
+              </a:xfrm>
+              <a:prstGeom prst="rect">
+                <a:avLst/>
+              </a:prstGeom>
+            </p:spPr>
+          </p:pic>
+        </mc:Fallback>
+      </mc:AlternateContent>
+    </p:spTree>
+    <p:extLst>
+      <p:ext uri="{BB962C8B-B14F-4D97-AF65-F5344CB8AC3E}">
+        <p14:creationId xmlns:p14="http://schemas.microsoft.com/office/powerpoint/2010/main" val="3414695513"/>
+      </p:ext>
+    </p:extLst>
+  </p:cSld>
+  <p:clrMapOvr>
+    <a:masterClrMapping/>
+  </p:clrMapOvr>
+</p:sld>
+</file>
+
+<file path=ppt/slides/slide14.xml><?xml version="1.0" encoding="utf-8"?>
+<p:sld xmlns:a="http://schemas.openxmlformats.org/drawingml/2006/main" xmlns:r="http://schemas.openxmlformats.org/officeDocument/2006/relationships" xmlns:p="http://schemas.openxmlformats.org/presentationml/2006/main">
+  <p:cSld>
+    <p:spTree>
+      <p:nvGrpSpPr>
+        <p:cNvPr id="1" name=""/>
+        <p:cNvGrpSpPr/>
+        <p:nvPr/>
+      </p:nvGrpSpPr>
+      <p:grpSpPr>
+        <a:xfrm>
+          <a:off x="0" y="0"/>
+          <a:ext cx="0" cy="0"/>
+          <a:chOff x="0" y="0"/>
+          <a:chExt cx="0" cy="0"/>
+        </a:xfrm>
+      </p:grpSpPr>
+      <p:sp>
+        <p:nvSpPr>
+          <p:cNvPr id="2" name="Title 1">
+            <a:extLst>
+              <a:ext uri="{FF2B5EF4-FFF2-40B4-BE49-F238E27FC236}">
+                <a16:creationId xmlns:a16="http://schemas.microsoft.com/office/drawing/2014/main" id="{0BF05B40-AC9A-D9EA-D307-82C02A68F5A8}"/>
+              </a:ext>
+            </a:extLst>
+          </p:cNvPr>
+          <p:cNvSpPr>
+            <a:spLocks noGrp="1"/>
+          </p:cNvSpPr>
+          <p:nvPr>
+            <p:ph type="title"/>
+          </p:nvPr>
+        </p:nvSpPr>
+        <p:spPr/>
+        <p:txBody>
+          <a:bodyPr/>
+          <a:lstStyle/>
+          <a:p>
+            <a:r>
+              <a:rPr lang="en-US" dirty="0"/>
+              <a:t>Public Access Level</a:t>
+            </a:r>
+            <a:endParaRPr lang="en-IN" dirty="0"/>
+          </a:p>
+        </p:txBody>
+      </p:sp>
+      <p:sp>
+        <p:nvSpPr>
+          <p:cNvPr id="3" name="Content Placeholder 2">
+            <a:extLst>
+              <a:ext uri="{FF2B5EF4-FFF2-40B4-BE49-F238E27FC236}">
+                <a16:creationId xmlns:a16="http://schemas.microsoft.com/office/drawing/2014/main" id="{4FD3DF9C-A3EF-6F65-7A2E-7A8ED6AE8302}"/>
+              </a:ext>
+            </a:extLst>
+          </p:cNvPr>
+          <p:cNvSpPr>
+            <a:spLocks noGrp="1"/>
+          </p:cNvSpPr>
+          <p:nvPr>
+            <p:ph idx="1"/>
+          </p:nvPr>
+        </p:nvSpPr>
+        <p:spPr/>
+        <p:txBody>
+          <a:bodyPr/>
+          <a:lstStyle/>
+          <a:p>
+            <a:r>
+              <a:rPr lang="en-US" dirty="0"/>
+              <a:t>Private – no anonymous request to containers and blobs</a:t>
+            </a:r>
+          </a:p>
+          <a:p>
+            <a:r>
+              <a:rPr lang="en-US" dirty="0"/>
+              <a:t>Blob – allow anonymous public read access for blobs only</a:t>
+            </a:r>
+          </a:p>
+          <a:p>
+            <a:r>
+              <a:rPr lang="en-US" dirty="0"/>
+              <a:t>Container – allow anonymous public read and list access to the entire container</a:t>
+            </a:r>
+            <a:endParaRPr lang="en-IN" dirty="0"/>
+          </a:p>
+        </p:txBody>
+      </p:sp>
+    </p:spTree>
+    <p:extLst>
+      <p:ext uri="{BB962C8B-B14F-4D97-AF65-F5344CB8AC3E}">
+        <p14:creationId xmlns:p14="http://schemas.microsoft.com/office/powerpoint/2010/main" val="1895560445"/>
+      </p:ext>
+    </p:extLst>
+  </p:cSld>
+  <p:clrMapOvr>
+    <a:masterClrMapping/>
+  </p:clrMapOvr>
+</p:sld>
+</file>
+
+<file path=ppt/slides/slide15.xml><?xml version="1.0" encoding="utf-8"?>
+<p:sld xmlns:a="http://schemas.openxmlformats.org/drawingml/2006/main" xmlns:r="http://schemas.openxmlformats.org/officeDocument/2006/relationships" xmlns:p="http://schemas.openxmlformats.org/presentationml/2006/main">
+  <p:cSld>
+    <p:spTree>
+      <p:nvGrpSpPr>
+        <p:cNvPr id="1" name=""/>
+        <p:cNvGrpSpPr/>
+        <p:nvPr/>
+      </p:nvGrpSpPr>
+      <p:grpSpPr>
+        <a:xfrm>
+          <a:off x="0" y="0"/>
+          <a:ext cx="0" cy="0"/>
+          <a:chOff x="0" y="0"/>
+          <a:chExt cx="0" cy="0"/>
+        </a:xfrm>
+      </p:grpSpPr>
+      <p:sp>
+        <p:nvSpPr>
+          <p:cNvPr id="2" name="Title 1">
+            <a:extLst>
+              <a:ext uri="{FF2B5EF4-FFF2-40B4-BE49-F238E27FC236}">
+                <a16:creationId xmlns:a16="http://schemas.microsoft.com/office/drawing/2014/main" id="{BE49F736-B953-4D08-3102-1210AFC71DE2}"/>
+              </a:ext>
+            </a:extLst>
+          </p:cNvPr>
+          <p:cNvSpPr>
+            <a:spLocks noGrp="1"/>
+          </p:cNvSpPr>
+          <p:nvPr>
+            <p:ph type="title"/>
+          </p:nvPr>
+        </p:nvSpPr>
+        <p:spPr/>
+        <p:txBody>
+          <a:bodyPr/>
+          <a:lstStyle/>
+          <a:p>
+            <a:r>
+              <a:rPr lang="en-US" dirty="0"/>
+              <a:t>Blob Performance Tiers</a:t>
+            </a:r>
+            <a:endParaRPr lang="en-IN" dirty="0"/>
+          </a:p>
+        </p:txBody>
+      </p:sp>
+      <p:sp>
+        <p:nvSpPr>
+          <p:cNvPr id="3" name="Content Placeholder 2">
+            <a:extLst>
+              <a:ext uri="{FF2B5EF4-FFF2-40B4-BE49-F238E27FC236}">
+                <a16:creationId xmlns:a16="http://schemas.microsoft.com/office/drawing/2014/main" id="{CE609485-1476-576A-D28D-DAA4543A0A88}"/>
+              </a:ext>
+            </a:extLst>
+          </p:cNvPr>
+          <p:cNvSpPr>
+            <a:spLocks noGrp="1"/>
+          </p:cNvSpPr>
+          <p:nvPr>
+            <p:ph idx="1"/>
+          </p:nvPr>
+        </p:nvSpPr>
+        <p:spPr/>
+        <p:txBody>
+          <a:bodyPr/>
+          <a:lstStyle/>
+          <a:p>
+            <a:r>
+              <a:rPr lang="en-US" dirty="0"/>
+              <a:t>Hot – Optimized for frequent access of objects in the storage account.</a:t>
+            </a:r>
+          </a:p>
+          <a:p>
+            <a:r>
+              <a:rPr lang="en-US" dirty="0"/>
+              <a:t>Cool – Optimized for storing large amounts of data that is infrequently accessed and store at least for 30 days</a:t>
+            </a:r>
+          </a:p>
+          <a:p>
+            <a:r>
+              <a:rPr lang="en-US" dirty="0"/>
+              <a:t>Archive – Optimized for data that can tolerate several hours of retrieval latency and will remain in the archive tier for at least 180 days</a:t>
+            </a:r>
+            <a:endParaRPr lang="en-IN" dirty="0"/>
+          </a:p>
+        </p:txBody>
+      </p:sp>
+    </p:spTree>
+    <p:extLst>
+      <p:ext uri="{BB962C8B-B14F-4D97-AF65-F5344CB8AC3E}">
+        <p14:creationId xmlns:p14="http://schemas.microsoft.com/office/powerpoint/2010/main" val="4016231475"/>
+      </p:ext>
+    </p:extLst>
+  </p:cSld>
+  <p:clrMapOvr>
+    <a:masterClrMapping/>
+  </p:clrMapOvr>
+</p:sld>
+</file>
+
+<file path=ppt/slides/slide16.xml><?xml version="1.0" encoding="utf-8"?>
+<p:sld xmlns:a="http://schemas.openxmlformats.org/drawingml/2006/main" xmlns:r="http://schemas.openxmlformats.org/officeDocument/2006/relationships" xmlns:p="http://schemas.openxmlformats.org/presentationml/2006/main">
+  <p:cSld>
+    <p:spTree>
+      <p:nvGrpSpPr>
+        <p:cNvPr id="1" name=""/>
+        <p:cNvGrpSpPr/>
+        <p:nvPr/>
+      </p:nvGrpSpPr>
+      <p:grpSpPr>
+        <a:xfrm>
+          <a:off x="0" y="0"/>
+          <a:ext cx="0" cy="0"/>
+          <a:chOff x="0" y="0"/>
+          <a:chExt cx="0" cy="0"/>
+        </a:xfrm>
+      </p:grpSpPr>
+      <p:sp>
+        <p:nvSpPr>
+          <p:cNvPr id="2" name="Title 1">
+            <a:extLst>
+              <a:ext uri="{FF2B5EF4-FFF2-40B4-BE49-F238E27FC236}">
+                <a16:creationId xmlns:a16="http://schemas.microsoft.com/office/drawing/2014/main" id="{CE3CAB04-52BA-BEA9-DF1B-7E3B6F5DD615}"/>
+              </a:ext>
+            </a:extLst>
+          </p:cNvPr>
+          <p:cNvSpPr>
+            <a:spLocks noGrp="1"/>
+          </p:cNvSpPr>
+          <p:nvPr>
+            <p:ph type="title"/>
+          </p:nvPr>
+        </p:nvSpPr>
+        <p:spPr/>
+        <p:txBody>
+          <a:bodyPr/>
+          <a:lstStyle/>
+          <a:p>
+            <a:r>
+              <a:rPr lang="en-US"/>
+              <a:t>Uploading Blobs</a:t>
+            </a:r>
+            <a:endParaRPr lang="en-IN" dirty="0"/>
+          </a:p>
+        </p:txBody>
+      </p:sp>
+      <p:sp>
+        <p:nvSpPr>
+          <p:cNvPr id="3" name="Content Placeholder 2">
+            <a:extLst>
+              <a:ext uri="{FF2B5EF4-FFF2-40B4-BE49-F238E27FC236}">
+                <a16:creationId xmlns:a16="http://schemas.microsoft.com/office/drawing/2014/main" id="{BA9D3E19-D191-1458-7691-1D9B89DF6543}"/>
+              </a:ext>
+            </a:extLst>
+          </p:cNvPr>
+          <p:cNvSpPr>
+            <a:spLocks noGrp="1"/>
+          </p:cNvSpPr>
+          <p:nvPr>
+            <p:ph idx="1"/>
+          </p:nvPr>
+        </p:nvSpPr>
+        <p:spPr/>
+        <p:txBody>
+          <a:bodyPr/>
+          <a:lstStyle/>
+          <a:p>
+            <a:r>
+              <a:rPr lang="en-US" dirty="0"/>
+              <a:t>Block blobs</a:t>
+            </a:r>
+          </a:p>
+          <a:p>
+            <a:r>
+              <a:rPr lang="en-US" dirty="0"/>
+              <a:t>Append Blobs – logging scenarios</a:t>
+            </a:r>
+          </a:p>
+          <a:p>
+            <a:r>
+              <a:rPr lang="en-US" dirty="0"/>
+              <a:t>Page Blobs – 8TB in size. Azure VM disk use page blobs as OS disk and data disk</a:t>
+            </a:r>
+            <a:endParaRPr lang="en-IN" dirty="0"/>
+          </a:p>
+        </p:txBody>
+      </p:sp>
+      <p:grpSp>
+        <p:nvGrpSpPr>
+          <p:cNvPr id="35" name="Group 34">
+            <a:extLst>
+              <a:ext uri="{FF2B5EF4-FFF2-40B4-BE49-F238E27FC236}">
+                <a16:creationId xmlns:a16="http://schemas.microsoft.com/office/drawing/2014/main" id="{926530EF-D1AB-CB51-9C71-27E20E31C1CF}"/>
+              </a:ext>
+            </a:extLst>
+          </p:cNvPr>
+          <p:cNvGrpSpPr/>
+          <p:nvPr/>
+        </p:nvGrpSpPr>
+        <p:grpSpPr>
+          <a:xfrm>
+            <a:off x="7106127" y="422681"/>
+            <a:ext cx="721440" cy="243000"/>
+            <a:chOff x="7106127" y="422681"/>
+            <a:chExt cx="721440" cy="243000"/>
+          </a:xfrm>
+        </p:grpSpPr>
+        <mc:AlternateContent xmlns:mc="http://schemas.openxmlformats.org/markup-compatibility/2006" xmlns:p14="http://schemas.microsoft.com/office/powerpoint/2010/main">
+          <mc:Choice Requires="p14">
+            <p:contentPart p14:bwMode="auto" r:id="rId2">
+              <p14:nvContentPartPr>
+                <p14:cNvPr id="29" name="Ink 28">
+                  <a:extLst>
+                    <a:ext uri="{FF2B5EF4-FFF2-40B4-BE49-F238E27FC236}">
+                      <a16:creationId xmlns:a16="http://schemas.microsoft.com/office/drawing/2014/main" id="{7BEEF0F0-858F-B100-E686-9BB3806D2E90}"/>
+                    </a:ext>
+                  </a:extLst>
+                </p14:cNvPr>
+                <p14:cNvContentPartPr/>
+                <p14:nvPr/>
+              </p14:nvContentPartPr>
+              <p14:xfrm>
+                <a:off x="7106127" y="449681"/>
+                <a:ext cx="85680" cy="198720"/>
+              </p14:xfrm>
+            </p:contentPart>
+          </mc:Choice>
+          <mc:Fallback xmlns="">
+            <p:pic>
+              <p:nvPicPr>
+                <p:cNvPr id="29" name="Ink 28">
+                  <a:extLst>
+                    <a:ext uri="{FF2B5EF4-FFF2-40B4-BE49-F238E27FC236}">
+                      <a16:creationId xmlns:a16="http://schemas.microsoft.com/office/drawing/2014/main" id="{7BEEF0F0-858F-B100-E686-9BB3806D2E90}"/>
+                    </a:ext>
+                  </a:extLst>
+                </p:cNvPr>
+                <p:cNvPicPr/>
+                <p:nvPr/>
+              </p:nvPicPr>
+              <p:blipFill>
+                <a:blip r:embed="rId3"/>
+                <a:stretch>
+                  <a:fillRect/>
+                </a:stretch>
+              </p:blipFill>
+              <p:spPr>
+                <a:xfrm>
+                  <a:off x="7097127" y="440681"/>
+                  <a:ext cx="103320" cy="216360"/>
+                </a:xfrm>
+                <a:prstGeom prst="rect">
+                  <a:avLst/>
+                </a:prstGeom>
+              </p:spPr>
+            </p:pic>
+          </mc:Fallback>
+        </mc:AlternateContent>
+        <mc:AlternateContent xmlns:mc="http://schemas.openxmlformats.org/markup-compatibility/2006" xmlns:p14="http://schemas.microsoft.com/office/powerpoint/2010/main">
+          <mc:Choice Requires="p14">
+            <p:contentPart p14:bwMode="auto" r:id="rId4">
+              <p14:nvContentPartPr>
+                <p14:cNvPr id="30" name="Ink 29">
+                  <a:extLst>
+                    <a:ext uri="{FF2B5EF4-FFF2-40B4-BE49-F238E27FC236}">
+                      <a16:creationId xmlns:a16="http://schemas.microsoft.com/office/drawing/2014/main" id="{E113BD34-538D-A1DD-F5F6-77F6E901B3F7}"/>
+                    </a:ext>
+                  </a:extLst>
+                </p14:cNvPr>
+                <p14:cNvContentPartPr/>
+                <p14:nvPr/>
+              </p14:nvContentPartPr>
+              <p14:xfrm>
+                <a:off x="7212687" y="480641"/>
+                <a:ext cx="72000" cy="105480"/>
+              </p14:xfrm>
+            </p:contentPart>
+          </mc:Choice>
+          <mc:Fallback xmlns="">
+            <p:pic>
+              <p:nvPicPr>
+                <p:cNvPr id="30" name="Ink 29">
+                  <a:extLst>
+                    <a:ext uri="{FF2B5EF4-FFF2-40B4-BE49-F238E27FC236}">
+                      <a16:creationId xmlns:a16="http://schemas.microsoft.com/office/drawing/2014/main" id="{E113BD34-538D-A1DD-F5F6-77F6E901B3F7}"/>
+                    </a:ext>
+                  </a:extLst>
+                </p:cNvPr>
+                <p:cNvPicPr/>
+                <p:nvPr/>
+              </p:nvPicPr>
+              <p:blipFill>
+                <a:blip r:embed="rId5"/>
+                <a:stretch>
+                  <a:fillRect/>
+                </a:stretch>
+              </p:blipFill>
+              <p:spPr>
+                <a:xfrm>
+                  <a:off x="7203687" y="472001"/>
+                  <a:ext cx="89640" cy="123120"/>
+                </a:xfrm>
+                <a:prstGeom prst="rect">
+                  <a:avLst/>
+                </a:prstGeom>
+              </p:spPr>
+            </p:pic>
+          </mc:Fallback>
+        </mc:AlternateContent>
+        <mc:AlternateContent xmlns:mc="http://schemas.openxmlformats.org/markup-compatibility/2006" xmlns:p14="http://schemas.microsoft.com/office/powerpoint/2010/main">
+          <mc:Choice Requires="p14">
+            <p:contentPart p14:bwMode="auto" r:id="rId6">
+              <p14:nvContentPartPr>
+                <p14:cNvPr id="31" name="Ink 30">
+                  <a:extLst>
+                    <a:ext uri="{FF2B5EF4-FFF2-40B4-BE49-F238E27FC236}">
+                      <a16:creationId xmlns:a16="http://schemas.microsoft.com/office/drawing/2014/main" id="{AA0E53A3-0259-F376-F024-D9B1A2194A73}"/>
+                    </a:ext>
+                  </a:extLst>
+                </p14:cNvPr>
+                <p14:cNvContentPartPr/>
+                <p14:nvPr/>
+              </p14:nvContentPartPr>
+              <p14:xfrm>
+                <a:off x="7348407" y="514481"/>
+                <a:ext cx="59760" cy="57960"/>
+              </p14:xfrm>
+            </p:contentPart>
+          </mc:Choice>
+          <mc:Fallback xmlns="">
+            <p:pic>
+              <p:nvPicPr>
+                <p:cNvPr id="31" name="Ink 30">
+                  <a:extLst>
+                    <a:ext uri="{FF2B5EF4-FFF2-40B4-BE49-F238E27FC236}">
+                      <a16:creationId xmlns:a16="http://schemas.microsoft.com/office/drawing/2014/main" id="{AA0E53A3-0259-F376-F024-D9B1A2194A73}"/>
+                    </a:ext>
+                  </a:extLst>
+                </p:cNvPr>
+                <p:cNvPicPr/>
+                <p:nvPr/>
+              </p:nvPicPr>
+              <p:blipFill>
+                <a:blip r:embed="rId7"/>
+                <a:stretch>
+                  <a:fillRect/>
+                </a:stretch>
+              </p:blipFill>
+              <p:spPr>
+                <a:xfrm>
+                  <a:off x="7339407" y="505841"/>
+                  <a:ext cx="77400" cy="75600"/>
+                </a:xfrm>
+                <a:prstGeom prst="rect">
+                  <a:avLst/>
+                </a:prstGeom>
+              </p:spPr>
+            </p:pic>
+          </mc:Fallback>
+        </mc:AlternateContent>
+        <mc:AlternateContent xmlns:mc="http://schemas.openxmlformats.org/markup-compatibility/2006" xmlns:p14="http://schemas.microsoft.com/office/powerpoint/2010/main">
+          <mc:Choice Requires="p14">
+            <p:contentPart p14:bwMode="auto" r:id="rId8">
+              <p14:nvContentPartPr>
+                <p14:cNvPr id="32" name="Ink 31">
+                  <a:extLst>
+                    <a:ext uri="{FF2B5EF4-FFF2-40B4-BE49-F238E27FC236}">
+                      <a16:creationId xmlns:a16="http://schemas.microsoft.com/office/drawing/2014/main" id="{A61F0C40-F06E-A0B3-D597-568194B2A42E}"/>
+                    </a:ext>
+                  </a:extLst>
+                </p14:cNvPr>
+                <p14:cNvContentPartPr/>
+                <p14:nvPr/>
+              </p14:nvContentPartPr>
+              <p14:xfrm>
+                <a:off x="7451007" y="497201"/>
+                <a:ext cx="214920" cy="101160"/>
+              </p14:xfrm>
+            </p:contentPart>
+          </mc:Choice>
+          <mc:Fallback xmlns="">
+            <p:pic>
+              <p:nvPicPr>
+                <p:cNvPr id="32" name="Ink 31">
+                  <a:extLst>
+                    <a:ext uri="{FF2B5EF4-FFF2-40B4-BE49-F238E27FC236}">
+                      <a16:creationId xmlns:a16="http://schemas.microsoft.com/office/drawing/2014/main" id="{A61F0C40-F06E-A0B3-D597-568194B2A42E}"/>
+                    </a:ext>
+                  </a:extLst>
+                </p:cNvPr>
+                <p:cNvPicPr/>
+                <p:nvPr/>
+              </p:nvPicPr>
+              <p:blipFill>
+                <a:blip r:embed="rId9"/>
+                <a:stretch>
+                  <a:fillRect/>
+                </a:stretch>
+              </p:blipFill>
+              <p:spPr>
+                <a:xfrm>
+                  <a:off x="7442007" y="488561"/>
+                  <a:ext cx="232560" cy="118800"/>
+                </a:xfrm>
+                <a:prstGeom prst="rect">
+                  <a:avLst/>
+                </a:prstGeom>
+              </p:spPr>
+            </p:pic>
+          </mc:Fallback>
+        </mc:AlternateContent>
+        <mc:AlternateContent xmlns:mc="http://schemas.openxmlformats.org/markup-compatibility/2006" xmlns:p14="http://schemas.microsoft.com/office/powerpoint/2010/main">
+          <mc:Choice Requires="p14">
+            <p:contentPart p14:bwMode="auto" r:id="rId10">
+              <p14:nvContentPartPr>
+                <p14:cNvPr id="33" name="Ink 32">
+                  <a:extLst>
+                    <a:ext uri="{FF2B5EF4-FFF2-40B4-BE49-F238E27FC236}">
+                      <a16:creationId xmlns:a16="http://schemas.microsoft.com/office/drawing/2014/main" id="{10772A26-0FB6-36B8-3532-5D1C959FC772}"/>
+                    </a:ext>
+                  </a:extLst>
+                </p14:cNvPr>
+                <p14:cNvContentPartPr/>
+                <p14:nvPr/>
+              </p14:nvContentPartPr>
+              <p14:xfrm>
+                <a:off x="7695807" y="471281"/>
+                <a:ext cx="48600" cy="164880"/>
+              </p14:xfrm>
+            </p:contentPart>
+          </mc:Choice>
+          <mc:Fallback xmlns="">
+            <p:pic>
+              <p:nvPicPr>
+                <p:cNvPr id="33" name="Ink 32">
+                  <a:extLst>
+                    <a:ext uri="{FF2B5EF4-FFF2-40B4-BE49-F238E27FC236}">
+                      <a16:creationId xmlns:a16="http://schemas.microsoft.com/office/drawing/2014/main" id="{10772A26-0FB6-36B8-3532-5D1C959FC772}"/>
+                    </a:ext>
+                  </a:extLst>
+                </p:cNvPr>
+                <p:cNvPicPr/>
+                <p:nvPr/>
+              </p:nvPicPr>
+              <p:blipFill>
+                <a:blip r:embed="rId11"/>
+                <a:stretch>
+                  <a:fillRect/>
+                </a:stretch>
+              </p:blipFill>
+              <p:spPr>
+                <a:xfrm>
+                  <a:off x="7686807" y="462281"/>
+                  <a:ext cx="66240" cy="182520"/>
+                </a:xfrm>
+                <a:prstGeom prst="rect">
+                  <a:avLst/>
+                </a:prstGeom>
+              </p:spPr>
+            </p:pic>
+          </mc:Fallback>
+        </mc:AlternateContent>
+        <mc:AlternateContent xmlns:mc="http://schemas.openxmlformats.org/markup-compatibility/2006" xmlns:p14="http://schemas.microsoft.com/office/powerpoint/2010/main">
+          <mc:Choice Requires="p14">
+            <p:contentPart p14:bwMode="auto" r:id="rId12">
+              <p14:nvContentPartPr>
+                <p14:cNvPr id="34" name="Ink 33">
+                  <a:extLst>
+                    <a:ext uri="{FF2B5EF4-FFF2-40B4-BE49-F238E27FC236}">
+                      <a16:creationId xmlns:a16="http://schemas.microsoft.com/office/drawing/2014/main" id="{1EC97636-1DAF-FEE8-5633-F39E04A5D0AA}"/>
+                    </a:ext>
+                  </a:extLst>
+                </p14:cNvPr>
+                <p14:cNvContentPartPr/>
+                <p14:nvPr/>
+              </p14:nvContentPartPr>
+              <p14:xfrm>
+                <a:off x="7686087" y="422681"/>
+                <a:ext cx="141480" cy="243000"/>
+              </p14:xfrm>
+            </p:contentPart>
+          </mc:Choice>
+          <mc:Fallback xmlns="">
+            <p:pic>
+              <p:nvPicPr>
+                <p:cNvPr id="34" name="Ink 33">
+                  <a:extLst>
+                    <a:ext uri="{FF2B5EF4-FFF2-40B4-BE49-F238E27FC236}">
+                      <a16:creationId xmlns:a16="http://schemas.microsoft.com/office/drawing/2014/main" id="{1EC97636-1DAF-FEE8-5633-F39E04A5D0AA}"/>
+                    </a:ext>
+                  </a:extLst>
+                </p:cNvPr>
+                <p:cNvPicPr/>
+                <p:nvPr/>
+              </p:nvPicPr>
+              <p:blipFill>
+                <a:blip r:embed="rId13"/>
+                <a:stretch>
+                  <a:fillRect/>
+                </a:stretch>
+              </p:blipFill>
+              <p:spPr>
+                <a:xfrm>
+                  <a:off x="7677087" y="413681"/>
+                  <a:ext cx="159120" cy="260640"/>
+                </a:xfrm>
+                <a:prstGeom prst="rect">
+                  <a:avLst/>
+                </a:prstGeom>
+              </p:spPr>
+            </p:pic>
+          </mc:Fallback>
+        </mc:AlternateContent>
+      </p:grpSp>
+      <p:grpSp>
+        <p:nvGrpSpPr>
+          <p:cNvPr id="58" name="Group 57">
+            <a:extLst>
+              <a:ext uri="{FF2B5EF4-FFF2-40B4-BE49-F238E27FC236}">
+                <a16:creationId xmlns:a16="http://schemas.microsoft.com/office/drawing/2014/main" id="{EFCFBED7-2F7C-0F1F-8DF0-43A1B892C14D}"/>
+              </a:ext>
+            </a:extLst>
+          </p:cNvPr>
+          <p:cNvGrpSpPr/>
+          <p:nvPr/>
+        </p:nvGrpSpPr>
+        <p:grpSpPr>
+          <a:xfrm>
+            <a:off x="7409247" y="841001"/>
+            <a:ext cx="533520" cy="210960"/>
+            <a:chOff x="7409247" y="841001"/>
+            <a:chExt cx="533520" cy="210960"/>
+          </a:xfrm>
+        </p:grpSpPr>
+        <mc:AlternateContent xmlns:mc="http://schemas.openxmlformats.org/markup-compatibility/2006" xmlns:p14="http://schemas.microsoft.com/office/powerpoint/2010/main">
+          <mc:Choice Requires="p14">
+            <p:contentPart p14:bwMode="auto" r:id="rId14">
+              <p14:nvContentPartPr>
+                <p14:cNvPr id="42" name="Ink 41">
+                  <a:extLst>
+                    <a:ext uri="{FF2B5EF4-FFF2-40B4-BE49-F238E27FC236}">
+                      <a16:creationId xmlns:a16="http://schemas.microsoft.com/office/drawing/2014/main" id="{1556138C-1B3D-CA70-96B0-7C40B44CA7C3}"/>
+                    </a:ext>
+                  </a:extLst>
+                </p14:cNvPr>
+                <p14:cNvContentPartPr/>
+                <p14:nvPr/>
+              </p14:nvContentPartPr>
+              <p14:xfrm>
+                <a:off x="7409247" y="852161"/>
+                <a:ext cx="124560" cy="103320"/>
+              </p14:xfrm>
+            </p:contentPart>
+          </mc:Choice>
+          <mc:Fallback xmlns="">
+            <p:pic>
+              <p:nvPicPr>
+                <p:cNvPr id="42" name="Ink 41">
+                  <a:extLst>
+                    <a:ext uri="{FF2B5EF4-FFF2-40B4-BE49-F238E27FC236}">
+                      <a16:creationId xmlns:a16="http://schemas.microsoft.com/office/drawing/2014/main" id="{1556138C-1B3D-CA70-96B0-7C40B44CA7C3}"/>
+                    </a:ext>
+                  </a:extLst>
+                </p:cNvPr>
+                <p:cNvPicPr/>
+                <p:nvPr/>
+              </p:nvPicPr>
+              <p:blipFill>
+                <a:blip r:embed="rId15"/>
+                <a:stretch>
+                  <a:fillRect/>
+                </a:stretch>
+              </p:blipFill>
+              <p:spPr>
+                <a:xfrm>
+                  <a:off x="7400607" y="843521"/>
+                  <a:ext cx="142200" cy="120960"/>
+                </a:xfrm>
+                <a:prstGeom prst="rect">
+                  <a:avLst/>
+                </a:prstGeom>
+              </p:spPr>
+            </p:pic>
+          </mc:Fallback>
+        </mc:AlternateContent>
+        <mc:AlternateContent xmlns:mc="http://schemas.openxmlformats.org/markup-compatibility/2006" xmlns:p14="http://schemas.microsoft.com/office/powerpoint/2010/main">
+          <mc:Choice Requires="p14">
+            <p:contentPart p14:bwMode="auto" r:id="rId16">
+              <p14:nvContentPartPr>
+                <p14:cNvPr id="43" name="Ink 42">
+                  <a:extLst>
+                    <a:ext uri="{FF2B5EF4-FFF2-40B4-BE49-F238E27FC236}">
+                      <a16:creationId xmlns:a16="http://schemas.microsoft.com/office/drawing/2014/main" id="{5969C375-282F-76E6-3196-4AB254E32506}"/>
+                    </a:ext>
+                  </a:extLst>
+                </p14:cNvPr>
+                <p14:cNvContentPartPr/>
+                <p14:nvPr/>
+              </p14:nvContentPartPr>
+              <p14:xfrm>
+                <a:off x="7519767" y="893561"/>
+                <a:ext cx="26280" cy="143640"/>
+              </p14:xfrm>
+            </p:contentPart>
+          </mc:Choice>
+          <mc:Fallback xmlns="">
+            <p:pic>
+              <p:nvPicPr>
+                <p:cNvPr id="43" name="Ink 42">
+                  <a:extLst>
+                    <a:ext uri="{FF2B5EF4-FFF2-40B4-BE49-F238E27FC236}">
+                      <a16:creationId xmlns:a16="http://schemas.microsoft.com/office/drawing/2014/main" id="{5969C375-282F-76E6-3196-4AB254E32506}"/>
+                    </a:ext>
+                  </a:extLst>
+                </p:cNvPr>
+                <p:cNvPicPr/>
+                <p:nvPr/>
+              </p:nvPicPr>
+              <p:blipFill>
+                <a:blip r:embed="rId17"/>
+                <a:stretch>
+                  <a:fillRect/>
+                </a:stretch>
+              </p:blipFill>
+              <p:spPr>
+                <a:xfrm>
+                  <a:off x="7511127" y="884921"/>
+                  <a:ext cx="43920" cy="161280"/>
+                </a:xfrm>
+                <a:prstGeom prst="rect">
+                  <a:avLst/>
+                </a:prstGeom>
+              </p:spPr>
+            </p:pic>
+          </mc:Fallback>
+        </mc:AlternateContent>
+        <mc:AlternateContent xmlns:mc="http://schemas.openxmlformats.org/markup-compatibility/2006" xmlns:p14="http://schemas.microsoft.com/office/powerpoint/2010/main">
+          <mc:Choice Requires="p14">
+            <p:contentPart p14:bwMode="auto" r:id="rId18">
+              <p14:nvContentPartPr>
+                <p14:cNvPr id="44" name="Ink 43">
+                  <a:extLst>
+                    <a:ext uri="{FF2B5EF4-FFF2-40B4-BE49-F238E27FC236}">
+                      <a16:creationId xmlns:a16="http://schemas.microsoft.com/office/drawing/2014/main" id="{1E2517D6-BFA0-2403-DBBC-49D817408032}"/>
+                    </a:ext>
+                  </a:extLst>
+                </p14:cNvPr>
+                <p14:cNvContentPartPr/>
+                <p14:nvPr/>
+              </p14:nvContentPartPr>
+              <p14:xfrm>
+                <a:off x="7617687" y="888161"/>
+                <a:ext cx="161280" cy="102600"/>
+              </p14:xfrm>
+            </p:contentPart>
+          </mc:Choice>
+          <mc:Fallback xmlns="">
+            <p:pic>
+              <p:nvPicPr>
+                <p:cNvPr id="44" name="Ink 43">
+                  <a:extLst>
+                    <a:ext uri="{FF2B5EF4-FFF2-40B4-BE49-F238E27FC236}">
+                      <a16:creationId xmlns:a16="http://schemas.microsoft.com/office/drawing/2014/main" id="{1E2517D6-BFA0-2403-DBBC-49D817408032}"/>
+                    </a:ext>
+                  </a:extLst>
+                </p:cNvPr>
+                <p:cNvPicPr/>
+                <p:nvPr/>
+              </p:nvPicPr>
+              <p:blipFill>
+                <a:blip r:embed="rId19"/>
+                <a:stretch>
+                  <a:fillRect/>
+                </a:stretch>
+              </p:blipFill>
+              <p:spPr>
+                <a:xfrm>
+                  <a:off x="7608687" y="879521"/>
+                  <a:ext cx="178920" cy="120240"/>
+                </a:xfrm>
+                <a:prstGeom prst="rect">
+                  <a:avLst/>
+                </a:prstGeom>
+              </p:spPr>
+            </p:pic>
+          </mc:Fallback>
+        </mc:AlternateContent>
+        <mc:AlternateContent xmlns:mc="http://schemas.openxmlformats.org/markup-compatibility/2006" xmlns:p14="http://schemas.microsoft.com/office/powerpoint/2010/main">
+          <mc:Choice Requires="p14">
+            <p:contentPart p14:bwMode="auto" r:id="rId20">
+              <p14:nvContentPartPr>
+                <p14:cNvPr id="45" name="Ink 44">
+                  <a:extLst>
+                    <a:ext uri="{FF2B5EF4-FFF2-40B4-BE49-F238E27FC236}">
+                      <a16:creationId xmlns:a16="http://schemas.microsoft.com/office/drawing/2014/main" id="{31D532B5-74E9-D9B9-FC8B-B9D22B7E1F4D}"/>
+                    </a:ext>
+                  </a:extLst>
+                </p14:cNvPr>
+                <p14:cNvContentPartPr/>
+                <p14:nvPr/>
+              </p14:nvContentPartPr>
+              <p14:xfrm>
+                <a:off x="7850607" y="879521"/>
+                <a:ext cx="26280" cy="161280"/>
+              </p14:xfrm>
+            </p:contentPart>
+          </mc:Choice>
+          <mc:Fallback xmlns="">
+            <p:pic>
+              <p:nvPicPr>
+                <p:cNvPr id="45" name="Ink 44">
+                  <a:extLst>
+                    <a:ext uri="{FF2B5EF4-FFF2-40B4-BE49-F238E27FC236}">
+                      <a16:creationId xmlns:a16="http://schemas.microsoft.com/office/drawing/2014/main" id="{31D532B5-74E9-D9B9-FC8B-B9D22B7E1F4D}"/>
+                    </a:ext>
+                  </a:extLst>
+                </p:cNvPr>
+                <p:cNvPicPr/>
+                <p:nvPr/>
+              </p:nvPicPr>
+              <p:blipFill>
+                <a:blip r:embed="rId21"/>
+                <a:stretch>
+                  <a:fillRect/>
+                </a:stretch>
+              </p:blipFill>
+              <p:spPr>
+                <a:xfrm>
+                  <a:off x="7841607" y="870521"/>
+                  <a:ext cx="43920" cy="178920"/>
+                </a:xfrm>
+                <a:prstGeom prst="rect">
+                  <a:avLst/>
+                </a:prstGeom>
+              </p:spPr>
+            </p:pic>
+          </mc:Fallback>
+        </mc:AlternateContent>
+        <mc:AlternateContent xmlns:mc="http://schemas.openxmlformats.org/markup-compatibility/2006" xmlns:p14="http://schemas.microsoft.com/office/powerpoint/2010/main">
+          <mc:Choice Requires="p14">
+            <p:contentPart p14:bwMode="auto" r:id="rId22">
+              <p14:nvContentPartPr>
+                <p14:cNvPr id="46" name="Ink 45">
+                  <a:extLst>
+                    <a:ext uri="{FF2B5EF4-FFF2-40B4-BE49-F238E27FC236}">
+                      <a16:creationId xmlns:a16="http://schemas.microsoft.com/office/drawing/2014/main" id="{A607621F-2E43-DE55-E8DE-32C124944767}"/>
+                    </a:ext>
+                  </a:extLst>
+                </p14:cNvPr>
+                <p14:cNvContentPartPr/>
+                <p14:nvPr/>
+              </p14:nvContentPartPr>
+              <p14:xfrm>
+                <a:off x="7831527" y="841001"/>
+                <a:ext cx="111240" cy="210960"/>
+              </p14:xfrm>
+            </p:contentPart>
+          </mc:Choice>
+          <mc:Fallback xmlns="">
+            <p:pic>
+              <p:nvPicPr>
+                <p:cNvPr id="46" name="Ink 45">
+                  <a:extLst>
+                    <a:ext uri="{FF2B5EF4-FFF2-40B4-BE49-F238E27FC236}">
+                      <a16:creationId xmlns:a16="http://schemas.microsoft.com/office/drawing/2014/main" id="{A607621F-2E43-DE55-E8DE-32C124944767}"/>
+                    </a:ext>
+                  </a:extLst>
+                </p:cNvPr>
+                <p:cNvPicPr/>
+                <p:nvPr/>
+              </p:nvPicPr>
+              <p:blipFill>
+                <a:blip r:embed="rId23"/>
+                <a:stretch>
+                  <a:fillRect/>
+                </a:stretch>
+              </p:blipFill>
+              <p:spPr>
+                <a:xfrm>
+                  <a:off x="7822887" y="832361"/>
+                  <a:ext cx="128880" cy="228600"/>
+                </a:xfrm>
+                <a:prstGeom prst="rect">
+                  <a:avLst/>
+                </a:prstGeom>
+              </p:spPr>
+            </p:pic>
+          </mc:Fallback>
+        </mc:AlternateContent>
+      </p:grpSp>
+      <p:grpSp>
+        <p:nvGrpSpPr>
+          <p:cNvPr id="57" name="Group 56">
+            <a:extLst>
+              <a:ext uri="{FF2B5EF4-FFF2-40B4-BE49-F238E27FC236}">
+                <a16:creationId xmlns:a16="http://schemas.microsoft.com/office/drawing/2014/main" id="{925AC811-4E3E-7A3E-9C10-A4B4B620D682}"/>
+              </a:ext>
+            </a:extLst>
+          </p:cNvPr>
+          <p:cNvGrpSpPr/>
+          <p:nvPr/>
+        </p:nvGrpSpPr>
+        <p:grpSpPr>
+          <a:xfrm>
+            <a:off x="8281527" y="413321"/>
+            <a:ext cx="1403280" cy="338760"/>
+            <a:chOff x="8281527" y="413321"/>
+            <a:chExt cx="1403280" cy="338760"/>
+          </a:xfrm>
+        </p:grpSpPr>
+        <mc:AlternateContent xmlns:mc="http://schemas.openxmlformats.org/markup-compatibility/2006" xmlns:p14="http://schemas.microsoft.com/office/powerpoint/2010/main">
+          <mc:Choice Requires="p14">
+            <p:contentPart p14:bwMode="auto" r:id="rId24">
+              <p14:nvContentPartPr>
+                <p14:cNvPr id="47" name="Ink 46">
+                  <a:extLst>
+                    <a:ext uri="{FF2B5EF4-FFF2-40B4-BE49-F238E27FC236}">
+                      <a16:creationId xmlns:a16="http://schemas.microsoft.com/office/drawing/2014/main" id="{85E67787-6D61-B062-7C5D-83C0186B5644}"/>
+                    </a:ext>
+                  </a:extLst>
+                </p14:cNvPr>
+                <p14:cNvContentPartPr/>
+                <p14:nvPr/>
+              </p14:nvContentPartPr>
+              <p14:xfrm>
+                <a:off x="8281527" y="634001"/>
+                <a:ext cx="182880" cy="96480"/>
+              </p14:xfrm>
+            </p:contentPart>
+          </mc:Choice>
+          <mc:Fallback xmlns="">
+            <p:pic>
+              <p:nvPicPr>
+                <p:cNvPr id="47" name="Ink 46">
+                  <a:extLst>
+                    <a:ext uri="{FF2B5EF4-FFF2-40B4-BE49-F238E27FC236}">
+                      <a16:creationId xmlns:a16="http://schemas.microsoft.com/office/drawing/2014/main" id="{85E67787-6D61-B062-7C5D-83C0186B5644}"/>
+                    </a:ext>
+                  </a:extLst>
+                </p:cNvPr>
+                <p:cNvPicPr/>
+                <p:nvPr/>
+              </p:nvPicPr>
+              <p:blipFill>
+                <a:blip r:embed="rId25"/>
+                <a:stretch>
+                  <a:fillRect/>
+                </a:stretch>
+              </p:blipFill>
+              <p:spPr>
+                <a:xfrm>
+                  <a:off x="8272527" y="625361"/>
+                  <a:ext cx="200520" cy="114120"/>
+                </a:xfrm>
+                <a:prstGeom prst="rect">
+                  <a:avLst/>
+                </a:prstGeom>
+              </p:spPr>
+            </p:pic>
+          </mc:Fallback>
+        </mc:AlternateContent>
+        <mc:AlternateContent xmlns:mc="http://schemas.openxmlformats.org/markup-compatibility/2006" xmlns:p14="http://schemas.microsoft.com/office/powerpoint/2010/main">
+          <mc:Choice Requires="p14">
+            <p:contentPart p14:bwMode="auto" r:id="rId26">
+              <p14:nvContentPartPr>
+                <p14:cNvPr id="48" name="Ink 47">
+                  <a:extLst>
+                    <a:ext uri="{FF2B5EF4-FFF2-40B4-BE49-F238E27FC236}">
+                      <a16:creationId xmlns:a16="http://schemas.microsoft.com/office/drawing/2014/main" id="{D2380E7F-8D70-4455-6EAD-7F9A18D8B3ED}"/>
+                    </a:ext>
+                  </a:extLst>
+                </p14:cNvPr>
+                <p14:cNvContentPartPr/>
+                <p14:nvPr/>
+              </p14:nvContentPartPr>
+              <p14:xfrm>
+                <a:off x="8555847" y="605201"/>
+                <a:ext cx="98640" cy="132120"/>
+              </p14:xfrm>
+            </p:contentPart>
+          </mc:Choice>
+          <mc:Fallback xmlns="">
+            <p:pic>
+              <p:nvPicPr>
+                <p:cNvPr id="48" name="Ink 47">
+                  <a:extLst>
+                    <a:ext uri="{FF2B5EF4-FFF2-40B4-BE49-F238E27FC236}">
+                      <a16:creationId xmlns:a16="http://schemas.microsoft.com/office/drawing/2014/main" id="{D2380E7F-8D70-4455-6EAD-7F9A18D8B3ED}"/>
+                    </a:ext>
+                  </a:extLst>
+                </p:cNvPr>
+                <p:cNvPicPr/>
+                <p:nvPr/>
+              </p:nvPicPr>
+              <p:blipFill>
+                <a:blip r:embed="rId27"/>
+                <a:stretch>
+                  <a:fillRect/>
+                </a:stretch>
+              </p:blipFill>
+              <p:spPr>
+                <a:xfrm>
+                  <a:off x="8547207" y="596561"/>
+                  <a:ext cx="116280" cy="149760"/>
+                </a:xfrm>
+                <a:prstGeom prst="rect">
+                  <a:avLst/>
+                </a:prstGeom>
+              </p:spPr>
+            </p:pic>
+          </mc:Fallback>
+        </mc:AlternateContent>
+        <mc:AlternateContent xmlns:mc="http://schemas.openxmlformats.org/markup-compatibility/2006" xmlns:p14="http://schemas.microsoft.com/office/powerpoint/2010/main">
+          <mc:Choice Requires="p14">
+            <p:contentPart p14:bwMode="auto" r:id="rId28">
+              <p14:nvContentPartPr>
+                <p14:cNvPr id="49" name="Ink 48">
+                  <a:extLst>
+                    <a:ext uri="{FF2B5EF4-FFF2-40B4-BE49-F238E27FC236}">
+                      <a16:creationId xmlns:a16="http://schemas.microsoft.com/office/drawing/2014/main" id="{B6EB65D8-5A1E-254F-9CBE-3AE974A41499}"/>
+                    </a:ext>
+                  </a:extLst>
+                </p14:cNvPr>
+                <p14:cNvContentPartPr/>
+                <p14:nvPr/>
+              </p14:nvContentPartPr>
+              <p14:xfrm>
+                <a:off x="8741967" y="529961"/>
+                <a:ext cx="56520" cy="64440"/>
+              </p14:xfrm>
+            </p:contentPart>
+          </mc:Choice>
+          <mc:Fallback xmlns="">
+            <p:pic>
+              <p:nvPicPr>
+                <p:cNvPr id="49" name="Ink 48">
+                  <a:extLst>
+                    <a:ext uri="{FF2B5EF4-FFF2-40B4-BE49-F238E27FC236}">
+                      <a16:creationId xmlns:a16="http://schemas.microsoft.com/office/drawing/2014/main" id="{B6EB65D8-5A1E-254F-9CBE-3AE974A41499}"/>
+                    </a:ext>
+                  </a:extLst>
+                </p:cNvPr>
+                <p:cNvPicPr/>
+                <p:nvPr/>
+              </p:nvPicPr>
+              <p:blipFill>
+                <a:blip r:embed="rId29"/>
+                <a:stretch>
+                  <a:fillRect/>
+                </a:stretch>
+              </p:blipFill>
+              <p:spPr>
+                <a:xfrm>
+                  <a:off x="8732967" y="521321"/>
+                  <a:ext cx="74160" cy="82080"/>
+                </a:xfrm>
+                <a:prstGeom prst="rect">
+                  <a:avLst/>
+                </a:prstGeom>
+              </p:spPr>
+            </p:pic>
+          </mc:Fallback>
+        </mc:AlternateContent>
+        <mc:AlternateContent xmlns:mc="http://schemas.openxmlformats.org/markup-compatibility/2006" xmlns:p14="http://schemas.microsoft.com/office/powerpoint/2010/main">
+          <mc:Choice Requires="p14">
+            <p:contentPart p14:bwMode="auto" r:id="rId30">
+              <p14:nvContentPartPr>
+                <p14:cNvPr id="50" name="Ink 49">
+                  <a:extLst>
+                    <a:ext uri="{FF2B5EF4-FFF2-40B4-BE49-F238E27FC236}">
+                      <a16:creationId xmlns:a16="http://schemas.microsoft.com/office/drawing/2014/main" id="{99E1C2CA-14E6-E82B-B6C6-C55D396E1D81}"/>
+                    </a:ext>
+                  </a:extLst>
+                </p14:cNvPr>
+                <p14:cNvContentPartPr/>
+                <p14:nvPr/>
+              </p14:nvContentPartPr>
+              <p14:xfrm>
+                <a:off x="8723607" y="562361"/>
+                <a:ext cx="67320" cy="137520"/>
+              </p14:xfrm>
+            </p:contentPart>
+          </mc:Choice>
+          <mc:Fallback xmlns="">
+            <p:pic>
+              <p:nvPicPr>
+                <p:cNvPr id="50" name="Ink 49">
+                  <a:extLst>
+                    <a:ext uri="{FF2B5EF4-FFF2-40B4-BE49-F238E27FC236}">
+                      <a16:creationId xmlns:a16="http://schemas.microsoft.com/office/drawing/2014/main" id="{99E1C2CA-14E6-E82B-B6C6-C55D396E1D81}"/>
+                    </a:ext>
+                  </a:extLst>
+                </p:cNvPr>
+                <p:cNvPicPr/>
+                <p:nvPr/>
+              </p:nvPicPr>
+              <p:blipFill>
+                <a:blip r:embed="rId31"/>
+                <a:stretch>
+                  <a:fillRect/>
+                </a:stretch>
+              </p:blipFill>
+              <p:spPr>
+                <a:xfrm>
+                  <a:off x="8714967" y="553361"/>
+                  <a:ext cx="84960" cy="155160"/>
+                </a:xfrm>
+                <a:prstGeom prst="rect">
+                  <a:avLst/>
+                </a:prstGeom>
+              </p:spPr>
+            </p:pic>
+          </mc:Fallback>
+        </mc:AlternateContent>
+        <mc:AlternateContent xmlns:mc="http://schemas.openxmlformats.org/markup-compatibility/2006" xmlns:p14="http://schemas.microsoft.com/office/powerpoint/2010/main">
+          <mc:Choice Requires="p14">
+            <p:contentPart p14:bwMode="auto" r:id="rId32">
+              <p14:nvContentPartPr>
+                <p14:cNvPr id="51" name="Ink 50">
+                  <a:extLst>
+                    <a:ext uri="{FF2B5EF4-FFF2-40B4-BE49-F238E27FC236}">
+                      <a16:creationId xmlns:a16="http://schemas.microsoft.com/office/drawing/2014/main" id="{30B22340-8524-ED62-9B52-74DCB48CB8FB}"/>
+                    </a:ext>
+                  </a:extLst>
+                </p14:cNvPr>
+                <p14:cNvContentPartPr/>
+                <p14:nvPr/>
+              </p14:nvContentPartPr>
+              <p14:xfrm>
+                <a:off x="8894967" y="523481"/>
+                <a:ext cx="155880" cy="202680"/>
+              </p14:xfrm>
+            </p:contentPart>
+          </mc:Choice>
+          <mc:Fallback xmlns="">
+            <p:pic>
+              <p:nvPicPr>
+                <p:cNvPr id="51" name="Ink 50">
+                  <a:extLst>
+                    <a:ext uri="{FF2B5EF4-FFF2-40B4-BE49-F238E27FC236}">
+                      <a16:creationId xmlns:a16="http://schemas.microsoft.com/office/drawing/2014/main" id="{30B22340-8524-ED62-9B52-74DCB48CB8FB}"/>
+                    </a:ext>
+                  </a:extLst>
+                </p:cNvPr>
+                <p:cNvPicPr/>
+                <p:nvPr/>
+              </p:nvPicPr>
+              <p:blipFill>
+                <a:blip r:embed="rId33"/>
+                <a:stretch>
+                  <a:fillRect/>
+                </a:stretch>
+              </p:blipFill>
+              <p:spPr>
+                <a:xfrm>
+                  <a:off x="8886327" y="514841"/>
+                  <a:ext cx="173520" cy="220320"/>
+                </a:xfrm>
+                <a:prstGeom prst="rect">
+                  <a:avLst/>
+                </a:prstGeom>
+              </p:spPr>
+            </p:pic>
+          </mc:Fallback>
+        </mc:AlternateContent>
+        <mc:AlternateContent xmlns:mc="http://schemas.openxmlformats.org/markup-compatibility/2006" xmlns:p14="http://schemas.microsoft.com/office/powerpoint/2010/main">
+          <mc:Choice Requires="p14">
+            <p:contentPart p14:bwMode="auto" r:id="rId34">
+              <p14:nvContentPartPr>
+                <p14:cNvPr id="52" name="Ink 51">
+                  <a:extLst>
+                    <a:ext uri="{FF2B5EF4-FFF2-40B4-BE49-F238E27FC236}">
+                      <a16:creationId xmlns:a16="http://schemas.microsoft.com/office/drawing/2014/main" id="{0FDC3FBC-F12B-2E26-B823-B4C0B69EFCEA}"/>
+                    </a:ext>
+                  </a:extLst>
+                </p14:cNvPr>
+                <p14:cNvContentPartPr/>
+                <p14:nvPr/>
+              </p14:nvContentPartPr>
+              <p14:xfrm>
+                <a:off x="9100167" y="486401"/>
+                <a:ext cx="39600" cy="200520"/>
+              </p14:xfrm>
+            </p:contentPart>
+          </mc:Choice>
+          <mc:Fallback xmlns="">
+            <p:pic>
+              <p:nvPicPr>
+                <p:cNvPr id="52" name="Ink 51">
+                  <a:extLst>
+                    <a:ext uri="{FF2B5EF4-FFF2-40B4-BE49-F238E27FC236}">
+                      <a16:creationId xmlns:a16="http://schemas.microsoft.com/office/drawing/2014/main" id="{0FDC3FBC-F12B-2E26-B823-B4C0B69EFCEA}"/>
+                    </a:ext>
+                  </a:extLst>
+                </p:cNvPr>
+                <p:cNvPicPr/>
+                <p:nvPr/>
+              </p:nvPicPr>
+              <p:blipFill>
+                <a:blip r:embed="rId35"/>
+                <a:stretch>
+                  <a:fillRect/>
+                </a:stretch>
+              </p:blipFill>
+              <p:spPr>
+                <a:xfrm>
+                  <a:off x="9091527" y="477401"/>
+                  <a:ext cx="57240" cy="218160"/>
+                </a:xfrm>
+                <a:prstGeom prst="rect">
+                  <a:avLst/>
+                </a:prstGeom>
+              </p:spPr>
+            </p:pic>
+          </mc:Fallback>
+        </mc:AlternateContent>
+        <mc:AlternateContent xmlns:mc="http://schemas.openxmlformats.org/markup-compatibility/2006" xmlns:p14="http://schemas.microsoft.com/office/powerpoint/2010/main">
+          <mc:Choice Requires="p14">
+            <p:contentPart p14:bwMode="auto" r:id="rId36">
+              <p14:nvContentPartPr>
+                <p14:cNvPr id="53" name="Ink 52">
+                  <a:extLst>
+                    <a:ext uri="{FF2B5EF4-FFF2-40B4-BE49-F238E27FC236}">
+                      <a16:creationId xmlns:a16="http://schemas.microsoft.com/office/drawing/2014/main" id="{CA89170A-C5B0-1D3E-9501-4883B494456B}"/>
+                    </a:ext>
+                  </a:extLst>
+                </p14:cNvPr>
+                <p14:cNvContentPartPr/>
+                <p14:nvPr/>
+              </p14:nvContentPartPr>
+              <p14:xfrm>
+                <a:off x="9186567" y="568121"/>
+                <a:ext cx="56160" cy="99360"/>
+              </p14:xfrm>
+            </p:contentPart>
+          </mc:Choice>
+          <mc:Fallback xmlns="">
+            <p:pic>
+              <p:nvPicPr>
+                <p:cNvPr id="53" name="Ink 52">
+                  <a:extLst>
+                    <a:ext uri="{FF2B5EF4-FFF2-40B4-BE49-F238E27FC236}">
+                      <a16:creationId xmlns:a16="http://schemas.microsoft.com/office/drawing/2014/main" id="{CA89170A-C5B0-1D3E-9501-4883B494456B}"/>
+                    </a:ext>
+                  </a:extLst>
+                </p:cNvPr>
+                <p:cNvPicPr/>
+                <p:nvPr/>
+              </p:nvPicPr>
+              <p:blipFill>
+                <a:blip r:embed="rId37"/>
+                <a:stretch>
+                  <a:fillRect/>
+                </a:stretch>
+              </p:blipFill>
+              <p:spPr>
+                <a:xfrm>
+                  <a:off x="9177927" y="559481"/>
+                  <a:ext cx="73800" cy="117000"/>
+                </a:xfrm>
+                <a:prstGeom prst="rect">
+                  <a:avLst/>
+                </a:prstGeom>
+              </p:spPr>
+            </p:pic>
+          </mc:Fallback>
+        </mc:AlternateContent>
+        <mc:AlternateContent xmlns:mc="http://schemas.openxmlformats.org/markup-compatibility/2006" xmlns:p14="http://schemas.microsoft.com/office/powerpoint/2010/main">
+          <mc:Choice Requires="p14">
+            <p:contentPart p14:bwMode="auto" r:id="rId38">
+              <p14:nvContentPartPr>
+                <p14:cNvPr id="54" name="Ink 53">
+                  <a:extLst>
+                    <a:ext uri="{FF2B5EF4-FFF2-40B4-BE49-F238E27FC236}">
+                      <a16:creationId xmlns:a16="http://schemas.microsoft.com/office/drawing/2014/main" id="{146318C9-AD05-223B-5C92-F65149358C0C}"/>
+                    </a:ext>
+                  </a:extLst>
+                </p14:cNvPr>
+                <p14:cNvContentPartPr/>
+                <p14:nvPr/>
+              </p14:nvContentPartPr>
+              <p14:xfrm>
+                <a:off x="9304287" y="565241"/>
+                <a:ext cx="57600" cy="152280"/>
+              </p14:xfrm>
+            </p:contentPart>
+          </mc:Choice>
+          <mc:Fallback xmlns="">
+            <p:pic>
+              <p:nvPicPr>
+                <p:cNvPr id="54" name="Ink 53">
+                  <a:extLst>
+                    <a:ext uri="{FF2B5EF4-FFF2-40B4-BE49-F238E27FC236}">
+                      <a16:creationId xmlns:a16="http://schemas.microsoft.com/office/drawing/2014/main" id="{146318C9-AD05-223B-5C92-F65149358C0C}"/>
+                    </a:ext>
+                  </a:extLst>
+                </p:cNvPr>
+                <p:cNvPicPr/>
+                <p:nvPr/>
+              </p:nvPicPr>
+              <p:blipFill>
+                <a:blip r:embed="rId39"/>
+                <a:stretch>
+                  <a:fillRect/>
+                </a:stretch>
+              </p:blipFill>
+              <p:spPr>
+                <a:xfrm>
+                  <a:off x="9295647" y="556601"/>
+                  <a:ext cx="75240" cy="169920"/>
+                </a:xfrm>
+                <a:prstGeom prst="rect">
+                  <a:avLst/>
+                </a:prstGeom>
+              </p:spPr>
+            </p:pic>
+          </mc:Fallback>
+        </mc:AlternateContent>
+        <mc:AlternateContent xmlns:mc="http://schemas.openxmlformats.org/markup-compatibility/2006" xmlns:p14="http://schemas.microsoft.com/office/powerpoint/2010/main">
+          <mc:Choice Requires="p14">
+            <p:contentPart p14:bwMode="auto" r:id="rId40">
+              <p14:nvContentPartPr>
+                <p14:cNvPr id="55" name="Ink 54">
+                  <a:extLst>
+                    <a:ext uri="{FF2B5EF4-FFF2-40B4-BE49-F238E27FC236}">
+                      <a16:creationId xmlns:a16="http://schemas.microsoft.com/office/drawing/2014/main" id="{28E31C9C-3F0B-BCFC-A5F3-BC94442E684E}"/>
+                    </a:ext>
+                  </a:extLst>
+                </p14:cNvPr>
+                <p14:cNvContentPartPr/>
+                <p14:nvPr/>
+              </p14:nvContentPartPr>
+              <p14:xfrm>
+                <a:off x="9427407" y="413321"/>
+                <a:ext cx="123480" cy="338760"/>
+              </p14:xfrm>
+            </p:contentPart>
+          </mc:Choice>
+          <mc:Fallback xmlns="">
+            <p:pic>
+              <p:nvPicPr>
+                <p:cNvPr id="55" name="Ink 54">
+                  <a:extLst>
+                    <a:ext uri="{FF2B5EF4-FFF2-40B4-BE49-F238E27FC236}">
+                      <a16:creationId xmlns:a16="http://schemas.microsoft.com/office/drawing/2014/main" id="{28E31C9C-3F0B-BCFC-A5F3-BC94442E684E}"/>
+                    </a:ext>
+                  </a:extLst>
+                </p:cNvPr>
+                <p:cNvPicPr/>
+                <p:nvPr/>
+              </p:nvPicPr>
+              <p:blipFill>
+                <a:blip r:embed="rId41"/>
+                <a:stretch>
+                  <a:fillRect/>
+                </a:stretch>
+              </p:blipFill>
+              <p:spPr>
+                <a:xfrm>
+                  <a:off x="9418767" y="404321"/>
+                  <a:ext cx="141120" cy="356400"/>
+                </a:xfrm>
+                <a:prstGeom prst="rect">
+                  <a:avLst/>
+                </a:prstGeom>
+              </p:spPr>
+            </p:pic>
+          </mc:Fallback>
+        </mc:AlternateContent>
+        <mc:AlternateContent xmlns:mc="http://schemas.openxmlformats.org/markup-compatibility/2006" xmlns:p14="http://schemas.microsoft.com/office/powerpoint/2010/main">
+          <mc:Choice Requires="p14">
+            <p:contentPart p14:bwMode="auto" r:id="rId42">
+              <p14:nvContentPartPr>
+                <p14:cNvPr id="56" name="Ink 55">
+                  <a:extLst>
+                    <a:ext uri="{FF2B5EF4-FFF2-40B4-BE49-F238E27FC236}">
+                      <a16:creationId xmlns:a16="http://schemas.microsoft.com/office/drawing/2014/main" id="{97FE3A08-F082-5E74-02E1-40FF67575F48}"/>
+                    </a:ext>
+                  </a:extLst>
+                </p14:cNvPr>
+                <p14:cNvContentPartPr/>
+                <p14:nvPr/>
+              </p14:nvContentPartPr>
+              <p14:xfrm>
+                <a:off x="9616767" y="509801"/>
+                <a:ext cx="68040" cy="158400"/>
+              </p14:xfrm>
+            </p:contentPart>
+          </mc:Choice>
+          <mc:Fallback xmlns="">
+            <p:pic>
+              <p:nvPicPr>
+                <p:cNvPr id="56" name="Ink 55">
+                  <a:extLst>
+                    <a:ext uri="{FF2B5EF4-FFF2-40B4-BE49-F238E27FC236}">
+                      <a16:creationId xmlns:a16="http://schemas.microsoft.com/office/drawing/2014/main" id="{97FE3A08-F082-5E74-02E1-40FF67575F48}"/>
+                    </a:ext>
+                  </a:extLst>
+                </p:cNvPr>
+                <p:cNvPicPr/>
+                <p:nvPr/>
+              </p:nvPicPr>
+              <p:blipFill>
+                <a:blip r:embed="rId43"/>
+                <a:stretch>
+                  <a:fillRect/>
+                </a:stretch>
+              </p:blipFill>
+              <p:spPr>
+                <a:xfrm>
+                  <a:off x="9607767" y="501161"/>
+                  <a:ext cx="85680" cy="176040"/>
+                </a:xfrm>
+                <a:prstGeom prst="rect">
+                  <a:avLst/>
+                </a:prstGeom>
+              </p:spPr>
+            </p:pic>
+          </mc:Fallback>
+        </mc:AlternateContent>
+      </p:grpSp>
+    </p:spTree>
+    <p:extLst>
+      <p:ext uri="{BB962C8B-B14F-4D97-AF65-F5344CB8AC3E}">
+        <p14:creationId xmlns:p14="http://schemas.microsoft.com/office/powerpoint/2010/main" val="614077723"/>
+      </p:ext>
+    </p:extLst>
+  </p:cSld>
+  <p:clrMapOvr>
+    <a:masterClrMapping/>
+  </p:clrMapOvr>
+</p:sld>
+</file>
+
+<file path=ppt/slides/slide17.xml><?xml version="1.0" encoding="utf-8"?>
+<p:sld xmlns:a="http://schemas.openxmlformats.org/drawingml/2006/main" xmlns:r="http://schemas.openxmlformats.org/officeDocument/2006/relationships" xmlns:p="http://schemas.openxmlformats.org/presentationml/2006/main">
+  <p:cSld>
+    <p:spTree>
+      <p:nvGrpSpPr>
+        <p:cNvPr id="1" name=""/>
+        <p:cNvGrpSpPr/>
+        <p:nvPr/>
+      </p:nvGrpSpPr>
+      <p:grpSpPr>
+        <a:xfrm>
+          <a:off x="0" y="0"/>
+          <a:ext cx="0" cy="0"/>
+          <a:chOff x="0" y="0"/>
+          <a:chExt cx="0" cy="0"/>
+        </a:xfrm>
+      </p:grpSpPr>
+      <p:sp>
+        <p:nvSpPr>
+          <p:cNvPr id="2" name="Title 1">
+            <a:extLst>
+              <a:ext uri="{FF2B5EF4-FFF2-40B4-BE49-F238E27FC236}">
+                <a16:creationId xmlns:a16="http://schemas.microsoft.com/office/drawing/2014/main" id="{72429780-5FF7-A748-D729-0A7D2007A0B7}"/>
+              </a:ext>
+            </a:extLst>
+          </p:cNvPr>
+          <p:cNvSpPr>
+            <a:spLocks noGrp="1"/>
+          </p:cNvSpPr>
+          <p:nvPr>
+            <p:ph type="title"/>
+          </p:nvPr>
+        </p:nvSpPr>
+        <p:spPr/>
+        <p:txBody>
+          <a:bodyPr/>
+          <a:lstStyle/>
+          <a:p>
+            <a:r>
+              <a:rPr lang="en-US" dirty="0"/>
+              <a:t>Shared Access Signature</a:t>
+            </a:r>
+            <a:endParaRPr lang="en-IN" dirty="0"/>
+          </a:p>
+        </p:txBody>
+      </p:sp>
+      <p:sp>
+        <p:nvSpPr>
+          <p:cNvPr id="3" name="Content Placeholder 2">
+            <a:extLst>
+              <a:ext uri="{FF2B5EF4-FFF2-40B4-BE49-F238E27FC236}">
+                <a16:creationId xmlns:a16="http://schemas.microsoft.com/office/drawing/2014/main" id="{5C7560D3-5CB4-BE4F-7296-1599740D7208}"/>
+              </a:ext>
+            </a:extLst>
+          </p:cNvPr>
+          <p:cNvSpPr>
+            <a:spLocks noGrp="1"/>
+          </p:cNvSpPr>
+          <p:nvPr>
+            <p:ph idx="1"/>
+          </p:nvPr>
+        </p:nvSpPr>
+        <p:spPr/>
+        <p:txBody>
+          <a:bodyPr/>
+          <a:lstStyle/>
+          <a:p>
+            <a:r>
+              <a:rPr lang="en-US" dirty="0"/>
+              <a:t>SAS is a URI that grants restricted access rights to Azure Storage resources.</a:t>
+            </a:r>
+          </a:p>
+          <a:p>
+            <a:pPr lvl="1"/>
+            <a:r>
+              <a:rPr lang="en-US" dirty="0"/>
+              <a:t>Account Level SAS</a:t>
+            </a:r>
+          </a:p>
+          <a:p>
+            <a:pPr lvl="1"/>
+            <a:r>
+              <a:rPr lang="en-US" dirty="0"/>
+              <a:t>Service Level SAS</a:t>
+            </a:r>
+            <a:endParaRPr lang="en-IN" dirty="0"/>
+          </a:p>
+        </p:txBody>
+      </p:sp>
+    </p:spTree>
+    <p:extLst>
+      <p:ext uri="{BB962C8B-B14F-4D97-AF65-F5344CB8AC3E}">
+        <p14:creationId xmlns:p14="http://schemas.microsoft.com/office/powerpoint/2010/main" val="1791055724"/>
+      </p:ext>
+    </p:extLst>
+  </p:cSld>
+  <p:clrMapOvr>
+    <a:masterClrMapping/>
+  </p:clrMapOvr>
+</p:sld>
+</file>
+
+<file path=ppt/slides/slide18.xml><?xml version="1.0" encoding="utf-8"?>
+<p:sld xmlns:a="http://schemas.openxmlformats.org/drawingml/2006/main" xmlns:r="http://schemas.openxmlformats.org/officeDocument/2006/relationships" xmlns:p="http://schemas.openxmlformats.org/presentationml/2006/main">
+  <p:cSld>
+    <p:spTree>
+      <p:nvGrpSpPr>
+        <p:cNvPr id="1" name=""/>
+        <p:cNvGrpSpPr/>
+        <p:nvPr/>
+      </p:nvGrpSpPr>
+      <p:grpSpPr>
+        <a:xfrm>
+          <a:off x="0" y="0"/>
+          <a:ext cx="0" cy="0"/>
+          <a:chOff x="0" y="0"/>
+          <a:chExt cx="0" cy="0"/>
+        </a:xfrm>
+      </p:grpSpPr>
+      <p:sp>
+        <p:nvSpPr>
+          <p:cNvPr id="2" name="Title 1">
+            <a:extLst>
+              <a:ext uri="{FF2B5EF4-FFF2-40B4-BE49-F238E27FC236}">
+                <a16:creationId xmlns:a16="http://schemas.microsoft.com/office/drawing/2014/main" id="{08A0AEF3-A927-555A-E764-0BA4BB557C82}"/>
+              </a:ext>
+            </a:extLst>
+          </p:cNvPr>
+          <p:cNvSpPr>
+            <a:spLocks noGrp="1"/>
+          </p:cNvSpPr>
+          <p:nvPr>
+            <p:ph type="title"/>
+          </p:nvPr>
+        </p:nvSpPr>
+        <p:spPr/>
+        <p:txBody>
+          <a:bodyPr/>
+          <a:lstStyle/>
+          <a:p>
+            <a:r>
+              <a:rPr lang="en-US" dirty="0"/>
+              <a:t>Configuring SAS</a:t>
+            </a:r>
+            <a:endParaRPr lang="en-IN" dirty="0"/>
+          </a:p>
+        </p:txBody>
+      </p:sp>
+      <p:sp>
+        <p:nvSpPr>
+          <p:cNvPr id="3" name="Content Placeholder 2">
+            <a:extLst>
+              <a:ext uri="{FF2B5EF4-FFF2-40B4-BE49-F238E27FC236}">
+                <a16:creationId xmlns:a16="http://schemas.microsoft.com/office/drawing/2014/main" id="{608C6CE6-7F97-01A2-4E11-C117C022E7B6}"/>
+              </a:ext>
+            </a:extLst>
+          </p:cNvPr>
+          <p:cNvSpPr>
+            <a:spLocks noGrp="1"/>
+          </p:cNvSpPr>
+          <p:nvPr>
+            <p:ph idx="1"/>
+          </p:nvPr>
+        </p:nvSpPr>
+        <p:spPr/>
+        <p:txBody>
+          <a:bodyPr/>
+          <a:lstStyle/>
+          <a:p>
+            <a:r>
+              <a:rPr lang="en-US" dirty="0"/>
+              <a:t>URI = Storage Resource + SAS Token</a:t>
+            </a:r>
+          </a:p>
+          <a:p>
+            <a:r>
+              <a:rPr lang="en-IN" dirty="0">
+                <a:hlinkClick r:id="rId2"/>
+              </a:rPr>
+              <a:t>https://ayush.blob.core.windows.net/ayushr/Iphone%20X.jpg</a:t>
+            </a:r>
+            <a:r>
+              <a:rPr lang="en-IN" dirty="0"/>
+              <a:t>?</a:t>
+            </a:r>
+          </a:p>
+          <a:p>
+            <a:r>
+              <a:rPr lang="en-IN" dirty="0" err="1"/>
+              <a:t>sp</a:t>
+            </a:r>
+            <a:r>
+              <a:rPr lang="en-IN" dirty="0"/>
+              <a:t>=</a:t>
+            </a:r>
+            <a:r>
+              <a:rPr lang="en-IN" dirty="0" err="1"/>
+              <a:t>r&amp;st</a:t>
+            </a:r>
+            <a:r>
+              <a:rPr lang="en-IN" dirty="0"/>
+              <a:t>=2023-05-06T16:35:32Z&amp;se=2023-05-07T00:35:32Z&amp;spr=</a:t>
+            </a:r>
+            <a:r>
+              <a:rPr lang="en-IN" dirty="0" err="1"/>
+              <a:t>https&amp;sv</a:t>
+            </a:r>
+            <a:r>
+              <a:rPr lang="en-IN" dirty="0"/>
+              <a:t>=2022-11-02&amp;sr=</a:t>
+            </a:r>
+            <a:r>
+              <a:rPr lang="en-IN" dirty="0" err="1"/>
+              <a:t>b&amp;sig</a:t>
+            </a:r>
+            <a:r>
+              <a:rPr lang="en-IN" dirty="0"/>
+              <a:t>=R%2Bs3wHQ%2FaIhqbpmF8npZAUHIZ%2Fh42bbsHOjvZE%2BRxPE%3D</a:t>
+            </a:r>
+          </a:p>
+        </p:txBody>
+      </p:sp>
+    </p:spTree>
+    <p:extLst>
+      <p:ext uri="{BB962C8B-B14F-4D97-AF65-F5344CB8AC3E}">
+        <p14:creationId xmlns:p14="http://schemas.microsoft.com/office/powerpoint/2010/main" val="1969348774"/>
+      </p:ext>
+    </p:extLst>
+  </p:cSld>
+  <p:clrMapOvr>
+    <a:masterClrMapping/>
+  </p:clrMapOvr>
+</p:sld>
+</file>
+
+<file path=ppt/slides/slide19.xml><?xml version="1.0" encoding="utf-8"?>
+<p:sld xmlns:a="http://schemas.openxmlformats.org/drawingml/2006/main" xmlns:r="http://schemas.openxmlformats.org/officeDocument/2006/relationships" xmlns:p="http://schemas.openxmlformats.org/presentationml/2006/main">
+  <p:cSld>
+    <p:spTree>
+      <p:nvGrpSpPr>
+        <p:cNvPr id="1" name=""/>
+        <p:cNvGrpSpPr/>
+        <p:nvPr/>
+      </p:nvGrpSpPr>
+      <p:grpSpPr>
+        <a:xfrm>
+          <a:off x="0" y="0"/>
+          <a:ext cx="0" cy="0"/>
+          <a:chOff x="0" y="0"/>
+          <a:chExt cx="0" cy="0"/>
+        </a:xfrm>
+      </p:grpSpPr>
+      <p:sp>
+        <p:nvSpPr>
+          <p:cNvPr id="2" name="Title 1">
+            <a:extLst>
+              <a:ext uri="{FF2B5EF4-FFF2-40B4-BE49-F238E27FC236}">
+                <a16:creationId xmlns:a16="http://schemas.microsoft.com/office/drawing/2014/main" id="{6F853902-49B1-AB4B-F93C-3DB36AB528A9}"/>
+              </a:ext>
+            </a:extLst>
+          </p:cNvPr>
+          <p:cNvSpPr>
+            <a:spLocks noGrp="1"/>
+          </p:cNvSpPr>
+          <p:nvPr>
+            <p:ph type="ctrTitle"/>
+          </p:nvPr>
+        </p:nvSpPr>
+        <p:spPr/>
+        <p:txBody>
+          <a:bodyPr/>
+          <a:lstStyle/>
+          <a:p>
+            <a:r>
+              <a:rPr lang="en-US" dirty="0"/>
+              <a:t>Azure Files</a:t>
+            </a:r>
+            <a:endParaRPr lang="en-IN" dirty="0"/>
+          </a:p>
+        </p:txBody>
+      </p:sp>
+      <p:sp>
+        <p:nvSpPr>
+          <p:cNvPr id="3" name="Subtitle 2">
+            <a:extLst>
+              <a:ext uri="{FF2B5EF4-FFF2-40B4-BE49-F238E27FC236}">
+                <a16:creationId xmlns:a16="http://schemas.microsoft.com/office/drawing/2014/main" id="{0E781C27-1BD6-2AA3-3F88-63E84077F1D9}"/>
+              </a:ext>
+            </a:extLst>
+          </p:cNvPr>
+          <p:cNvSpPr>
+            <a:spLocks noGrp="1"/>
+          </p:cNvSpPr>
+          <p:nvPr>
+            <p:ph type="subTitle" idx="1"/>
+          </p:nvPr>
+        </p:nvSpPr>
+        <p:spPr/>
+        <p:txBody>
+          <a:bodyPr/>
+          <a:lstStyle/>
+          <a:p>
+            <a:endParaRPr lang="en-IN"/>
+          </a:p>
+        </p:txBody>
+      </p:sp>
+    </p:spTree>
+    <p:extLst>
+      <p:ext uri="{BB962C8B-B14F-4D97-AF65-F5344CB8AC3E}">
+        <p14:creationId xmlns:p14="http://schemas.microsoft.com/office/powerpoint/2010/main" val="4069751044"/>
+      </p:ext>
+    </p:extLst>
+  </p:cSld>
+  <p:clrMapOvr>
+    <a:masterClrMapping/>
+  </p:clrMapOvr>
+</p:sld>
+</file>
+
 <file path=ppt/slides/slide2.xml><?xml version="1.0" encoding="utf-8"?>
 <p:sld xmlns:a="http://schemas.openxmlformats.org/drawingml/2006/main" xmlns:r="http://schemas.openxmlformats.org/officeDocument/2006/relationships" xmlns:p="http://schemas.openxmlformats.org/presentationml/2006/main">
   <p:cSld>
@@ -4197,8 +7228,8 @@
           </a:p>
         </p:txBody>
       </p:sp>
-      <mc:AlternateContent xmlns:mc="http://schemas.openxmlformats.org/markup-compatibility/2006">
-        <mc:Choice xmlns:p14="http://schemas.microsoft.com/office/powerpoint/2010/main" Requires="p14">
+      <mc:AlternateContent xmlns:mc="http://schemas.openxmlformats.org/markup-compatibility/2006" xmlns:p14="http://schemas.microsoft.com/office/powerpoint/2010/main">
+        <mc:Choice Requires="p14">
           <p:contentPart p14:bwMode="auto" r:id="rId2">
             <p14:nvContentPartPr>
               <p14:cNvPr id="4" name="Ink 3">
@@ -4217,7 +7248,7 @@
             </p14:xfrm>
           </p:contentPart>
         </mc:Choice>
-        <mc:Fallback>
+        <mc:Fallback xmlns="">
           <p:pic>
             <p:nvPicPr>
               <p:cNvPr id="4" name="Ink 3">
@@ -4248,8 +7279,8 @@
           </p:pic>
         </mc:Fallback>
       </mc:AlternateContent>
-      <mc:AlternateContent xmlns:mc="http://schemas.openxmlformats.org/markup-compatibility/2006">
-        <mc:Choice xmlns:p14="http://schemas.microsoft.com/office/powerpoint/2010/main" Requires="p14">
+      <mc:AlternateContent xmlns:mc="http://schemas.openxmlformats.org/markup-compatibility/2006" xmlns:p14="http://schemas.microsoft.com/office/powerpoint/2010/main">
+        <mc:Choice Requires="p14">
           <p:contentPart p14:bwMode="auto" r:id="rId4">
             <p14:nvContentPartPr>
               <p14:cNvPr id="6" name="Ink 5">
@@ -4268,7 +7299,7 @@
             </p14:xfrm>
           </p:contentPart>
         </mc:Choice>
-        <mc:Fallback>
+        <mc:Fallback xmlns="">
           <p:pic>
             <p:nvPicPr>
               <p:cNvPr id="6" name="Ink 5">
@@ -4299,8 +7330,8 @@
           </p:pic>
         </mc:Fallback>
       </mc:AlternateContent>
-      <mc:AlternateContent xmlns:mc="http://schemas.openxmlformats.org/markup-compatibility/2006">
-        <mc:Choice xmlns:p14="http://schemas.microsoft.com/office/powerpoint/2010/main" Requires="p14">
+      <mc:AlternateContent xmlns:mc="http://schemas.openxmlformats.org/markup-compatibility/2006" xmlns:p14="http://schemas.microsoft.com/office/powerpoint/2010/main">
+        <mc:Choice Requires="p14">
           <p:contentPart p14:bwMode="auto" r:id="rId6">
             <p14:nvContentPartPr>
               <p14:cNvPr id="7" name="Ink 6">
@@ -4319,7 +7350,7 @@
             </p14:xfrm>
           </p:contentPart>
         </mc:Choice>
-        <mc:Fallback>
+        <mc:Fallback xmlns="">
           <p:pic>
             <p:nvPicPr>
               <p:cNvPr id="7" name="Ink 6">
@@ -4350,8 +7381,8 @@
           </p:pic>
         </mc:Fallback>
       </mc:AlternateContent>
-      <mc:AlternateContent xmlns:mc="http://schemas.openxmlformats.org/markup-compatibility/2006">
-        <mc:Choice xmlns:p14="http://schemas.microsoft.com/office/powerpoint/2010/main" Requires="p14">
+      <mc:AlternateContent xmlns:mc="http://schemas.openxmlformats.org/markup-compatibility/2006" xmlns:p14="http://schemas.microsoft.com/office/powerpoint/2010/main">
+        <mc:Choice Requires="p14">
           <p:contentPart p14:bwMode="auto" r:id="rId8">
             <p14:nvContentPartPr>
               <p14:cNvPr id="8" name="Ink 7">
@@ -4370,7 +7401,7 @@
             </p14:xfrm>
           </p:contentPart>
         </mc:Choice>
-        <mc:Fallback>
+        <mc:Fallback xmlns="">
           <p:pic>
             <p:nvPicPr>
               <p:cNvPr id="8" name="Ink 7">
@@ -4401,8 +7432,8 @@
           </p:pic>
         </mc:Fallback>
       </mc:AlternateContent>
-      <mc:AlternateContent xmlns:mc="http://schemas.openxmlformats.org/markup-compatibility/2006">
-        <mc:Choice xmlns:p14="http://schemas.microsoft.com/office/powerpoint/2010/main" Requires="p14">
+      <mc:AlternateContent xmlns:mc="http://schemas.openxmlformats.org/markup-compatibility/2006" xmlns:p14="http://schemas.microsoft.com/office/powerpoint/2010/main">
+        <mc:Choice Requires="p14">
           <p:contentPart p14:bwMode="auto" r:id="rId10">
             <p14:nvContentPartPr>
               <p14:cNvPr id="9" name="Ink 8">
@@ -4421,7 +7452,7 @@
             </p14:xfrm>
           </p:contentPart>
         </mc:Choice>
-        <mc:Fallback>
+        <mc:Fallback xmlns="">
           <p:pic>
             <p:nvPicPr>
               <p:cNvPr id="9" name="Ink 8">
@@ -4465,6 +7496,592 @@
 </p:sld>
 </file>
 
+<file path=ppt/slides/slide20.xml><?xml version="1.0" encoding="utf-8"?>
+<p:sld xmlns:a="http://schemas.openxmlformats.org/drawingml/2006/main" xmlns:r="http://schemas.openxmlformats.org/officeDocument/2006/relationships" xmlns:p="http://schemas.openxmlformats.org/presentationml/2006/main">
+  <p:cSld>
+    <p:spTree>
+      <p:nvGrpSpPr>
+        <p:cNvPr id="1" name=""/>
+        <p:cNvGrpSpPr/>
+        <p:nvPr/>
+      </p:nvGrpSpPr>
+      <p:grpSpPr>
+        <a:xfrm>
+          <a:off x="0" y="0"/>
+          <a:ext cx="0" cy="0"/>
+          <a:chOff x="0" y="0"/>
+          <a:chExt cx="0" cy="0"/>
+        </a:xfrm>
+      </p:grpSpPr>
+      <p:sp>
+        <p:nvSpPr>
+          <p:cNvPr id="2" name="Title 1">
+            <a:extLst>
+              <a:ext uri="{FF2B5EF4-FFF2-40B4-BE49-F238E27FC236}">
+                <a16:creationId xmlns:a16="http://schemas.microsoft.com/office/drawing/2014/main" id="{1B20CB0D-2B32-8BA6-CBB2-76B573E3E0C4}"/>
+              </a:ext>
+            </a:extLst>
+          </p:cNvPr>
+          <p:cNvSpPr>
+            <a:spLocks noGrp="1"/>
+          </p:cNvSpPr>
+          <p:nvPr>
+            <p:ph type="title"/>
+          </p:nvPr>
+        </p:nvSpPr>
+        <p:spPr/>
+        <p:txBody>
+          <a:bodyPr/>
+          <a:lstStyle/>
+          <a:p>
+            <a:r>
+              <a:rPr lang="en-US" dirty="0"/>
+              <a:t>Azure Files</a:t>
+            </a:r>
+            <a:endParaRPr lang="en-IN" dirty="0"/>
+          </a:p>
+        </p:txBody>
+      </p:sp>
+      <p:sp>
+        <p:nvSpPr>
+          <p:cNvPr id="3" name="Content Placeholder 2">
+            <a:extLst>
+              <a:ext uri="{FF2B5EF4-FFF2-40B4-BE49-F238E27FC236}">
+                <a16:creationId xmlns:a16="http://schemas.microsoft.com/office/drawing/2014/main" id="{F7D0211F-17E0-4DD3-8B88-C3348830ACED}"/>
+              </a:ext>
+            </a:extLst>
+          </p:cNvPr>
+          <p:cNvSpPr>
+            <a:spLocks noGrp="1"/>
+          </p:cNvSpPr>
+          <p:nvPr>
+            <p:ph idx="1"/>
+          </p:nvPr>
+        </p:nvSpPr>
+        <p:spPr/>
+        <p:txBody>
+          <a:bodyPr/>
+          <a:lstStyle/>
+          <a:p>
+            <a:r>
+              <a:rPr lang="en-US" dirty="0"/>
+              <a:t>Files shares offer shared storage for application using the industry standard SMB protocol</a:t>
+            </a:r>
+            <a:endParaRPr lang="en-IN" dirty="0"/>
+          </a:p>
+        </p:txBody>
+      </p:sp>
+    </p:spTree>
+    <p:extLst>
+      <p:ext uri="{BB962C8B-B14F-4D97-AF65-F5344CB8AC3E}">
+        <p14:creationId xmlns:p14="http://schemas.microsoft.com/office/powerpoint/2010/main" val="2350448501"/>
+      </p:ext>
+    </p:extLst>
+  </p:cSld>
+  <p:clrMapOvr>
+    <a:masterClrMapping/>
+  </p:clrMapOvr>
+</p:sld>
+</file>
+
+<file path=ppt/slides/slide21.xml><?xml version="1.0" encoding="utf-8"?>
+<p:sld xmlns:a="http://schemas.openxmlformats.org/drawingml/2006/main" xmlns:r="http://schemas.openxmlformats.org/officeDocument/2006/relationships" xmlns:p="http://schemas.openxmlformats.org/presentationml/2006/main">
+  <p:cSld>
+    <p:spTree>
+      <p:nvGrpSpPr>
+        <p:cNvPr id="1" name=""/>
+        <p:cNvGrpSpPr/>
+        <p:nvPr/>
+      </p:nvGrpSpPr>
+      <p:grpSpPr>
+        <a:xfrm>
+          <a:off x="0" y="0"/>
+          <a:ext cx="0" cy="0"/>
+          <a:chOff x="0" y="0"/>
+          <a:chExt cx="0" cy="0"/>
+        </a:xfrm>
+      </p:grpSpPr>
+      <p:sp>
+        <p:nvSpPr>
+          <p:cNvPr id="2" name="Title 1">
+            <a:extLst>
+              <a:ext uri="{FF2B5EF4-FFF2-40B4-BE49-F238E27FC236}">
+                <a16:creationId xmlns:a16="http://schemas.microsoft.com/office/drawing/2014/main" id="{CAABF184-0399-597C-3E17-D756548A75BF}"/>
+              </a:ext>
+            </a:extLst>
+          </p:cNvPr>
+          <p:cNvSpPr>
+            <a:spLocks noGrp="1"/>
+          </p:cNvSpPr>
+          <p:nvPr>
+            <p:ph type="title"/>
+          </p:nvPr>
+        </p:nvSpPr>
+        <p:spPr/>
+        <p:txBody>
+          <a:bodyPr/>
+          <a:lstStyle/>
+          <a:p>
+            <a:r>
+              <a:rPr lang="en-US" dirty="0"/>
+              <a:t>Common Use cases</a:t>
+            </a:r>
+            <a:endParaRPr lang="en-IN" dirty="0"/>
+          </a:p>
+        </p:txBody>
+      </p:sp>
+      <p:sp>
+        <p:nvSpPr>
+          <p:cNvPr id="3" name="Content Placeholder 2">
+            <a:extLst>
+              <a:ext uri="{FF2B5EF4-FFF2-40B4-BE49-F238E27FC236}">
+                <a16:creationId xmlns:a16="http://schemas.microsoft.com/office/drawing/2014/main" id="{94B20B04-9252-864C-D82A-53BB45558E85}"/>
+              </a:ext>
+            </a:extLst>
+          </p:cNvPr>
+          <p:cNvSpPr>
+            <a:spLocks noGrp="1"/>
+          </p:cNvSpPr>
+          <p:nvPr>
+            <p:ph idx="1"/>
+          </p:nvPr>
+        </p:nvSpPr>
+        <p:spPr/>
+        <p:txBody>
+          <a:bodyPr/>
+          <a:lstStyle/>
+          <a:p>
+            <a:r>
+              <a:rPr lang="en-US" dirty="0"/>
+              <a:t>Replace and supplement</a:t>
+            </a:r>
+          </a:p>
+          <a:p>
+            <a:r>
+              <a:rPr lang="en-US" dirty="0"/>
+              <a:t>Access Anywhere</a:t>
+            </a:r>
+          </a:p>
+          <a:p>
+            <a:r>
+              <a:rPr lang="en-US" dirty="0"/>
+              <a:t>Lift and shift</a:t>
+            </a:r>
+          </a:p>
+          <a:p>
+            <a:r>
+              <a:rPr lang="en-US" dirty="0"/>
+              <a:t>Shared Applications</a:t>
+            </a:r>
+          </a:p>
+          <a:p>
+            <a:r>
+              <a:rPr lang="en-US" dirty="0"/>
+              <a:t>Diagnostic Data</a:t>
+            </a:r>
+          </a:p>
+          <a:p>
+            <a:r>
+              <a:rPr lang="en-US" dirty="0"/>
+              <a:t>Tools and utilities</a:t>
+            </a:r>
+            <a:endParaRPr lang="en-IN" dirty="0"/>
+          </a:p>
+        </p:txBody>
+      </p:sp>
+    </p:spTree>
+    <p:extLst>
+      <p:ext uri="{BB962C8B-B14F-4D97-AF65-F5344CB8AC3E}">
+        <p14:creationId xmlns:p14="http://schemas.microsoft.com/office/powerpoint/2010/main" val="3429259532"/>
+      </p:ext>
+    </p:extLst>
+  </p:cSld>
+  <p:clrMapOvr>
+    <a:masterClrMapping/>
+  </p:clrMapOvr>
+</p:sld>
+</file>
+
+<file path=ppt/slides/slide22.xml><?xml version="1.0" encoding="utf-8"?>
+<p:sld xmlns:a="http://schemas.openxmlformats.org/drawingml/2006/main" xmlns:r="http://schemas.openxmlformats.org/officeDocument/2006/relationships" xmlns:p="http://schemas.openxmlformats.org/presentationml/2006/main">
+  <p:cSld>
+    <p:spTree>
+      <p:nvGrpSpPr>
+        <p:cNvPr id="1" name=""/>
+        <p:cNvGrpSpPr/>
+        <p:nvPr/>
+      </p:nvGrpSpPr>
+      <p:grpSpPr>
+        <a:xfrm>
+          <a:off x="0" y="0"/>
+          <a:ext cx="0" cy="0"/>
+          <a:chOff x="0" y="0"/>
+          <a:chExt cx="0" cy="0"/>
+        </a:xfrm>
+      </p:grpSpPr>
+      <p:sp>
+        <p:nvSpPr>
+          <p:cNvPr id="2" name="Title 1">
+            <a:extLst>
+              <a:ext uri="{FF2B5EF4-FFF2-40B4-BE49-F238E27FC236}">
+                <a16:creationId xmlns:a16="http://schemas.microsoft.com/office/drawing/2014/main" id="{D33F9D0B-5254-43BB-6AD9-52F89C42E93A}"/>
+              </a:ext>
+            </a:extLst>
+          </p:cNvPr>
+          <p:cNvSpPr>
+            <a:spLocks noGrp="1"/>
+          </p:cNvSpPr>
+          <p:nvPr>
+            <p:ph type="title"/>
+          </p:nvPr>
+        </p:nvSpPr>
+        <p:spPr/>
+        <p:txBody>
+          <a:bodyPr/>
+          <a:lstStyle/>
+          <a:p>
+            <a:r>
+              <a:rPr lang="en-US" dirty="0"/>
+              <a:t>Files vs Blobs</a:t>
+            </a:r>
+            <a:endParaRPr lang="en-IN" dirty="0"/>
+          </a:p>
+        </p:txBody>
+      </p:sp>
+      <p:sp>
+        <p:nvSpPr>
+          <p:cNvPr id="3" name="Content Placeholder 2">
+            <a:extLst>
+              <a:ext uri="{FF2B5EF4-FFF2-40B4-BE49-F238E27FC236}">
+                <a16:creationId xmlns:a16="http://schemas.microsoft.com/office/drawing/2014/main" id="{8FEDC280-3008-5380-4568-F1A9A7C57867}"/>
+              </a:ext>
+            </a:extLst>
+          </p:cNvPr>
+          <p:cNvSpPr>
+            <a:spLocks noGrp="1"/>
+          </p:cNvSpPr>
+          <p:nvPr>
+            <p:ph idx="1"/>
+          </p:nvPr>
+        </p:nvSpPr>
+        <p:spPr/>
+        <p:txBody>
+          <a:bodyPr/>
+          <a:lstStyle/>
+          <a:p>
+            <a:r>
+              <a:rPr lang="en-US" dirty="0"/>
+              <a:t>Azure files are true directory objects. Azure blobs are a flat namespace</a:t>
+            </a:r>
+          </a:p>
+          <a:p>
+            <a:r>
+              <a:rPr lang="en-US" dirty="0"/>
+              <a:t>Azure files are accessed through file shares. Azure blobs are accessed through a container</a:t>
+            </a:r>
+          </a:p>
+          <a:p>
+            <a:r>
+              <a:rPr lang="en-US" dirty="0"/>
+              <a:t>Azure files provide shared access across multiple virtual machines.</a:t>
+            </a:r>
+            <a:endParaRPr lang="en-IN" dirty="0"/>
+          </a:p>
+        </p:txBody>
+      </p:sp>
+    </p:spTree>
+    <p:extLst>
+      <p:ext uri="{BB962C8B-B14F-4D97-AF65-F5344CB8AC3E}">
+        <p14:creationId xmlns:p14="http://schemas.microsoft.com/office/powerpoint/2010/main" val="630339739"/>
+      </p:ext>
+    </p:extLst>
+  </p:cSld>
+  <p:clrMapOvr>
+    <a:masterClrMapping/>
+  </p:clrMapOvr>
+</p:sld>
+</file>
+
+<file path=ppt/slides/slide23.xml><?xml version="1.0" encoding="utf-8"?>
+<p:sld xmlns:a="http://schemas.openxmlformats.org/drawingml/2006/main" xmlns:r="http://schemas.openxmlformats.org/officeDocument/2006/relationships" xmlns:p="http://schemas.openxmlformats.org/presentationml/2006/main">
+  <p:cSld>
+    <p:spTree>
+      <p:nvGrpSpPr>
+        <p:cNvPr id="1" name=""/>
+        <p:cNvGrpSpPr/>
+        <p:nvPr/>
+      </p:nvGrpSpPr>
+      <p:grpSpPr>
+        <a:xfrm>
+          <a:off x="0" y="0"/>
+          <a:ext cx="0" cy="0"/>
+          <a:chOff x="0" y="0"/>
+          <a:chExt cx="0" cy="0"/>
+        </a:xfrm>
+      </p:grpSpPr>
+      <p:sp>
+        <p:nvSpPr>
+          <p:cNvPr id="2" name="Title 1">
+            <a:extLst>
+              <a:ext uri="{FF2B5EF4-FFF2-40B4-BE49-F238E27FC236}">
+                <a16:creationId xmlns:a16="http://schemas.microsoft.com/office/drawing/2014/main" id="{33C02C27-F57F-1021-B39B-A75BB0D81EA1}"/>
+              </a:ext>
+            </a:extLst>
+          </p:cNvPr>
+          <p:cNvSpPr>
+            <a:spLocks noGrp="1"/>
+          </p:cNvSpPr>
+          <p:nvPr>
+            <p:ph type="title"/>
+          </p:nvPr>
+        </p:nvSpPr>
+        <p:spPr/>
+        <p:txBody>
+          <a:bodyPr/>
+          <a:lstStyle/>
+          <a:p>
+            <a:r>
+              <a:rPr lang="en-US" dirty="0"/>
+              <a:t>Creating File Shares</a:t>
+            </a:r>
+            <a:endParaRPr lang="en-IN" dirty="0"/>
+          </a:p>
+        </p:txBody>
+      </p:sp>
+      <p:sp>
+        <p:nvSpPr>
+          <p:cNvPr id="3" name="Content Placeholder 2">
+            <a:extLst>
+              <a:ext uri="{FF2B5EF4-FFF2-40B4-BE49-F238E27FC236}">
+                <a16:creationId xmlns:a16="http://schemas.microsoft.com/office/drawing/2014/main" id="{398565AF-B2DB-4A13-4F19-0842DDFB331F}"/>
+              </a:ext>
+            </a:extLst>
+          </p:cNvPr>
+          <p:cNvSpPr>
+            <a:spLocks noGrp="1"/>
+          </p:cNvSpPr>
+          <p:nvPr>
+            <p:ph idx="1"/>
+          </p:nvPr>
+        </p:nvSpPr>
+        <p:spPr/>
+        <p:txBody>
+          <a:bodyPr/>
+          <a:lstStyle/>
+          <a:p>
+            <a:endParaRPr lang="en-IN"/>
+          </a:p>
+        </p:txBody>
+      </p:sp>
+    </p:spTree>
+    <p:extLst>
+      <p:ext uri="{BB962C8B-B14F-4D97-AF65-F5344CB8AC3E}">
+        <p14:creationId xmlns:p14="http://schemas.microsoft.com/office/powerpoint/2010/main" val="3770764273"/>
+      </p:ext>
+    </p:extLst>
+  </p:cSld>
+  <p:clrMapOvr>
+    <a:masterClrMapping/>
+  </p:clrMapOvr>
+</p:sld>
+</file>
+
+<file path=ppt/slides/slide24.xml><?xml version="1.0" encoding="utf-8"?>
+<p:sld xmlns:a="http://schemas.openxmlformats.org/drawingml/2006/main" xmlns:r="http://schemas.openxmlformats.org/officeDocument/2006/relationships" xmlns:p="http://schemas.openxmlformats.org/presentationml/2006/main">
+  <p:cSld>
+    <p:spTree>
+      <p:nvGrpSpPr>
+        <p:cNvPr id="1" name=""/>
+        <p:cNvGrpSpPr/>
+        <p:nvPr/>
+      </p:nvGrpSpPr>
+      <p:grpSpPr>
+        <a:xfrm>
+          <a:off x="0" y="0"/>
+          <a:ext cx="0" cy="0"/>
+          <a:chOff x="0" y="0"/>
+          <a:chExt cx="0" cy="0"/>
+        </a:xfrm>
+      </p:grpSpPr>
+      <p:sp>
+        <p:nvSpPr>
+          <p:cNvPr id="2" name="Title 1">
+            <a:extLst>
+              <a:ext uri="{FF2B5EF4-FFF2-40B4-BE49-F238E27FC236}">
+                <a16:creationId xmlns:a16="http://schemas.microsoft.com/office/drawing/2014/main" id="{F856A893-3D02-F45B-00D3-714270C2DA61}"/>
+              </a:ext>
+            </a:extLst>
+          </p:cNvPr>
+          <p:cNvSpPr>
+            <a:spLocks noGrp="1"/>
+          </p:cNvSpPr>
+          <p:nvPr>
+            <p:ph type="ctrTitle"/>
+          </p:nvPr>
+        </p:nvSpPr>
+        <p:spPr/>
+        <p:txBody>
+          <a:bodyPr/>
+          <a:lstStyle/>
+          <a:p>
+            <a:r>
+              <a:rPr lang="en-US" dirty="0"/>
+              <a:t>Storage Security</a:t>
+            </a:r>
+            <a:endParaRPr lang="en-IN" dirty="0"/>
+          </a:p>
+        </p:txBody>
+      </p:sp>
+      <p:sp>
+        <p:nvSpPr>
+          <p:cNvPr id="3" name="Subtitle 2">
+            <a:extLst>
+              <a:ext uri="{FF2B5EF4-FFF2-40B4-BE49-F238E27FC236}">
+                <a16:creationId xmlns:a16="http://schemas.microsoft.com/office/drawing/2014/main" id="{E9A2A063-2059-5CFC-AE5B-B889D80E8BF3}"/>
+              </a:ext>
+            </a:extLst>
+          </p:cNvPr>
+          <p:cNvSpPr>
+            <a:spLocks noGrp="1"/>
+          </p:cNvSpPr>
+          <p:nvPr>
+            <p:ph type="subTitle" idx="1"/>
+          </p:nvPr>
+        </p:nvSpPr>
+        <p:spPr/>
+        <p:txBody>
+          <a:bodyPr/>
+          <a:lstStyle/>
+          <a:p>
+            <a:endParaRPr lang="en-IN"/>
+          </a:p>
+        </p:txBody>
+      </p:sp>
+    </p:spTree>
+    <p:extLst>
+      <p:ext uri="{BB962C8B-B14F-4D97-AF65-F5344CB8AC3E}">
+        <p14:creationId xmlns:p14="http://schemas.microsoft.com/office/powerpoint/2010/main" val="614676270"/>
+      </p:ext>
+    </p:extLst>
+  </p:cSld>
+  <p:clrMapOvr>
+    <a:masterClrMapping/>
+  </p:clrMapOvr>
+</p:sld>
+</file>
+
+<file path=ppt/slides/slide25.xml><?xml version="1.0" encoding="utf-8"?>
+<p:sld xmlns:a="http://schemas.openxmlformats.org/drawingml/2006/main" xmlns:r="http://schemas.openxmlformats.org/officeDocument/2006/relationships" xmlns:p="http://schemas.openxmlformats.org/presentationml/2006/main">
+  <p:cSld>
+    <p:spTree>
+      <p:nvGrpSpPr>
+        <p:cNvPr id="1" name=""/>
+        <p:cNvGrpSpPr/>
+        <p:nvPr/>
+      </p:nvGrpSpPr>
+      <p:grpSpPr>
+        <a:xfrm>
+          <a:off x="0" y="0"/>
+          <a:ext cx="0" cy="0"/>
+          <a:chOff x="0" y="0"/>
+          <a:chExt cx="0" cy="0"/>
+        </a:xfrm>
+      </p:grpSpPr>
+      <p:sp>
+        <p:nvSpPr>
+          <p:cNvPr id="2" name="Title 1">
+            <a:extLst>
+              <a:ext uri="{FF2B5EF4-FFF2-40B4-BE49-F238E27FC236}">
+                <a16:creationId xmlns:a16="http://schemas.microsoft.com/office/drawing/2014/main" id="{270CB071-6BBE-A2A1-E2E7-76F4226CC015}"/>
+              </a:ext>
+            </a:extLst>
+          </p:cNvPr>
+          <p:cNvSpPr>
+            <a:spLocks noGrp="1"/>
+          </p:cNvSpPr>
+          <p:nvPr>
+            <p:ph type="title"/>
+          </p:nvPr>
+        </p:nvSpPr>
+        <p:spPr/>
+        <p:txBody>
+          <a:bodyPr/>
+          <a:lstStyle/>
+          <a:p>
+            <a:r>
+              <a:rPr lang="en-US" dirty="0"/>
+              <a:t>Storage Security</a:t>
+            </a:r>
+            <a:endParaRPr lang="en-IN" dirty="0"/>
+          </a:p>
+        </p:txBody>
+      </p:sp>
+      <p:sp>
+        <p:nvSpPr>
+          <p:cNvPr id="3" name="Content Placeholder 2">
+            <a:extLst>
+              <a:ext uri="{FF2B5EF4-FFF2-40B4-BE49-F238E27FC236}">
+                <a16:creationId xmlns:a16="http://schemas.microsoft.com/office/drawing/2014/main" id="{4C0CC951-7555-F3DE-6379-0AB54AD5D1D1}"/>
+              </a:ext>
+            </a:extLst>
+          </p:cNvPr>
+          <p:cNvSpPr>
+            <a:spLocks noGrp="1"/>
+          </p:cNvSpPr>
+          <p:nvPr>
+            <p:ph idx="1"/>
+          </p:nvPr>
+        </p:nvSpPr>
+        <p:spPr/>
+        <p:txBody>
+          <a:bodyPr/>
+          <a:lstStyle/>
+          <a:p>
+            <a:r>
+              <a:rPr lang="en-US" dirty="0"/>
+              <a:t>Encryption</a:t>
+            </a:r>
+          </a:p>
+          <a:p>
+            <a:r>
+              <a:rPr lang="en-US" dirty="0"/>
+              <a:t>Authentication – Azure Active Directory and Role-Based Access Control</a:t>
+            </a:r>
+          </a:p>
+          <a:p>
+            <a:r>
+              <a:rPr lang="en-US" dirty="0"/>
+              <a:t>Data in transit – HTTPS and SMB</a:t>
+            </a:r>
+          </a:p>
+          <a:p>
+            <a:r>
+              <a:rPr lang="en-US" dirty="0"/>
+              <a:t>Disk Encryption</a:t>
+            </a:r>
+          </a:p>
+          <a:p>
+            <a:r>
+              <a:rPr lang="en-US" dirty="0"/>
+              <a:t>Shared Access Signature</a:t>
+            </a:r>
+            <a:endParaRPr lang="en-IN" dirty="0"/>
+          </a:p>
+        </p:txBody>
+      </p:sp>
+    </p:spTree>
+    <p:extLst>
+      <p:ext uri="{BB962C8B-B14F-4D97-AF65-F5344CB8AC3E}">
+        <p14:creationId xmlns:p14="http://schemas.microsoft.com/office/powerpoint/2010/main" val="957155437"/>
+      </p:ext>
+    </p:extLst>
+  </p:cSld>
+  <p:clrMapOvr>
+    <a:masterClrMapping/>
+  </p:clrMapOvr>
+</p:sld>
+</file>
+
 <file path=ppt/slides/slide3.xml><?xml version="1.0" encoding="utf-8"?>
 <p:sld xmlns:a="http://schemas.openxmlformats.org/drawingml/2006/main" xmlns:r="http://schemas.openxmlformats.org/officeDocument/2006/relationships" xmlns:p="http://schemas.openxmlformats.org/presentationml/2006/main">
   <p:cSld>
@@ -4552,8 +8169,8 @@
           </a:p>
         </p:txBody>
       </p:sp>
-      <mc:AlternateContent xmlns:mc="http://schemas.openxmlformats.org/markup-compatibility/2006">
-        <mc:Choice xmlns:p14="http://schemas.microsoft.com/office/powerpoint/2010/main" Requires="p14">
+      <mc:AlternateContent xmlns:mc="http://schemas.openxmlformats.org/markup-compatibility/2006" xmlns:p14="http://schemas.microsoft.com/office/powerpoint/2010/main">
+        <mc:Choice Requires="p14">
           <p:contentPart p14:bwMode="auto" r:id="rId2">
             <p14:nvContentPartPr>
               <p14:cNvPr id="4" name="Ink 3">
@@ -4572,7 +8189,7 @@
             </p14:xfrm>
           </p:contentPart>
         </mc:Choice>
-        <mc:Fallback>
+        <mc:Fallback xmlns="">
           <p:pic>
             <p:nvPicPr>
               <p:cNvPr id="4" name="Ink 3">
@@ -4603,8 +8220,8 @@
           </p:pic>
         </mc:Fallback>
       </mc:AlternateContent>
-      <mc:AlternateContent xmlns:mc="http://schemas.openxmlformats.org/markup-compatibility/2006">
-        <mc:Choice xmlns:p14="http://schemas.microsoft.com/office/powerpoint/2010/main" Requires="p14">
+      <mc:AlternateContent xmlns:mc="http://schemas.openxmlformats.org/markup-compatibility/2006" xmlns:p14="http://schemas.microsoft.com/office/powerpoint/2010/main">
+        <mc:Choice Requires="p14">
           <p:contentPart p14:bwMode="auto" r:id="rId4">
             <p14:nvContentPartPr>
               <p14:cNvPr id="5" name="Ink 4">
@@ -4623,7 +8240,7 @@
             </p14:xfrm>
           </p:contentPart>
         </mc:Choice>
-        <mc:Fallback>
+        <mc:Fallback xmlns="">
           <p:pic>
             <p:nvPicPr>
               <p:cNvPr id="5" name="Ink 4">
@@ -4654,8 +8271,8 @@
           </p:pic>
         </mc:Fallback>
       </mc:AlternateContent>
-      <mc:AlternateContent xmlns:mc="http://schemas.openxmlformats.org/markup-compatibility/2006">
-        <mc:Choice xmlns:p14="http://schemas.microsoft.com/office/powerpoint/2010/main" Requires="p14">
+      <mc:AlternateContent xmlns:mc="http://schemas.openxmlformats.org/markup-compatibility/2006" xmlns:p14="http://schemas.microsoft.com/office/powerpoint/2010/main">
+        <mc:Choice Requires="p14">
           <p:contentPart p14:bwMode="auto" r:id="rId6">
             <p14:nvContentPartPr>
               <p14:cNvPr id="6" name="Ink 5">
@@ -4674,7 +8291,7 @@
             </p14:xfrm>
           </p:contentPart>
         </mc:Choice>
-        <mc:Fallback>
+        <mc:Fallback xmlns="">
           <p:pic>
             <p:nvPicPr>
               <p:cNvPr id="6" name="Ink 5">
@@ -4740,7 +8357,7 @@
           <p:cNvPr id="2" name="Title 1">
             <a:extLst>
               <a:ext uri="{FF2B5EF4-FFF2-40B4-BE49-F238E27FC236}">
-                <a16:creationId xmlns:a16="http://schemas.microsoft.com/office/drawing/2014/main" id="{8F116FEB-1D52-C658-C469-5E7EA3261B56}"/>
+                <a16:creationId xmlns:a16="http://schemas.microsoft.com/office/drawing/2014/main" id="{88868ADB-1DCA-49EF-EA92-42EB8C3A43F5}"/>
               </a:ext>
             </a:extLst>
           </p:cNvPr>
@@ -4758,7 +8375,7 @@
           <a:p>
             <a:r>
               <a:rPr lang="en-US" dirty="0"/>
-              <a:t>Azure Storage Services</a:t>
+              <a:t>Azure and AWS</a:t>
             </a:r>
             <a:endParaRPr lang="en-IN" dirty="0"/>
           </a:p>
@@ -4766,18 +8383,18 @@
       </p:sp>
       <p:sp>
         <p:nvSpPr>
-          <p:cNvPr id="3" name="Content Placeholder 2">
-            <a:extLst>
-              <a:ext uri="{FF2B5EF4-FFF2-40B4-BE49-F238E27FC236}">
-                <a16:creationId xmlns:a16="http://schemas.microsoft.com/office/drawing/2014/main" id="{25CF0643-04E2-3F54-560A-F1C83F14661E}"/>
-              </a:ext>
-            </a:extLst>
-          </p:cNvPr>
-          <p:cNvSpPr>
-            <a:spLocks noGrp="1"/>
-          </p:cNvSpPr>
-          <p:nvPr>
-            <p:ph idx="1"/>
+          <p:cNvPr id="4" name="Content Placeholder 3">
+            <a:extLst>
+              <a:ext uri="{FF2B5EF4-FFF2-40B4-BE49-F238E27FC236}">
+                <a16:creationId xmlns:a16="http://schemas.microsoft.com/office/drawing/2014/main" id="{4C21BEA5-8B49-3801-EE88-E1A81613C8A0}"/>
+              </a:ext>
+            </a:extLst>
+          </p:cNvPr>
+          <p:cNvSpPr>
+            <a:spLocks noGrp="1"/>
+          </p:cNvSpPr>
+          <p:nvPr>
+            <p:ph sz="half" idx="1"/>
           </p:nvPr>
         </p:nvSpPr>
         <p:spPr/>
@@ -4785,6 +8402,212 @@
           <a:bodyPr/>
           <a:lstStyle/>
           <a:p>
+            <a:pPr marL="0" indent="0">
+              <a:buNone/>
+            </a:pPr>
+            <a:r>
+              <a:rPr lang="en-US" dirty="0"/>
+              <a:t>Azure</a:t>
+            </a:r>
+          </a:p>
+          <a:p>
+            <a:r>
+              <a:rPr lang="en-US" dirty="0"/>
+              <a:t>Blob</a:t>
+            </a:r>
+          </a:p>
+          <a:p>
+            <a:r>
+              <a:rPr lang="en-US" dirty="0"/>
+              <a:t>Disk</a:t>
+            </a:r>
+          </a:p>
+          <a:p>
+            <a:r>
+              <a:rPr lang="en-US" dirty="0"/>
+              <a:t>File Share</a:t>
+            </a:r>
+          </a:p>
+          <a:p>
+            <a:r>
+              <a:rPr lang="en-US" dirty="0"/>
+              <a:t>Queue</a:t>
+            </a:r>
+          </a:p>
+          <a:p>
+            <a:r>
+              <a:rPr lang="en-US" dirty="0"/>
+              <a:t>Table</a:t>
+            </a:r>
+          </a:p>
+          <a:p>
+            <a:r>
+              <a:rPr lang="en-US" dirty="0"/>
+              <a:t>SQL DB</a:t>
+            </a:r>
+          </a:p>
+          <a:p>
+            <a:r>
+              <a:rPr lang="en-US" dirty="0"/>
+              <a:t>Cosmos DB</a:t>
+            </a:r>
+          </a:p>
+        </p:txBody>
+      </p:sp>
+      <p:sp>
+        <p:nvSpPr>
+          <p:cNvPr id="5" name="Content Placeholder 4">
+            <a:extLst>
+              <a:ext uri="{FF2B5EF4-FFF2-40B4-BE49-F238E27FC236}">
+                <a16:creationId xmlns:a16="http://schemas.microsoft.com/office/drawing/2014/main" id="{C95C0FCA-65D5-D4F4-1302-B1C4E5EAA67C}"/>
+              </a:ext>
+            </a:extLst>
+          </p:cNvPr>
+          <p:cNvSpPr>
+            <a:spLocks noGrp="1"/>
+          </p:cNvSpPr>
+          <p:nvPr>
+            <p:ph sz="half" idx="2"/>
+          </p:nvPr>
+        </p:nvSpPr>
+        <p:spPr/>
+        <p:txBody>
+          <a:bodyPr/>
+          <a:lstStyle/>
+          <a:p>
+            <a:pPr marL="0" indent="0">
+              <a:buNone/>
+            </a:pPr>
+            <a:r>
+              <a:rPr lang="en-US" dirty="0"/>
+              <a:t>AWS</a:t>
+            </a:r>
+          </a:p>
+          <a:p>
+            <a:r>
+              <a:rPr lang="en-US" dirty="0"/>
+              <a:t>S3</a:t>
+            </a:r>
+          </a:p>
+          <a:p>
+            <a:r>
+              <a:rPr lang="en-US" dirty="0"/>
+              <a:t>EBS</a:t>
+            </a:r>
+          </a:p>
+          <a:p>
+            <a:r>
+              <a:rPr lang="en-US" dirty="0"/>
+              <a:t>EFS</a:t>
+            </a:r>
+          </a:p>
+          <a:p>
+            <a:r>
+              <a:rPr lang="en-US" dirty="0"/>
+              <a:t>SQS</a:t>
+            </a:r>
+          </a:p>
+          <a:p>
+            <a:r>
+              <a:rPr lang="en-US" dirty="0"/>
+              <a:t>DynamoDB</a:t>
+            </a:r>
+          </a:p>
+          <a:p>
+            <a:r>
+              <a:rPr lang="en-US" dirty="0"/>
+              <a:t>RDS</a:t>
+            </a:r>
+          </a:p>
+          <a:p>
+            <a:r>
+              <a:rPr lang="en-US" dirty="0"/>
+              <a:t>DynamoDB</a:t>
+            </a:r>
+            <a:endParaRPr lang="en-IN" dirty="0"/>
+          </a:p>
+        </p:txBody>
+      </p:sp>
+    </p:spTree>
+    <p:extLst>
+      <p:ext uri="{BB962C8B-B14F-4D97-AF65-F5344CB8AC3E}">
+        <p14:creationId xmlns:p14="http://schemas.microsoft.com/office/powerpoint/2010/main" val="4294041894"/>
+      </p:ext>
+    </p:extLst>
+  </p:cSld>
+  <p:clrMapOvr>
+    <a:masterClrMapping/>
+  </p:clrMapOvr>
+</p:sld>
+</file>
+
+<file path=ppt/slides/slide5.xml><?xml version="1.0" encoding="utf-8"?>
+<p:sld xmlns:a="http://schemas.openxmlformats.org/drawingml/2006/main" xmlns:r="http://schemas.openxmlformats.org/officeDocument/2006/relationships" xmlns:p="http://schemas.openxmlformats.org/presentationml/2006/main">
+  <p:cSld>
+    <p:spTree>
+      <p:nvGrpSpPr>
+        <p:cNvPr id="1" name=""/>
+        <p:cNvGrpSpPr/>
+        <p:nvPr/>
+      </p:nvGrpSpPr>
+      <p:grpSpPr>
+        <a:xfrm>
+          <a:off x="0" y="0"/>
+          <a:ext cx="0" cy="0"/>
+          <a:chOff x="0" y="0"/>
+          <a:chExt cx="0" cy="0"/>
+        </a:xfrm>
+      </p:grpSpPr>
+      <p:sp>
+        <p:nvSpPr>
+          <p:cNvPr id="2" name="Title 1">
+            <a:extLst>
+              <a:ext uri="{FF2B5EF4-FFF2-40B4-BE49-F238E27FC236}">
+                <a16:creationId xmlns:a16="http://schemas.microsoft.com/office/drawing/2014/main" id="{8F116FEB-1D52-C658-C469-5E7EA3261B56}"/>
+              </a:ext>
+            </a:extLst>
+          </p:cNvPr>
+          <p:cNvSpPr>
+            <a:spLocks noGrp="1"/>
+          </p:cNvSpPr>
+          <p:nvPr>
+            <p:ph type="title"/>
+          </p:nvPr>
+        </p:nvSpPr>
+        <p:spPr/>
+        <p:txBody>
+          <a:bodyPr/>
+          <a:lstStyle/>
+          <a:p>
+            <a:r>
+              <a:rPr lang="en-US" dirty="0"/>
+              <a:t>Azure Storage Services</a:t>
+            </a:r>
+            <a:endParaRPr lang="en-IN" dirty="0"/>
+          </a:p>
+        </p:txBody>
+      </p:sp>
+      <p:sp>
+        <p:nvSpPr>
+          <p:cNvPr id="3" name="Content Placeholder 2">
+            <a:extLst>
+              <a:ext uri="{FF2B5EF4-FFF2-40B4-BE49-F238E27FC236}">
+                <a16:creationId xmlns:a16="http://schemas.microsoft.com/office/drawing/2014/main" id="{25CF0643-04E2-3F54-560A-F1C83F14661E}"/>
+              </a:ext>
+            </a:extLst>
+          </p:cNvPr>
+          <p:cNvSpPr>
+            <a:spLocks noGrp="1"/>
+          </p:cNvSpPr>
+          <p:nvPr>
+            <p:ph idx="1"/>
+          </p:nvPr>
+        </p:nvSpPr>
+        <p:spPr/>
+        <p:txBody>
+          <a:bodyPr/>
+          <a:lstStyle/>
+          <a:p>
             <a:r>
               <a:rPr lang="en-US" dirty="0"/>
               <a:t>Azure Blobs – massively scalable object store for text and binary data</a:t>
@@ -4813,8 +8636,8 @@
           </a:p>
         </p:txBody>
       </p:sp>
-      <mc:AlternateContent xmlns:mc="http://schemas.openxmlformats.org/markup-compatibility/2006">
-        <mc:Choice xmlns:p14="http://schemas.microsoft.com/office/powerpoint/2010/main" Requires="p14">
+      <mc:AlternateContent xmlns:mc="http://schemas.openxmlformats.org/markup-compatibility/2006" xmlns:p14="http://schemas.microsoft.com/office/powerpoint/2010/main">
+        <mc:Choice Requires="p14">
           <p:contentPart p14:bwMode="auto" r:id="rId2">
             <p14:nvContentPartPr>
               <p14:cNvPr id="4" name="Ink 3">
@@ -4833,7 +8656,7 @@
             </p14:xfrm>
           </p:contentPart>
         </mc:Choice>
-        <mc:Fallback>
+        <mc:Fallback xmlns="">
           <p:pic>
             <p:nvPicPr>
               <p:cNvPr id="4" name="Ink 3">
@@ -4864,8 +8687,8 @@
           </p:pic>
         </mc:Fallback>
       </mc:AlternateContent>
-      <mc:AlternateContent xmlns:mc="http://schemas.openxmlformats.org/markup-compatibility/2006">
-        <mc:Choice xmlns:p14="http://schemas.microsoft.com/office/powerpoint/2010/main" Requires="p14">
+      <mc:AlternateContent xmlns:mc="http://schemas.openxmlformats.org/markup-compatibility/2006" xmlns:p14="http://schemas.microsoft.com/office/powerpoint/2010/main">
+        <mc:Choice Requires="p14">
           <p:contentPart p14:bwMode="auto" r:id="rId4">
             <p14:nvContentPartPr>
               <p14:cNvPr id="6" name="Ink 5">
@@ -4884,7 +8707,7 @@
             </p14:xfrm>
           </p:contentPart>
         </mc:Choice>
-        <mc:Fallback>
+        <mc:Fallback xmlns="">
           <p:pic>
             <p:nvPicPr>
               <p:cNvPr id="6" name="Ink 5">
@@ -4915,8 +8738,8 @@
           </p:pic>
         </mc:Fallback>
       </mc:AlternateContent>
-      <mc:AlternateContent xmlns:mc="http://schemas.openxmlformats.org/markup-compatibility/2006">
-        <mc:Choice xmlns:p14="http://schemas.microsoft.com/office/powerpoint/2010/main" Requires="p14">
+      <mc:AlternateContent xmlns:mc="http://schemas.openxmlformats.org/markup-compatibility/2006" xmlns:p14="http://schemas.microsoft.com/office/powerpoint/2010/main">
+        <mc:Choice Requires="p14">
           <p:contentPart p14:bwMode="auto" r:id="rId6">
             <p14:nvContentPartPr>
               <p14:cNvPr id="7" name="Ink 6">
@@ -4935,7 +8758,7 @@
             </p14:xfrm>
           </p:contentPart>
         </mc:Choice>
-        <mc:Fallback>
+        <mc:Fallback xmlns="">
           <p:pic>
             <p:nvPicPr>
               <p:cNvPr id="7" name="Ink 6">
@@ -4966,8 +8789,8 @@
           </p:pic>
         </mc:Fallback>
       </mc:AlternateContent>
-      <mc:AlternateContent xmlns:mc="http://schemas.openxmlformats.org/markup-compatibility/2006">
-        <mc:Choice xmlns:p14="http://schemas.microsoft.com/office/powerpoint/2010/main" Requires="p14">
+      <mc:AlternateContent xmlns:mc="http://schemas.openxmlformats.org/markup-compatibility/2006" xmlns:p14="http://schemas.microsoft.com/office/powerpoint/2010/main">
+        <mc:Choice Requires="p14">
           <p:contentPart p14:bwMode="auto" r:id="rId8">
             <p14:nvContentPartPr>
               <p14:cNvPr id="8" name="Ink 7">
@@ -4986,7 +8809,7 @@
             </p14:xfrm>
           </p:contentPart>
         </mc:Choice>
-        <mc:Fallback>
+        <mc:Fallback xmlns="">
           <p:pic>
             <p:nvPicPr>
               <p:cNvPr id="8" name="Ink 7">
@@ -5030,100 +8853,6 @@
 </p:sld>
 </file>
 
-<file path=ppt/slides/slide5.xml><?xml version="1.0" encoding="utf-8"?>
-<p:sld xmlns:a="http://schemas.openxmlformats.org/drawingml/2006/main" xmlns:r="http://schemas.openxmlformats.org/officeDocument/2006/relationships" xmlns:p="http://schemas.openxmlformats.org/presentationml/2006/main">
-  <p:cSld>
-    <p:spTree>
-      <p:nvGrpSpPr>
-        <p:cNvPr id="1" name=""/>
-        <p:cNvGrpSpPr/>
-        <p:nvPr/>
-      </p:nvGrpSpPr>
-      <p:grpSpPr>
-        <a:xfrm>
-          <a:off x="0" y="0"/>
-          <a:ext cx="0" cy="0"/>
-          <a:chOff x="0" y="0"/>
-          <a:chExt cx="0" cy="0"/>
-        </a:xfrm>
-      </p:grpSpPr>
-      <p:sp>
-        <p:nvSpPr>
-          <p:cNvPr id="2" name="Title 1">
-            <a:extLst>
-              <a:ext uri="{FF2B5EF4-FFF2-40B4-BE49-F238E27FC236}">
-                <a16:creationId xmlns:a16="http://schemas.microsoft.com/office/drawing/2014/main" id="{A6F7DCF6-FA83-306D-0B52-C9C60AF3C4A8}"/>
-              </a:ext>
-            </a:extLst>
-          </p:cNvPr>
-          <p:cNvSpPr>
-            <a:spLocks noGrp="1"/>
-          </p:cNvSpPr>
-          <p:nvPr>
-            <p:ph type="title"/>
-          </p:nvPr>
-        </p:nvSpPr>
-        <p:spPr/>
-        <p:txBody>
-          <a:bodyPr/>
-          <a:lstStyle/>
-          <a:p>
-            <a:r>
-              <a:rPr lang="en-US" dirty="0"/>
-              <a:t>Storage Account Tier</a:t>
-            </a:r>
-            <a:endParaRPr lang="en-IN" dirty="0"/>
-          </a:p>
-        </p:txBody>
-      </p:sp>
-      <p:sp>
-        <p:nvSpPr>
-          <p:cNvPr id="3" name="Content Placeholder 2">
-            <a:extLst>
-              <a:ext uri="{FF2B5EF4-FFF2-40B4-BE49-F238E27FC236}">
-                <a16:creationId xmlns:a16="http://schemas.microsoft.com/office/drawing/2014/main" id="{F85A6C7F-E18E-84B3-AE88-C606B6DBDEC5}"/>
-              </a:ext>
-            </a:extLst>
-          </p:cNvPr>
-          <p:cNvSpPr>
-            <a:spLocks noGrp="1"/>
-          </p:cNvSpPr>
-          <p:nvPr>
-            <p:ph idx="1"/>
-          </p:nvPr>
-        </p:nvSpPr>
-        <p:spPr/>
-        <p:txBody>
-          <a:bodyPr/>
-          <a:lstStyle/>
-          <a:p>
-            <a:r>
-              <a:rPr lang="en-US" dirty="0"/>
-              <a:t>Standard - HDD</a:t>
-            </a:r>
-          </a:p>
-          <a:p>
-            <a:r>
-              <a:rPr lang="en-US" dirty="0"/>
-              <a:t>Premium - SSD</a:t>
-            </a:r>
-            <a:endParaRPr lang="en-IN" dirty="0"/>
-          </a:p>
-        </p:txBody>
-      </p:sp>
-    </p:spTree>
-    <p:extLst>
-      <p:ext uri="{BB962C8B-B14F-4D97-AF65-F5344CB8AC3E}">
-        <p14:creationId xmlns:p14="http://schemas.microsoft.com/office/powerpoint/2010/main" val="3953417446"/>
-      </p:ext>
-    </p:extLst>
-  </p:cSld>
-  <p:clrMapOvr>
-    <a:masterClrMapping/>
-  </p:clrMapOvr>
-</p:sld>
-</file>
-
 <file path=ppt/slides/slide6.xml><?xml version="1.0" encoding="utf-8"?>
 <p:sld xmlns:a="http://schemas.openxmlformats.org/drawingml/2006/main" xmlns:r="http://schemas.openxmlformats.org/officeDocument/2006/relationships" xmlns:p="http://schemas.openxmlformats.org/presentationml/2006/main">
   <p:cSld>
@@ -5146,7 +8875,7 @@
           <p:cNvPr id="2" name="Title 1">
             <a:extLst>
               <a:ext uri="{FF2B5EF4-FFF2-40B4-BE49-F238E27FC236}">
-                <a16:creationId xmlns:a16="http://schemas.microsoft.com/office/drawing/2014/main" id="{B37B7962-A39F-F768-E898-FEA0DCAA4F54}"/>
+                <a16:creationId xmlns:a16="http://schemas.microsoft.com/office/drawing/2014/main" id="{A6F7DCF6-FA83-306D-0B52-C9C60AF3C4A8}"/>
               </a:ext>
             </a:extLst>
           </p:cNvPr>
@@ -5164,7 +8893,7 @@
           <a:p>
             <a:r>
               <a:rPr lang="en-US" dirty="0"/>
-              <a:t>Storage Account Type</a:t>
+              <a:t>Storage Account Tier</a:t>
             </a:r>
             <a:endParaRPr lang="en-IN" dirty="0"/>
           </a:p>
@@ -5175,7 +8904,7 @@
           <p:cNvPr id="3" name="Content Placeholder 2">
             <a:extLst>
               <a:ext uri="{FF2B5EF4-FFF2-40B4-BE49-F238E27FC236}">
-                <a16:creationId xmlns:a16="http://schemas.microsoft.com/office/drawing/2014/main" id="{47A5C909-9ABB-7893-8DD9-A9DE0B1881C9}"/>
+                <a16:creationId xmlns:a16="http://schemas.microsoft.com/office/drawing/2014/main" id="{F85A6C7F-E18E-84B3-AE88-C606B6DBDEC5}"/>
               </a:ext>
             </a:extLst>
           </p:cNvPr>
@@ -5193,19 +8922,13 @@
           <a:p>
             <a:r>
               <a:rPr lang="en-US" dirty="0"/>
-              <a:t>General Purpose v2</a:t>
+              <a:t>Standard - HDD</a:t>
             </a:r>
           </a:p>
           <a:p>
             <a:r>
               <a:rPr lang="en-US" dirty="0"/>
-              <a:t>General Purpose v1</a:t>
-            </a:r>
-          </a:p>
-          <a:p>
-            <a:r>
-              <a:rPr lang="en-US" dirty="0"/>
-              <a:t>Blob Storage</a:t>
+              <a:t>Premium - SSD</a:t>
             </a:r>
             <a:endParaRPr lang="en-IN" dirty="0"/>
           </a:p>
@@ -5214,7 +8937,7 @@
     </p:spTree>
     <p:extLst>
       <p:ext uri="{BB962C8B-B14F-4D97-AF65-F5344CB8AC3E}">
-        <p14:creationId xmlns:p14="http://schemas.microsoft.com/office/powerpoint/2010/main" val="2622486971"/>
+        <p14:creationId xmlns:p14="http://schemas.microsoft.com/office/powerpoint/2010/main" val="3953417446"/>
       </p:ext>
     </p:extLst>
   </p:cSld>
@@ -5246,6 +8969,106 @@
           <p:cNvPr id="2" name="Title 1">
             <a:extLst>
               <a:ext uri="{FF2B5EF4-FFF2-40B4-BE49-F238E27FC236}">
+                <a16:creationId xmlns:a16="http://schemas.microsoft.com/office/drawing/2014/main" id="{B37B7962-A39F-F768-E898-FEA0DCAA4F54}"/>
+              </a:ext>
+            </a:extLst>
+          </p:cNvPr>
+          <p:cNvSpPr>
+            <a:spLocks noGrp="1"/>
+          </p:cNvSpPr>
+          <p:nvPr>
+            <p:ph type="title"/>
+          </p:nvPr>
+        </p:nvSpPr>
+        <p:spPr/>
+        <p:txBody>
+          <a:bodyPr/>
+          <a:lstStyle/>
+          <a:p>
+            <a:r>
+              <a:rPr lang="en-US" dirty="0"/>
+              <a:t>Storage Account Type</a:t>
+            </a:r>
+            <a:endParaRPr lang="en-IN" dirty="0"/>
+          </a:p>
+        </p:txBody>
+      </p:sp>
+      <p:sp>
+        <p:nvSpPr>
+          <p:cNvPr id="3" name="Content Placeholder 2">
+            <a:extLst>
+              <a:ext uri="{FF2B5EF4-FFF2-40B4-BE49-F238E27FC236}">
+                <a16:creationId xmlns:a16="http://schemas.microsoft.com/office/drawing/2014/main" id="{47A5C909-9ABB-7893-8DD9-A9DE0B1881C9}"/>
+              </a:ext>
+            </a:extLst>
+          </p:cNvPr>
+          <p:cNvSpPr>
+            <a:spLocks noGrp="1"/>
+          </p:cNvSpPr>
+          <p:nvPr>
+            <p:ph idx="1"/>
+          </p:nvPr>
+        </p:nvSpPr>
+        <p:spPr/>
+        <p:txBody>
+          <a:bodyPr/>
+          <a:lstStyle/>
+          <a:p>
+            <a:r>
+              <a:rPr lang="en-US" dirty="0"/>
+              <a:t>General Purpose v2</a:t>
+            </a:r>
+          </a:p>
+          <a:p>
+            <a:r>
+              <a:rPr lang="en-US" dirty="0"/>
+              <a:t>General Purpose v1</a:t>
+            </a:r>
+          </a:p>
+          <a:p>
+            <a:r>
+              <a:rPr lang="en-US" dirty="0"/>
+              <a:t>Blob Storage</a:t>
+            </a:r>
+            <a:endParaRPr lang="en-IN" dirty="0"/>
+          </a:p>
+        </p:txBody>
+      </p:sp>
+    </p:spTree>
+    <p:extLst>
+      <p:ext uri="{BB962C8B-B14F-4D97-AF65-F5344CB8AC3E}">
+        <p14:creationId xmlns:p14="http://schemas.microsoft.com/office/powerpoint/2010/main" val="2622486971"/>
+      </p:ext>
+    </p:extLst>
+  </p:cSld>
+  <p:clrMapOvr>
+    <a:masterClrMapping/>
+  </p:clrMapOvr>
+</p:sld>
+</file>
+
+<file path=ppt/slides/slide8.xml><?xml version="1.0" encoding="utf-8"?>
+<p:sld xmlns:a="http://schemas.openxmlformats.org/drawingml/2006/main" xmlns:r="http://schemas.openxmlformats.org/officeDocument/2006/relationships" xmlns:p="http://schemas.openxmlformats.org/presentationml/2006/main">
+  <p:cSld>
+    <p:spTree>
+      <p:nvGrpSpPr>
+        <p:cNvPr id="1" name=""/>
+        <p:cNvGrpSpPr/>
+        <p:nvPr/>
+      </p:nvGrpSpPr>
+      <p:grpSpPr>
+        <a:xfrm>
+          <a:off x="0" y="0"/>
+          <a:ext cx="0" cy="0"/>
+          <a:chOff x="0" y="0"/>
+          <a:chExt cx="0" cy="0"/>
+        </a:xfrm>
+      </p:grpSpPr>
+      <p:sp>
+        <p:nvSpPr>
+          <p:cNvPr id="2" name="Title 1">
+            <a:extLst>
+              <a:ext uri="{FF2B5EF4-FFF2-40B4-BE49-F238E27FC236}">
                 <a16:creationId xmlns:a16="http://schemas.microsoft.com/office/drawing/2014/main" id="{EC79E1E4-32D3-D9C9-1F33-E3C611FB2517}"/>
               </a:ext>
             </a:extLst>
@@ -5360,8 +9183,8 @@
             <a:chExt cx="929160" cy="3016800"/>
           </a:xfrm>
         </p:grpSpPr>
-        <mc:AlternateContent xmlns:mc="http://schemas.openxmlformats.org/markup-compatibility/2006">
-          <mc:Choice xmlns:p14="http://schemas.microsoft.com/office/powerpoint/2010/main" Requires="p14">
+        <mc:AlternateContent xmlns:mc="http://schemas.openxmlformats.org/markup-compatibility/2006" xmlns:p14="http://schemas.microsoft.com/office/powerpoint/2010/main">
+          <mc:Choice Requires="p14">
             <p:contentPart p14:bwMode="auto" r:id="rId2">
               <p14:nvContentPartPr>
                 <p14:cNvPr id="4" name="Ink 3">
@@ -5380,7 +9203,7 @@
               </p14:xfrm>
             </p:contentPart>
           </mc:Choice>
-          <mc:Fallback>
+          <mc:Fallback xmlns="">
             <p:pic>
               <p:nvPicPr>
                 <p:cNvPr id="4" name="Ink 3">
@@ -5411,8 +9234,8 @@
             </p:pic>
           </mc:Fallback>
         </mc:AlternateContent>
-        <mc:AlternateContent xmlns:mc="http://schemas.openxmlformats.org/markup-compatibility/2006">
-          <mc:Choice xmlns:p14="http://schemas.microsoft.com/office/powerpoint/2010/main" Requires="p14">
+        <mc:AlternateContent xmlns:mc="http://schemas.openxmlformats.org/markup-compatibility/2006" xmlns:p14="http://schemas.microsoft.com/office/powerpoint/2010/main">
+          <mc:Choice Requires="p14">
             <p:contentPart p14:bwMode="auto" r:id="rId4">
               <p14:nvContentPartPr>
                 <p14:cNvPr id="5" name="Ink 4">
@@ -5431,7 +9254,7 @@
               </p14:xfrm>
             </p:contentPart>
           </mc:Choice>
-          <mc:Fallback>
+          <mc:Fallback xmlns="">
             <p:pic>
               <p:nvPicPr>
                 <p:cNvPr id="5" name="Ink 4">
@@ -5462,8 +9285,8 @@
             </p:pic>
           </mc:Fallback>
         </mc:AlternateContent>
-        <mc:AlternateContent xmlns:mc="http://schemas.openxmlformats.org/markup-compatibility/2006">
-          <mc:Choice xmlns:p14="http://schemas.microsoft.com/office/powerpoint/2010/main" Requires="p14">
+        <mc:AlternateContent xmlns:mc="http://schemas.openxmlformats.org/markup-compatibility/2006" xmlns:p14="http://schemas.microsoft.com/office/powerpoint/2010/main">
+          <mc:Choice Requires="p14">
             <p:contentPart p14:bwMode="auto" r:id="rId6">
               <p14:nvContentPartPr>
                 <p14:cNvPr id="6" name="Ink 5">
@@ -5482,7 +9305,7 @@
               </p14:xfrm>
             </p:contentPart>
           </mc:Choice>
-          <mc:Fallback>
+          <mc:Fallback xmlns="">
             <p:pic>
               <p:nvPicPr>
                 <p:cNvPr id="6" name="Ink 5">
@@ -5513,8 +9336,8 @@
             </p:pic>
           </mc:Fallback>
         </mc:AlternateContent>
-        <mc:AlternateContent xmlns:mc="http://schemas.openxmlformats.org/markup-compatibility/2006">
-          <mc:Choice xmlns:p14="http://schemas.microsoft.com/office/powerpoint/2010/main" Requires="p14">
+        <mc:AlternateContent xmlns:mc="http://schemas.openxmlformats.org/markup-compatibility/2006" xmlns:p14="http://schemas.microsoft.com/office/powerpoint/2010/main">
+          <mc:Choice Requires="p14">
             <p:contentPart p14:bwMode="auto" r:id="rId8">
               <p14:nvContentPartPr>
                 <p14:cNvPr id="8" name="Ink 7">
@@ -5533,7 +9356,7 @@
               </p14:xfrm>
             </p:contentPart>
           </mc:Choice>
-          <mc:Fallback>
+          <mc:Fallback xmlns="">
             <p:pic>
               <p:nvPicPr>
                 <p:cNvPr id="8" name="Ink 7">
@@ -5564,8 +9387,8 @@
             </p:pic>
           </mc:Fallback>
         </mc:AlternateContent>
-        <mc:AlternateContent xmlns:mc="http://schemas.openxmlformats.org/markup-compatibility/2006">
-          <mc:Choice xmlns:p14="http://schemas.microsoft.com/office/powerpoint/2010/main" Requires="p14">
+        <mc:AlternateContent xmlns:mc="http://schemas.openxmlformats.org/markup-compatibility/2006" xmlns:p14="http://schemas.microsoft.com/office/powerpoint/2010/main">
+          <mc:Choice Requires="p14">
             <p:contentPart p14:bwMode="auto" r:id="rId10">
               <p14:nvContentPartPr>
                 <p14:cNvPr id="9" name="Ink 8">
@@ -5584,7 +9407,7 @@
               </p14:xfrm>
             </p:contentPart>
           </mc:Choice>
-          <mc:Fallback>
+          <mc:Fallback xmlns="">
             <p:pic>
               <p:nvPicPr>
                 <p:cNvPr id="9" name="Ink 8">
@@ -5615,8 +9438,8 @@
             </p:pic>
           </mc:Fallback>
         </mc:AlternateContent>
-        <mc:AlternateContent xmlns:mc="http://schemas.openxmlformats.org/markup-compatibility/2006">
-          <mc:Choice xmlns:p14="http://schemas.microsoft.com/office/powerpoint/2010/main" Requires="p14">
+        <mc:AlternateContent xmlns:mc="http://schemas.openxmlformats.org/markup-compatibility/2006" xmlns:p14="http://schemas.microsoft.com/office/powerpoint/2010/main">
+          <mc:Choice Requires="p14">
             <p:contentPart p14:bwMode="auto" r:id="rId12">
               <p14:nvContentPartPr>
                 <p14:cNvPr id="10" name="Ink 9">
@@ -5635,7 +9458,7 @@
               </p14:xfrm>
             </p:contentPart>
           </mc:Choice>
-          <mc:Fallback>
+          <mc:Fallback xmlns="">
             <p:pic>
               <p:nvPicPr>
                 <p:cNvPr id="10" name="Ink 9">
@@ -5666,8 +9489,8 @@
             </p:pic>
           </mc:Fallback>
         </mc:AlternateContent>
-        <mc:AlternateContent xmlns:mc="http://schemas.openxmlformats.org/markup-compatibility/2006">
-          <mc:Choice xmlns:p14="http://schemas.microsoft.com/office/powerpoint/2010/main" Requires="p14">
+        <mc:AlternateContent xmlns:mc="http://schemas.openxmlformats.org/markup-compatibility/2006" xmlns:p14="http://schemas.microsoft.com/office/powerpoint/2010/main">
+          <mc:Choice Requires="p14">
             <p:contentPart p14:bwMode="auto" r:id="rId14">
               <p14:nvContentPartPr>
                 <p14:cNvPr id="11" name="Ink 10">
@@ -5686,7 +9509,7 @@
               </p14:xfrm>
             </p:contentPart>
           </mc:Choice>
-          <mc:Fallback>
+          <mc:Fallback xmlns="">
             <p:pic>
               <p:nvPicPr>
                 <p:cNvPr id="11" name="Ink 10">
@@ -5717,8 +9540,8 @@
             </p:pic>
           </mc:Fallback>
         </mc:AlternateContent>
-        <mc:AlternateContent xmlns:mc="http://schemas.openxmlformats.org/markup-compatibility/2006">
-          <mc:Choice xmlns:p14="http://schemas.microsoft.com/office/powerpoint/2010/main" Requires="p14">
+        <mc:AlternateContent xmlns:mc="http://schemas.openxmlformats.org/markup-compatibility/2006" xmlns:p14="http://schemas.microsoft.com/office/powerpoint/2010/main">
+          <mc:Choice Requires="p14">
             <p:contentPart p14:bwMode="auto" r:id="rId16">
               <p14:nvContentPartPr>
                 <p14:cNvPr id="12" name="Ink 11">
@@ -5737,7 +9560,7 @@
               </p14:xfrm>
             </p:contentPart>
           </mc:Choice>
-          <mc:Fallback>
+          <mc:Fallback xmlns="">
             <p:pic>
               <p:nvPicPr>
                 <p:cNvPr id="12" name="Ink 11">
@@ -5789,8 +9612,8 @@
             <a:chExt cx="535320" cy="290160"/>
           </a:xfrm>
         </p:grpSpPr>
-        <mc:AlternateContent xmlns:mc="http://schemas.openxmlformats.org/markup-compatibility/2006">
-          <mc:Choice xmlns:p14="http://schemas.microsoft.com/office/powerpoint/2010/main" Requires="p14">
+        <mc:AlternateContent xmlns:mc="http://schemas.openxmlformats.org/markup-compatibility/2006" xmlns:p14="http://schemas.microsoft.com/office/powerpoint/2010/main">
+          <mc:Choice Requires="p14">
             <p:contentPart p14:bwMode="auto" r:id="rId18">
               <p14:nvContentPartPr>
                 <p14:cNvPr id="14" name="Ink 13">
@@ -5809,7 +9632,7 @@
               </p14:xfrm>
             </p:contentPart>
           </mc:Choice>
-          <mc:Fallback>
+          <mc:Fallback xmlns="">
             <p:pic>
               <p:nvPicPr>
                 <p:cNvPr id="14" name="Ink 13">
@@ -5840,8 +9663,8 @@
             </p:pic>
           </mc:Fallback>
         </mc:AlternateContent>
-        <mc:AlternateContent xmlns:mc="http://schemas.openxmlformats.org/markup-compatibility/2006">
-          <mc:Choice xmlns:p14="http://schemas.microsoft.com/office/powerpoint/2010/main" Requires="p14">
+        <mc:AlternateContent xmlns:mc="http://schemas.openxmlformats.org/markup-compatibility/2006" xmlns:p14="http://schemas.microsoft.com/office/powerpoint/2010/main">
+          <mc:Choice Requires="p14">
             <p:contentPart p14:bwMode="auto" r:id="rId20">
               <p14:nvContentPartPr>
                 <p14:cNvPr id="15" name="Ink 14">
@@ -5860,7 +9683,7 @@
               </p14:xfrm>
             </p:contentPart>
           </mc:Choice>
-          <mc:Fallback>
+          <mc:Fallback xmlns="">
             <p:pic>
               <p:nvPicPr>
                 <p:cNvPr id="15" name="Ink 14">
@@ -5891,8 +9714,8 @@
             </p:pic>
           </mc:Fallback>
         </mc:AlternateContent>
-        <mc:AlternateContent xmlns:mc="http://schemas.openxmlformats.org/markup-compatibility/2006">
-          <mc:Choice xmlns:p14="http://schemas.microsoft.com/office/powerpoint/2010/main" Requires="p14">
+        <mc:AlternateContent xmlns:mc="http://schemas.openxmlformats.org/markup-compatibility/2006" xmlns:p14="http://schemas.microsoft.com/office/powerpoint/2010/main">
+          <mc:Choice Requires="p14">
             <p:contentPart p14:bwMode="auto" r:id="rId22">
               <p14:nvContentPartPr>
                 <p14:cNvPr id="16" name="Ink 15">
@@ -5911,7 +9734,7 @@
               </p14:xfrm>
             </p:contentPart>
           </mc:Choice>
-          <mc:Fallback>
+          <mc:Fallback xmlns="">
             <p:pic>
               <p:nvPicPr>
                 <p:cNvPr id="16" name="Ink 15">
@@ -5942,8 +9765,8 @@
             </p:pic>
           </mc:Fallback>
         </mc:AlternateContent>
-        <mc:AlternateContent xmlns:mc="http://schemas.openxmlformats.org/markup-compatibility/2006">
-          <mc:Choice xmlns:p14="http://schemas.microsoft.com/office/powerpoint/2010/main" Requires="p14">
+        <mc:AlternateContent xmlns:mc="http://schemas.openxmlformats.org/markup-compatibility/2006" xmlns:p14="http://schemas.microsoft.com/office/powerpoint/2010/main">
+          <mc:Choice Requires="p14">
             <p:contentPart p14:bwMode="auto" r:id="rId24">
               <p14:nvContentPartPr>
                 <p14:cNvPr id="17" name="Ink 16">
@@ -5962,7 +9785,7 @@
               </p14:xfrm>
             </p:contentPart>
           </mc:Choice>
-          <mc:Fallback>
+          <mc:Fallback xmlns="">
             <p:pic>
               <p:nvPicPr>
                 <p:cNvPr id="17" name="Ink 16">
@@ -5993,8 +9816,8 @@
             </p:pic>
           </mc:Fallback>
         </mc:AlternateContent>
-        <mc:AlternateContent xmlns:mc="http://schemas.openxmlformats.org/markup-compatibility/2006">
-          <mc:Choice xmlns:p14="http://schemas.microsoft.com/office/powerpoint/2010/main" Requires="p14">
+        <mc:AlternateContent xmlns:mc="http://schemas.openxmlformats.org/markup-compatibility/2006" xmlns:p14="http://schemas.microsoft.com/office/powerpoint/2010/main">
+          <mc:Choice Requires="p14">
             <p:contentPart p14:bwMode="auto" r:id="rId26">
               <p14:nvContentPartPr>
                 <p14:cNvPr id="18" name="Ink 17">
@@ -6013,7 +9836,7 @@
               </p14:xfrm>
             </p:contentPart>
           </mc:Choice>
-          <mc:Fallback>
+          <mc:Fallback xmlns="">
             <p:pic>
               <p:nvPicPr>
                 <p:cNvPr id="18" name="Ink 17">
@@ -6049,6 +9872,139 @@
     <p:extLst>
       <p:ext uri="{BB962C8B-B14F-4D97-AF65-F5344CB8AC3E}">
         <p14:creationId xmlns:p14="http://schemas.microsoft.com/office/powerpoint/2010/main" val="1167579790"/>
+      </p:ext>
+    </p:extLst>
+  </p:cSld>
+  <p:clrMapOvr>
+    <a:masterClrMapping/>
+  </p:clrMapOvr>
+</p:sld>
+</file>
+
+<file path=ppt/slides/slide9.xml><?xml version="1.0" encoding="utf-8"?>
+<p:sld xmlns:a="http://schemas.openxmlformats.org/drawingml/2006/main" xmlns:r="http://schemas.openxmlformats.org/officeDocument/2006/relationships" xmlns:p="http://schemas.openxmlformats.org/presentationml/2006/main">
+  <p:cSld>
+    <p:spTree>
+      <p:nvGrpSpPr>
+        <p:cNvPr id="1" name=""/>
+        <p:cNvGrpSpPr/>
+        <p:nvPr/>
+      </p:nvGrpSpPr>
+      <p:grpSpPr>
+        <a:xfrm>
+          <a:off x="0" y="0"/>
+          <a:ext cx="0" cy="0"/>
+          <a:chOff x="0" y="0"/>
+          <a:chExt cx="0" cy="0"/>
+        </a:xfrm>
+      </p:grpSpPr>
+      <p:sp>
+        <p:nvSpPr>
+          <p:cNvPr id="2" name="Title 1">
+            <a:extLst>
+              <a:ext uri="{FF2B5EF4-FFF2-40B4-BE49-F238E27FC236}">
+                <a16:creationId xmlns:a16="http://schemas.microsoft.com/office/drawing/2014/main" id="{377E85F2-6BB6-FA3F-811E-4F121C7870AF}"/>
+              </a:ext>
+            </a:extLst>
+          </p:cNvPr>
+          <p:cNvSpPr>
+            <a:spLocks noGrp="1"/>
+          </p:cNvSpPr>
+          <p:nvPr>
+            <p:ph type="title"/>
+          </p:nvPr>
+        </p:nvSpPr>
+        <p:spPr/>
+        <p:txBody>
+          <a:bodyPr/>
+          <a:lstStyle/>
+          <a:p>
+            <a:r>
+              <a:rPr lang="en-US" dirty="0"/>
+              <a:t>Accessing Storage</a:t>
+            </a:r>
+            <a:endParaRPr lang="en-IN" dirty="0"/>
+          </a:p>
+        </p:txBody>
+      </p:sp>
+      <p:sp>
+        <p:nvSpPr>
+          <p:cNvPr id="3" name="Content Placeholder 2">
+            <a:extLst>
+              <a:ext uri="{FF2B5EF4-FFF2-40B4-BE49-F238E27FC236}">
+                <a16:creationId xmlns:a16="http://schemas.microsoft.com/office/drawing/2014/main" id="{5A106825-F3C3-3B36-A597-6F7AB1954863}"/>
+              </a:ext>
+            </a:extLst>
+          </p:cNvPr>
+          <p:cNvSpPr>
+            <a:spLocks noGrp="1"/>
+          </p:cNvSpPr>
+          <p:nvPr>
+            <p:ph idx="1"/>
+          </p:nvPr>
+        </p:nvSpPr>
+        <p:spPr/>
+        <p:txBody>
+          <a:bodyPr/>
+          <a:lstStyle/>
+          <a:p>
+            <a:r>
+              <a:rPr lang="en-US" dirty="0"/>
+              <a:t>Blob - </a:t>
+            </a:r>
+            <a:r>
+              <a:rPr lang="en-US" dirty="0">
+                <a:hlinkClick r:id="rId2"/>
+              </a:rPr>
+              <a:t>http://techtrics.blob.core.windows.net</a:t>
+            </a:r>
+            <a:endParaRPr lang="en-US" dirty="0"/>
+          </a:p>
+          <a:p>
+            <a:r>
+              <a:rPr lang="en-US" dirty="0"/>
+              <a:t>File - </a:t>
+            </a:r>
+            <a:r>
+              <a:rPr lang="en-US" dirty="0">
+                <a:hlinkClick r:id="rId3"/>
+              </a:rPr>
+              <a:t>http://techtrics.file.core.windows.net</a:t>
+            </a:r>
+            <a:endParaRPr lang="en-US" dirty="0"/>
+          </a:p>
+          <a:p>
+            <a:r>
+              <a:rPr lang="en-US" dirty="0"/>
+              <a:t>Table - </a:t>
+            </a:r>
+            <a:r>
+              <a:rPr lang="en-US" dirty="0">
+                <a:hlinkClick r:id="rId4"/>
+              </a:rPr>
+              <a:t>http://techtrics.table.core.windows.net</a:t>
+            </a:r>
+            <a:endParaRPr lang="en-US" dirty="0"/>
+          </a:p>
+          <a:p>
+            <a:r>
+              <a:rPr lang="en-US" dirty="0"/>
+              <a:t>Queue - </a:t>
+            </a:r>
+            <a:r>
+              <a:rPr lang="en-US" dirty="0">
+                <a:hlinkClick r:id="rId5"/>
+              </a:rPr>
+              <a:t>http://techtrics.queue.core.windows.net</a:t>
+            </a:r>
+            <a:endParaRPr lang="en-US" dirty="0"/>
+          </a:p>
+        </p:txBody>
+      </p:sp>
+    </p:spTree>
+    <p:extLst>
+      <p:ext uri="{BB962C8B-B14F-4D97-AF65-F5344CB8AC3E}">
+        <p14:creationId xmlns:p14="http://schemas.microsoft.com/office/powerpoint/2010/main" val="1983769037"/>
       </p:ext>
     </p:extLst>
   </p:cSld>

</xml_diff>